<commit_message>
Add new diagram for save user feature in DG
</commit_message>
<xml_diff>
--- a/docs/diagrams/SaveFeatureDiagrams.pptx
+++ b/docs/diagrams/SaveFeatureDiagrams.pptx
@@ -5,11 +5,12 @@
     <p:sldMasterId id="2147483648" r:id="rId1"/>
   </p:sldMasterIdLst>
   <p:notesMasterIdLst>
-    <p:notesMasterId r:id="rId4"/>
+    <p:notesMasterId r:id="rId5"/>
   </p:notesMasterIdLst>
   <p:sldIdLst>
-    <p:sldId id="266" r:id="rId2"/>
-    <p:sldId id="267" r:id="rId3"/>
+    <p:sldId id="267" r:id="rId2"/>
+    <p:sldId id="268" r:id="rId3"/>
+    <p:sldId id="266" r:id="rId4"/>
   </p:sldIdLst>
   <p:sldSz cx="9144000" cy="6858000" type="screen4x3"/>
   <p:notesSz cx="6858000" cy="9144000"/>
@@ -209,7 +210,7 @@
           <a:p>
             <a:fld id="{F5CC4B3F-88C1-4FFA-B1B6-F41C21DC6924}" type="datetimeFigureOut">
               <a:rPr lang="en-US" smtClean="0"/>
-              <a:t>10/14/18</a:t>
+              <a:t>10/24/18</a:t>
             </a:fld>
             <a:endParaRPr lang="en-US"/>
           </a:p>
@@ -655,7 +656,7 @@
           <a:p>
             <a:fld id="{78C97017-6FC3-485B-9764-EAC9E56C1D49}" type="datetimeFigureOut">
               <a:rPr lang="en-US" smtClean="0"/>
-              <a:t>10/14/18</a:t>
+              <a:t>10/24/18</a:t>
             </a:fld>
             <a:endParaRPr lang="en-US"/>
           </a:p>
@@ -823,7 +824,7 @@
           <a:p>
             <a:fld id="{78C97017-6FC3-485B-9764-EAC9E56C1D49}" type="datetimeFigureOut">
               <a:rPr lang="en-US" smtClean="0"/>
-              <a:t>10/14/18</a:t>
+              <a:t>10/24/18</a:t>
             </a:fld>
             <a:endParaRPr lang="en-US"/>
           </a:p>
@@ -1001,7 +1002,7 @@
           <a:p>
             <a:fld id="{78C97017-6FC3-485B-9764-EAC9E56C1D49}" type="datetimeFigureOut">
               <a:rPr lang="en-US" smtClean="0"/>
-              <a:t>10/14/18</a:t>
+              <a:t>10/24/18</a:t>
             </a:fld>
             <a:endParaRPr lang="en-US"/>
           </a:p>
@@ -1169,7 +1170,7 @@
           <a:p>
             <a:fld id="{78C97017-6FC3-485B-9764-EAC9E56C1D49}" type="datetimeFigureOut">
               <a:rPr lang="en-US" smtClean="0"/>
-              <a:t>10/14/18</a:t>
+              <a:t>10/24/18</a:t>
             </a:fld>
             <a:endParaRPr lang="en-US"/>
           </a:p>
@@ -1414,7 +1415,7 @@
           <a:p>
             <a:fld id="{78C97017-6FC3-485B-9764-EAC9E56C1D49}" type="datetimeFigureOut">
               <a:rPr lang="en-US" smtClean="0"/>
-              <a:t>10/14/18</a:t>
+              <a:t>10/24/18</a:t>
             </a:fld>
             <a:endParaRPr lang="en-US"/>
           </a:p>
@@ -1699,7 +1700,7 @@
           <a:p>
             <a:fld id="{78C97017-6FC3-485B-9764-EAC9E56C1D49}" type="datetimeFigureOut">
               <a:rPr lang="en-US" smtClean="0"/>
-              <a:t>10/14/18</a:t>
+              <a:t>10/24/18</a:t>
             </a:fld>
             <a:endParaRPr lang="en-US"/>
           </a:p>
@@ -2118,7 +2119,7 @@
           <a:p>
             <a:fld id="{78C97017-6FC3-485B-9764-EAC9E56C1D49}" type="datetimeFigureOut">
               <a:rPr lang="en-US" smtClean="0"/>
-              <a:t>10/14/18</a:t>
+              <a:t>10/24/18</a:t>
             </a:fld>
             <a:endParaRPr lang="en-US"/>
           </a:p>
@@ -2235,7 +2236,7 @@
           <a:p>
             <a:fld id="{78C97017-6FC3-485B-9764-EAC9E56C1D49}" type="datetimeFigureOut">
               <a:rPr lang="en-US" smtClean="0"/>
-              <a:t>10/14/18</a:t>
+              <a:t>10/24/18</a:t>
             </a:fld>
             <a:endParaRPr lang="en-US"/>
           </a:p>
@@ -2330,7 +2331,7 @@
           <a:p>
             <a:fld id="{78C97017-6FC3-485B-9764-EAC9E56C1D49}" type="datetimeFigureOut">
               <a:rPr lang="en-US" smtClean="0"/>
-              <a:t>10/14/18</a:t>
+              <a:t>10/24/18</a:t>
             </a:fld>
             <a:endParaRPr lang="en-US"/>
           </a:p>
@@ -2605,7 +2606,7 @@
           <a:p>
             <a:fld id="{78C97017-6FC3-485B-9764-EAC9E56C1D49}" type="datetimeFigureOut">
               <a:rPr lang="en-US" smtClean="0"/>
-              <a:t>10/14/18</a:t>
+              <a:t>10/24/18</a:t>
             </a:fld>
             <a:endParaRPr lang="en-US"/>
           </a:p>
@@ -2857,7 +2858,7 @@
           <a:p>
             <a:fld id="{78C97017-6FC3-485B-9764-EAC9E56C1D49}" type="datetimeFigureOut">
               <a:rPr lang="en-US" smtClean="0"/>
-              <a:t>10/14/18</a:t>
+              <a:t>10/24/18</a:t>
             </a:fld>
             <a:endParaRPr lang="en-US"/>
           </a:p>
@@ -3071,7 +3072,7 @@
           <a:p>
             <a:fld id="{78C97017-6FC3-485B-9764-EAC9E56C1D49}" type="datetimeFigureOut">
               <a:rPr lang="en-US" smtClean="0"/>
-              <a:t>10/14/18</a:t>
+              <a:t>10/24/18</a:t>
             </a:fld>
             <a:endParaRPr lang="en-US"/>
           </a:p>
@@ -3448,6 +3449,2868 @@
       </p:grpSpPr>
       <p:sp>
         <p:nvSpPr>
+          <p:cNvPr id="7" name="Rectangle 8">
+            <a:extLst>
+              <a:ext uri="{FF2B5EF4-FFF2-40B4-BE49-F238E27FC236}">
+                <a16:creationId xmlns:a16="http://schemas.microsoft.com/office/drawing/2014/main" id="{A90748A2-4053-1F4B-AE0C-9C15236A2B5F}"/>
+              </a:ext>
+            </a:extLst>
+          </p:cNvPr>
+          <p:cNvSpPr/>
+          <p:nvPr/>
+        </p:nvSpPr>
+        <p:spPr>
+          <a:xfrm>
+            <a:off x="1981200" y="2007561"/>
+            <a:ext cx="2962620" cy="346760"/>
+          </a:xfrm>
+          <a:prstGeom prst="rect">
+            <a:avLst/>
+          </a:prstGeom>
+          <a:ln/>
+        </p:spPr>
+        <p:style>
+          <a:lnRef idx="2">
+            <a:schemeClr val="accent3">
+              <a:shade val="50000"/>
+            </a:schemeClr>
+          </a:lnRef>
+          <a:fillRef idx="1">
+            <a:schemeClr val="accent3"/>
+          </a:fillRef>
+          <a:effectRef idx="0">
+            <a:schemeClr val="accent3"/>
+          </a:effectRef>
+          <a:fontRef idx="minor">
+            <a:schemeClr val="lt1"/>
+          </a:fontRef>
+        </p:style>
+        <p:txBody>
+          <a:bodyPr rtlCol="0" anchor="ctr"/>
+          <a:lstStyle/>
+          <a:p>
+            <a:pPr algn="ctr"/>
+            <a:r>
+              <a:rPr lang="en-US" sz="1400" b="1" dirty="0" err="1">
+                <a:solidFill>
+                  <a:schemeClr val="bg1"/>
+                </a:solidFill>
+              </a:rPr>
+              <a:t>SaveCommand</a:t>
+            </a:r>
+            <a:endParaRPr lang="en-SG" sz="1050" b="1" dirty="0">
+              <a:solidFill>
+                <a:schemeClr val="bg1"/>
+              </a:solidFill>
+            </a:endParaRPr>
+          </a:p>
+        </p:txBody>
+      </p:sp>
+      <p:cxnSp>
+        <p:nvCxnSpPr>
+          <p:cNvPr id="8" name="Straight Connector 7">
+            <a:extLst>
+              <a:ext uri="{FF2B5EF4-FFF2-40B4-BE49-F238E27FC236}">
+                <a16:creationId xmlns:a16="http://schemas.microsoft.com/office/drawing/2014/main" id="{526D96DB-788F-734E-A0A0-E8601618E4A6}"/>
+              </a:ext>
+            </a:extLst>
+          </p:cNvPr>
+          <p:cNvCxnSpPr>
+            <a:cxnSpLocks/>
+            <a:stCxn id="7" idx="0"/>
+            <a:endCxn id="9" idx="0"/>
+          </p:cNvCxnSpPr>
+          <p:nvPr/>
+        </p:nvCxnSpPr>
+        <p:spPr>
+          <a:xfrm flipV="1">
+            <a:off x="3462510" y="1687744"/>
+            <a:ext cx="2263" cy="319817"/>
+          </a:xfrm>
+          <a:prstGeom prst="line">
+            <a:avLst/>
+          </a:prstGeom>
+        </p:spPr>
+        <p:style>
+          <a:lnRef idx="2">
+            <a:schemeClr val="accent3">
+              <a:shade val="50000"/>
+            </a:schemeClr>
+          </a:lnRef>
+          <a:fillRef idx="1">
+            <a:schemeClr val="accent3"/>
+          </a:fillRef>
+          <a:effectRef idx="0">
+            <a:schemeClr val="accent3"/>
+          </a:effectRef>
+          <a:fontRef idx="minor">
+            <a:schemeClr val="lt1"/>
+          </a:fontRef>
+        </p:style>
+      </p:cxnSp>
+      <p:sp>
+        <p:nvSpPr>
+          <p:cNvPr id="9" name="Isosceles Triangle 10">
+            <a:extLst>
+              <a:ext uri="{FF2B5EF4-FFF2-40B4-BE49-F238E27FC236}">
+                <a16:creationId xmlns:a16="http://schemas.microsoft.com/office/drawing/2014/main" id="{3C51DA7D-98B6-8247-BACD-12E515589416}"/>
+              </a:ext>
+            </a:extLst>
+          </p:cNvPr>
+          <p:cNvSpPr/>
+          <p:nvPr/>
+        </p:nvSpPr>
+        <p:spPr>
+          <a:xfrm>
+            <a:off x="3322625" y="1687744"/>
+            <a:ext cx="284295" cy="156155"/>
+          </a:xfrm>
+          <a:prstGeom prst="triangle">
+            <a:avLst/>
+          </a:prstGeom>
+        </p:spPr>
+        <p:style>
+          <a:lnRef idx="2">
+            <a:schemeClr val="accent3">
+              <a:shade val="50000"/>
+            </a:schemeClr>
+          </a:lnRef>
+          <a:fillRef idx="1">
+            <a:schemeClr val="accent3"/>
+          </a:fillRef>
+          <a:effectRef idx="0">
+            <a:schemeClr val="accent3"/>
+          </a:effectRef>
+          <a:fontRef idx="minor">
+            <a:schemeClr val="lt1"/>
+          </a:fontRef>
+        </p:style>
+        <p:txBody>
+          <a:bodyPr rtlCol="0" anchor="ctr"/>
+          <a:lstStyle/>
+          <a:p>
+            <a:pPr algn="ctr"/>
+            <a:endParaRPr lang="en-IN">
+              <a:solidFill>
+                <a:schemeClr val="bg1"/>
+              </a:solidFill>
+            </a:endParaRPr>
+          </a:p>
+        </p:txBody>
+      </p:sp>
+      <p:sp>
+        <p:nvSpPr>
+          <p:cNvPr id="10" name="Rectangle 8">
+            <a:extLst>
+              <a:ext uri="{FF2B5EF4-FFF2-40B4-BE49-F238E27FC236}">
+                <a16:creationId xmlns:a16="http://schemas.microsoft.com/office/drawing/2014/main" id="{389B8C2B-1FCC-774A-B328-3387F82EF7AF}"/>
+              </a:ext>
+            </a:extLst>
+          </p:cNvPr>
+          <p:cNvSpPr/>
+          <p:nvPr/>
+        </p:nvSpPr>
+        <p:spPr>
+          <a:xfrm>
+            <a:off x="2671041" y="1317538"/>
+            <a:ext cx="1589103" cy="346760"/>
+          </a:xfrm>
+          <a:prstGeom prst="rect">
+            <a:avLst/>
+          </a:prstGeom>
+          <a:ln/>
+        </p:spPr>
+        <p:style>
+          <a:lnRef idx="2">
+            <a:schemeClr val="accent3">
+              <a:shade val="50000"/>
+            </a:schemeClr>
+          </a:lnRef>
+          <a:fillRef idx="1">
+            <a:schemeClr val="accent3"/>
+          </a:fillRef>
+          <a:effectRef idx="0">
+            <a:schemeClr val="accent3"/>
+          </a:effectRef>
+          <a:fontRef idx="minor">
+            <a:schemeClr val="lt1"/>
+          </a:fontRef>
+        </p:style>
+        <p:txBody>
+          <a:bodyPr rtlCol="0" anchor="ctr"/>
+          <a:lstStyle/>
+          <a:p>
+            <a:pPr algn="ctr"/>
+            <a:r>
+              <a:rPr lang="en-US" sz="1400" b="1" i="1" dirty="0">
+                <a:solidFill>
+                  <a:schemeClr val="bg1"/>
+                </a:solidFill>
+              </a:rPr>
+              <a:t>Command</a:t>
+            </a:r>
+            <a:endParaRPr lang="en-SG" sz="1200" b="1" i="1" dirty="0">
+              <a:solidFill>
+                <a:schemeClr val="bg1"/>
+              </a:solidFill>
+            </a:endParaRPr>
+          </a:p>
+        </p:txBody>
+      </p:sp>
+      <p:sp>
+        <p:nvSpPr>
+          <p:cNvPr id="11" name="Rectangle 8">
+            <a:extLst>
+              <a:ext uri="{FF2B5EF4-FFF2-40B4-BE49-F238E27FC236}">
+                <a16:creationId xmlns:a16="http://schemas.microsoft.com/office/drawing/2014/main" id="{F098972C-035C-484A-AFB6-7661ED85C19B}"/>
+              </a:ext>
+            </a:extLst>
+          </p:cNvPr>
+          <p:cNvSpPr/>
+          <p:nvPr/>
+        </p:nvSpPr>
+        <p:spPr>
+          <a:xfrm>
+            <a:off x="2819400" y="2730730"/>
+            <a:ext cx="1259718" cy="346760"/>
+          </a:xfrm>
+          <a:prstGeom prst="rect">
+            <a:avLst/>
+          </a:prstGeom>
+          <a:ln/>
+        </p:spPr>
+        <p:style>
+          <a:lnRef idx="2">
+            <a:schemeClr val="accent3">
+              <a:shade val="50000"/>
+            </a:schemeClr>
+          </a:lnRef>
+          <a:fillRef idx="1">
+            <a:schemeClr val="accent3"/>
+          </a:fillRef>
+          <a:effectRef idx="0">
+            <a:schemeClr val="accent3"/>
+          </a:effectRef>
+          <a:fontRef idx="minor">
+            <a:schemeClr val="lt1"/>
+          </a:fontRef>
+        </p:style>
+        <p:txBody>
+          <a:bodyPr rtlCol="0" anchor="ctr"/>
+          <a:lstStyle/>
+          <a:p>
+            <a:pPr algn="ctr"/>
+            <a:r>
+              <a:rPr lang="en-US" sz="1200" b="1" dirty="0">
+                <a:solidFill>
+                  <a:schemeClr val="bg1"/>
+                </a:solidFill>
+              </a:rPr>
+              <a:t>File</a:t>
+            </a:r>
+            <a:endParaRPr lang="en-SG" sz="1050" b="1" dirty="0">
+              <a:solidFill>
+                <a:schemeClr val="bg1"/>
+              </a:solidFill>
+            </a:endParaRPr>
+          </a:p>
+        </p:txBody>
+      </p:sp>
+      <p:sp>
+        <p:nvSpPr>
+          <p:cNvPr id="12" name="Diamond 11">
+            <a:extLst>
+              <a:ext uri="{FF2B5EF4-FFF2-40B4-BE49-F238E27FC236}">
+                <a16:creationId xmlns:a16="http://schemas.microsoft.com/office/drawing/2014/main" id="{6E42F9EE-166A-6848-B340-2535CA643215}"/>
+              </a:ext>
+            </a:extLst>
+          </p:cNvPr>
+          <p:cNvSpPr/>
+          <p:nvPr/>
+        </p:nvSpPr>
+        <p:spPr>
+          <a:xfrm>
+            <a:off x="3351326" y="2364134"/>
+            <a:ext cx="195865" cy="186962"/>
+          </a:xfrm>
+          <a:prstGeom prst="diamond">
+            <a:avLst/>
+          </a:prstGeom>
+          <a:ln/>
+        </p:spPr>
+        <p:style>
+          <a:lnRef idx="2">
+            <a:schemeClr val="accent3">
+              <a:shade val="50000"/>
+            </a:schemeClr>
+          </a:lnRef>
+          <a:fillRef idx="1">
+            <a:schemeClr val="accent3"/>
+          </a:fillRef>
+          <a:effectRef idx="0">
+            <a:schemeClr val="accent3"/>
+          </a:effectRef>
+          <a:fontRef idx="minor">
+            <a:schemeClr val="lt1"/>
+          </a:fontRef>
+        </p:style>
+        <p:txBody>
+          <a:bodyPr rtlCol="0" anchor="ctr"/>
+          <a:lstStyle/>
+          <a:p>
+            <a:pPr algn="ctr"/>
+            <a:endParaRPr lang="en-IN">
+              <a:solidFill>
+                <a:schemeClr val="bg1"/>
+              </a:solidFill>
+            </a:endParaRPr>
+          </a:p>
+        </p:txBody>
+      </p:sp>
+      <p:cxnSp>
+        <p:nvCxnSpPr>
+          <p:cNvPr id="13" name="Straight Connector 12">
+            <a:extLst>
+              <a:ext uri="{FF2B5EF4-FFF2-40B4-BE49-F238E27FC236}">
+                <a16:creationId xmlns:a16="http://schemas.microsoft.com/office/drawing/2014/main" id="{5332BE21-1550-4043-B8C0-BF5F0737F050}"/>
+              </a:ext>
+            </a:extLst>
+          </p:cNvPr>
+          <p:cNvCxnSpPr>
+            <a:cxnSpLocks/>
+            <a:stCxn id="12" idx="2"/>
+            <a:endCxn id="11" idx="0"/>
+          </p:cNvCxnSpPr>
+          <p:nvPr/>
+        </p:nvCxnSpPr>
+        <p:spPr>
+          <a:xfrm>
+            <a:off x="3449259" y="2551096"/>
+            <a:ext cx="0" cy="179634"/>
+          </a:xfrm>
+          <a:prstGeom prst="line">
+            <a:avLst/>
+          </a:prstGeom>
+        </p:spPr>
+        <p:style>
+          <a:lnRef idx="2">
+            <a:schemeClr val="accent3">
+              <a:shade val="50000"/>
+            </a:schemeClr>
+          </a:lnRef>
+          <a:fillRef idx="1">
+            <a:schemeClr val="accent3"/>
+          </a:fillRef>
+          <a:effectRef idx="0">
+            <a:schemeClr val="accent3"/>
+          </a:effectRef>
+          <a:fontRef idx="minor">
+            <a:schemeClr val="lt1"/>
+          </a:fontRef>
+        </p:style>
+      </p:cxnSp>
+      <p:sp>
+        <p:nvSpPr>
+          <p:cNvPr id="19" name="TextBox 18">
+            <a:extLst>
+              <a:ext uri="{FF2B5EF4-FFF2-40B4-BE49-F238E27FC236}">
+                <a16:creationId xmlns:a16="http://schemas.microsoft.com/office/drawing/2014/main" id="{1AF4D04D-CD12-CE44-91C6-DE706474572D}"/>
+              </a:ext>
+            </a:extLst>
+          </p:cNvPr>
+          <p:cNvSpPr txBox="1"/>
+          <p:nvPr/>
+        </p:nvSpPr>
+        <p:spPr>
+          <a:xfrm>
+            <a:off x="3124200" y="2435423"/>
+            <a:ext cx="276038" cy="307777"/>
+          </a:xfrm>
+          <a:prstGeom prst="rect">
+            <a:avLst/>
+          </a:prstGeom>
+          <a:noFill/>
+        </p:spPr>
+        <p:txBody>
+          <a:bodyPr wrap="none" rtlCol="0">
+            <a:spAutoFit/>
+          </a:bodyPr>
+          <a:lstStyle/>
+          <a:p>
+            <a:r>
+              <a:rPr lang="en-US" sz="1400" dirty="0"/>
+              <a:t>1</a:t>
+            </a:r>
+            <a:endParaRPr lang="en-US" dirty="0"/>
+          </a:p>
+        </p:txBody>
+      </p:sp>
+    </p:spTree>
+    <p:extLst>
+      <p:ext uri="{BB962C8B-B14F-4D97-AF65-F5344CB8AC3E}">
+        <p14:creationId xmlns:p14="http://schemas.microsoft.com/office/powerpoint/2010/main" val="1234922879"/>
+      </p:ext>
+    </p:extLst>
+  </p:cSld>
+  <p:clrMapOvr>
+    <a:masterClrMapping/>
+  </p:clrMapOvr>
+</p:sld>
+</file>
+
+<file path=ppt/slides/slide2.xml><?xml version="1.0" encoding="utf-8"?>
+<p:sld xmlns:a="http://schemas.openxmlformats.org/drawingml/2006/main" xmlns:r="http://schemas.openxmlformats.org/officeDocument/2006/relationships" xmlns:p="http://schemas.openxmlformats.org/presentationml/2006/main">
+  <p:cSld>
+    <p:spTree>
+      <p:nvGrpSpPr>
+        <p:cNvPr id="1" name=""/>
+        <p:cNvGrpSpPr/>
+        <p:nvPr/>
+      </p:nvGrpSpPr>
+      <p:grpSpPr>
+        <a:xfrm>
+          <a:off x="0" y="0"/>
+          <a:ext cx="0" cy="0"/>
+          <a:chOff x="0" y="0"/>
+          <a:chExt cx="0" cy="0"/>
+        </a:xfrm>
+      </p:grpSpPr>
+      <p:sp>
+        <p:nvSpPr>
+          <p:cNvPr id="2" name="Rectangle 65">
+            <a:extLst>
+              <a:ext uri="{FF2B5EF4-FFF2-40B4-BE49-F238E27FC236}">
+                <a16:creationId xmlns:a16="http://schemas.microsoft.com/office/drawing/2014/main" id="{8A8FE290-465F-DF4B-8900-ABC2669F04F3}"/>
+              </a:ext>
+            </a:extLst>
+          </p:cNvPr>
+          <p:cNvSpPr/>
+          <p:nvPr/>
+        </p:nvSpPr>
+        <p:spPr>
+          <a:xfrm>
+            <a:off x="304800" y="1089733"/>
+            <a:ext cx="7580089" cy="4320467"/>
+          </a:xfrm>
+          <a:prstGeom prst="roundRect">
+            <a:avLst>
+              <a:gd name="adj" fmla="val 3484"/>
+            </a:avLst>
+          </a:prstGeom>
+          <a:solidFill>
+            <a:schemeClr val="accent1">
+              <a:lumMod val="20000"/>
+              <a:lumOff val="80000"/>
+            </a:schemeClr>
+          </a:solidFill>
+          <a:ln w="19050">
+            <a:noFill/>
+          </a:ln>
+          <a:effectLst/>
+        </p:spPr>
+        <p:style>
+          <a:lnRef idx="1">
+            <a:schemeClr val="accent2"/>
+          </a:lnRef>
+          <a:fillRef idx="2">
+            <a:schemeClr val="accent2"/>
+          </a:fillRef>
+          <a:effectRef idx="1">
+            <a:schemeClr val="accent2"/>
+          </a:effectRef>
+          <a:fontRef idx="minor">
+            <a:schemeClr val="dk1"/>
+          </a:fontRef>
+        </p:style>
+        <p:txBody>
+          <a:bodyPr rtlCol="0" anchor="t"/>
+          <a:lstStyle/>
+          <a:p>
+            <a:r>
+              <a:rPr lang="en-US" sz="1200" b="1" dirty="0">
+                <a:solidFill>
+                  <a:srgbClr val="0070C0"/>
+                </a:solidFill>
+              </a:rPr>
+              <a:t>Logic</a:t>
+            </a:r>
+            <a:endParaRPr lang="en-SG" sz="1200" b="1" dirty="0">
+              <a:solidFill>
+                <a:srgbClr val="0070C0"/>
+              </a:solidFill>
+            </a:endParaRPr>
+          </a:p>
+        </p:txBody>
+      </p:sp>
+      <p:sp>
+        <p:nvSpPr>
+          <p:cNvPr id="3" name="Rectangle 62">
+            <a:extLst>
+              <a:ext uri="{FF2B5EF4-FFF2-40B4-BE49-F238E27FC236}">
+                <a16:creationId xmlns:a16="http://schemas.microsoft.com/office/drawing/2014/main" id="{47536217-B74D-E34F-A796-2E545F63F901}"/>
+              </a:ext>
+            </a:extLst>
+          </p:cNvPr>
+          <p:cNvSpPr/>
+          <p:nvPr/>
+        </p:nvSpPr>
+        <p:spPr>
+          <a:xfrm>
+            <a:off x="540245" y="1725260"/>
+            <a:ext cx="1455629" cy="346760"/>
+          </a:xfrm>
+          <a:prstGeom prst="rect">
+            <a:avLst/>
+          </a:prstGeom>
+          <a:solidFill>
+            <a:srgbClr val="0070C0"/>
+          </a:solidFill>
+          <a:ln w="19050">
+            <a:solidFill>
+              <a:srgbClr val="0070C0"/>
+            </a:solidFill>
+          </a:ln>
+          <a:effectLst/>
+        </p:spPr>
+        <p:style>
+          <a:lnRef idx="1">
+            <a:schemeClr val="accent2"/>
+          </a:lnRef>
+          <a:fillRef idx="2">
+            <a:schemeClr val="accent2"/>
+          </a:fillRef>
+          <a:effectRef idx="1">
+            <a:schemeClr val="accent2"/>
+          </a:effectRef>
+          <a:fontRef idx="minor">
+            <a:schemeClr val="dk1"/>
+          </a:fontRef>
+        </p:style>
+        <p:txBody>
+          <a:bodyPr rtlCol="0" anchor="ctr"/>
+          <a:lstStyle/>
+          <a:p>
+            <a:pPr algn="ctr"/>
+            <a:r>
+              <a:rPr lang="en-US" sz="1600" dirty="0">
+                <a:solidFill>
+                  <a:schemeClr val="bg1"/>
+                </a:solidFill>
+              </a:rPr>
+              <a:t>:</a:t>
+            </a:r>
+            <a:r>
+              <a:rPr lang="en-US" sz="1600" dirty="0" err="1">
+                <a:solidFill>
+                  <a:schemeClr val="bg1"/>
+                </a:solidFill>
+              </a:rPr>
+              <a:t>LogicManager</a:t>
+            </a:r>
+            <a:endParaRPr lang="en-SG" sz="1600" dirty="0">
+              <a:solidFill>
+                <a:schemeClr val="bg1"/>
+              </a:solidFill>
+            </a:endParaRPr>
+          </a:p>
+        </p:txBody>
+      </p:sp>
+      <p:cxnSp>
+        <p:nvCxnSpPr>
+          <p:cNvPr id="4" name="Straight Connector 3">
+            <a:extLst>
+              <a:ext uri="{FF2B5EF4-FFF2-40B4-BE49-F238E27FC236}">
+                <a16:creationId xmlns:a16="http://schemas.microsoft.com/office/drawing/2014/main" id="{CF8EC7C1-EF3A-184E-A7C1-33E236F81F59}"/>
+              </a:ext>
+            </a:extLst>
+          </p:cNvPr>
+          <p:cNvCxnSpPr>
+            <a:cxnSpLocks/>
+          </p:cNvCxnSpPr>
+          <p:nvPr/>
+        </p:nvCxnSpPr>
+        <p:spPr>
+          <a:xfrm>
+            <a:off x="1268059" y="2088931"/>
+            <a:ext cx="0" cy="3321269"/>
+          </a:xfrm>
+          <a:prstGeom prst="line">
+            <a:avLst/>
+          </a:prstGeom>
+          <a:ln w="19050">
+            <a:solidFill>
+              <a:srgbClr val="0070C0"/>
+            </a:solidFill>
+            <a:prstDash val="sysDash"/>
+          </a:ln>
+          <a:effectLst/>
+        </p:spPr>
+        <p:style>
+          <a:lnRef idx="1">
+            <a:schemeClr val="accent1"/>
+          </a:lnRef>
+          <a:fillRef idx="2">
+            <a:schemeClr val="accent1"/>
+          </a:fillRef>
+          <a:effectRef idx="1">
+            <a:schemeClr val="accent1"/>
+          </a:effectRef>
+          <a:fontRef idx="minor">
+            <a:schemeClr val="dk1"/>
+          </a:fontRef>
+        </p:style>
+      </p:cxnSp>
+      <p:sp>
+        <p:nvSpPr>
+          <p:cNvPr id="5" name="Rectangle 4">
+            <a:extLst>
+              <a:ext uri="{FF2B5EF4-FFF2-40B4-BE49-F238E27FC236}">
+                <a16:creationId xmlns:a16="http://schemas.microsoft.com/office/drawing/2014/main" id="{69709CA1-E464-B745-8D9F-885533D27F6D}"/>
+              </a:ext>
+            </a:extLst>
+          </p:cNvPr>
+          <p:cNvSpPr/>
+          <p:nvPr/>
+        </p:nvSpPr>
+        <p:spPr>
+          <a:xfrm>
+            <a:off x="1196051" y="2439625"/>
+            <a:ext cx="152400" cy="2780287"/>
+          </a:xfrm>
+          <a:prstGeom prst="rect">
+            <a:avLst/>
+          </a:prstGeom>
+          <a:solidFill>
+            <a:srgbClr val="0070C0"/>
+          </a:solidFill>
+          <a:ln>
+            <a:solidFill>
+              <a:srgbClr val="0070C0"/>
+            </a:solidFill>
+          </a:ln>
+          <a:effectLst/>
+        </p:spPr>
+        <p:style>
+          <a:lnRef idx="1">
+            <a:schemeClr val="accent3"/>
+          </a:lnRef>
+          <a:fillRef idx="2">
+            <a:schemeClr val="accent3"/>
+          </a:fillRef>
+          <a:effectRef idx="1">
+            <a:schemeClr val="accent3"/>
+          </a:effectRef>
+          <a:fontRef idx="minor">
+            <a:schemeClr val="dk1"/>
+          </a:fontRef>
+        </p:style>
+        <p:txBody>
+          <a:bodyPr rtlCol="0" anchor="ctr"/>
+          <a:lstStyle/>
+          <a:p>
+            <a:pPr algn="ctr"/>
+            <a:endParaRPr lang="en-SG" sz="1400"/>
+          </a:p>
+        </p:txBody>
+      </p:sp>
+      <p:sp>
+        <p:nvSpPr>
+          <p:cNvPr id="6" name="Rectangle 62">
+            <a:extLst>
+              <a:ext uri="{FF2B5EF4-FFF2-40B4-BE49-F238E27FC236}">
+                <a16:creationId xmlns:a16="http://schemas.microsoft.com/office/drawing/2014/main" id="{60891814-0120-1847-AFB8-AA74BDEE5762}"/>
+              </a:ext>
+            </a:extLst>
+          </p:cNvPr>
+          <p:cNvSpPr/>
+          <p:nvPr/>
+        </p:nvSpPr>
+        <p:spPr>
+          <a:xfrm>
+            <a:off x="2220447" y="1725260"/>
+            <a:ext cx="1596938" cy="363671"/>
+          </a:xfrm>
+          <a:prstGeom prst="rect">
+            <a:avLst/>
+          </a:prstGeom>
+          <a:solidFill>
+            <a:srgbClr val="0070C0"/>
+          </a:solidFill>
+          <a:ln w="19050">
+            <a:solidFill>
+              <a:srgbClr val="0070C0"/>
+            </a:solidFill>
+          </a:ln>
+          <a:effectLst/>
+        </p:spPr>
+        <p:style>
+          <a:lnRef idx="1">
+            <a:schemeClr val="accent2"/>
+          </a:lnRef>
+          <a:fillRef idx="2">
+            <a:schemeClr val="accent2"/>
+          </a:fillRef>
+          <a:effectRef idx="1">
+            <a:schemeClr val="accent2"/>
+          </a:effectRef>
+          <a:fontRef idx="minor">
+            <a:schemeClr val="dk1"/>
+          </a:fontRef>
+        </p:style>
+        <p:txBody>
+          <a:bodyPr rtlCol="0" anchor="ctr"/>
+          <a:lstStyle/>
+          <a:p>
+            <a:pPr algn="ctr"/>
+            <a:r>
+              <a:rPr lang="en-US" sz="1600" dirty="0">
+                <a:solidFill>
+                  <a:schemeClr val="bg1"/>
+                </a:solidFill>
+              </a:rPr>
+              <a:t>:</a:t>
+            </a:r>
+            <a:r>
+              <a:rPr lang="en-US" sz="1600" dirty="0" err="1">
+                <a:solidFill>
+                  <a:schemeClr val="bg1"/>
+                </a:solidFill>
+              </a:rPr>
+              <a:t>ModsUniParser</a:t>
+            </a:r>
+            <a:endParaRPr lang="en-SG" sz="1600" dirty="0">
+              <a:solidFill>
+                <a:schemeClr val="bg1"/>
+              </a:solidFill>
+            </a:endParaRPr>
+          </a:p>
+        </p:txBody>
+      </p:sp>
+      <p:cxnSp>
+        <p:nvCxnSpPr>
+          <p:cNvPr id="7" name="Straight Connector 6">
+            <a:extLst>
+              <a:ext uri="{FF2B5EF4-FFF2-40B4-BE49-F238E27FC236}">
+                <a16:creationId xmlns:a16="http://schemas.microsoft.com/office/drawing/2014/main" id="{774BAC43-31A4-344B-8F0B-E56E3A85C0B6}"/>
+              </a:ext>
+            </a:extLst>
+          </p:cNvPr>
+          <p:cNvCxnSpPr>
+            <a:cxnSpLocks/>
+          </p:cNvCxnSpPr>
+          <p:nvPr/>
+        </p:nvCxnSpPr>
+        <p:spPr>
+          <a:xfrm>
+            <a:off x="3051799" y="1997532"/>
+            <a:ext cx="7669" cy="1841668"/>
+          </a:xfrm>
+          <a:prstGeom prst="line">
+            <a:avLst/>
+          </a:prstGeom>
+          <a:ln w="19050">
+            <a:solidFill>
+              <a:srgbClr val="0070C0"/>
+            </a:solidFill>
+            <a:prstDash val="sysDash"/>
+          </a:ln>
+          <a:effectLst/>
+        </p:spPr>
+        <p:style>
+          <a:lnRef idx="1">
+            <a:schemeClr val="accent1"/>
+          </a:lnRef>
+          <a:fillRef idx="2">
+            <a:schemeClr val="accent1"/>
+          </a:fillRef>
+          <a:effectRef idx="1">
+            <a:schemeClr val="accent1"/>
+          </a:effectRef>
+          <a:fontRef idx="minor">
+            <a:schemeClr val="dk1"/>
+          </a:fontRef>
+        </p:style>
+      </p:cxnSp>
+      <p:sp>
+        <p:nvSpPr>
+          <p:cNvPr id="8" name="Rectangle 7">
+            <a:extLst>
+              <a:ext uri="{FF2B5EF4-FFF2-40B4-BE49-F238E27FC236}">
+                <a16:creationId xmlns:a16="http://schemas.microsoft.com/office/drawing/2014/main" id="{EE1F2453-AD1D-014F-8DDF-87BB93167CD4}"/>
+              </a:ext>
+            </a:extLst>
+          </p:cNvPr>
+          <p:cNvSpPr/>
+          <p:nvPr/>
+        </p:nvSpPr>
+        <p:spPr>
+          <a:xfrm>
+            <a:off x="2979790" y="2550810"/>
+            <a:ext cx="174929" cy="1129459"/>
+          </a:xfrm>
+          <a:prstGeom prst="rect">
+            <a:avLst/>
+          </a:prstGeom>
+          <a:solidFill>
+            <a:srgbClr val="0070C0"/>
+          </a:solidFill>
+          <a:ln>
+            <a:solidFill>
+              <a:srgbClr val="0070C0"/>
+            </a:solidFill>
+          </a:ln>
+          <a:effectLst/>
+        </p:spPr>
+        <p:style>
+          <a:lnRef idx="1">
+            <a:schemeClr val="accent3"/>
+          </a:lnRef>
+          <a:fillRef idx="2">
+            <a:schemeClr val="accent3"/>
+          </a:fillRef>
+          <a:effectRef idx="1">
+            <a:schemeClr val="accent3"/>
+          </a:effectRef>
+          <a:fontRef idx="minor">
+            <a:schemeClr val="dk1"/>
+          </a:fontRef>
+        </p:style>
+        <p:txBody>
+          <a:bodyPr rtlCol="0" anchor="ctr"/>
+          <a:lstStyle/>
+          <a:p>
+            <a:pPr algn="ctr"/>
+            <a:endParaRPr lang="en-SG" sz="1400">
+              <a:solidFill>
+                <a:schemeClr val="dk1"/>
+              </a:solidFill>
+            </a:endParaRPr>
+          </a:p>
+        </p:txBody>
+      </p:sp>
+      <p:cxnSp>
+        <p:nvCxnSpPr>
+          <p:cNvPr id="10" name="Straight Connector 9">
+            <a:extLst>
+              <a:ext uri="{FF2B5EF4-FFF2-40B4-BE49-F238E27FC236}">
+                <a16:creationId xmlns:a16="http://schemas.microsoft.com/office/drawing/2014/main" id="{53E1189E-4434-0947-B5AB-32987D6F09E7}"/>
+              </a:ext>
+            </a:extLst>
+          </p:cNvPr>
+          <p:cNvCxnSpPr>
+            <a:cxnSpLocks/>
+            <a:stCxn id="11" idx="0"/>
+          </p:cNvCxnSpPr>
+          <p:nvPr/>
+        </p:nvCxnSpPr>
+        <p:spPr>
+          <a:xfrm flipH="1">
+            <a:off x="6089538" y="3205538"/>
+            <a:ext cx="1" cy="2014374"/>
+          </a:xfrm>
+          <a:prstGeom prst="line">
+            <a:avLst/>
+          </a:prstGeom>
+          <a:ln w="19050">
+            <a:solidFill>
+              <a:srgbClr val="0070C0"/>
+            </a:solidFill>
+            <a:prstDash val="sysDash"/>
+          </a:ln>
+          <a:effectLst/>
+        </p:spPr>
+        <p:style>
+          <a:lnRef idx="1">
+            <a:schemeClr val="accent1"/>
+          </a:lnRef>
+          <a:fillRef idx="2">
+            <a:schemeClr val="accent1"/>
+          </a:fillRef>
+          <a:effectRef idx="1">
+            <a:schemeClr val="accent1"/>
+          </a:effectRef>
+          <a:fontRef idx="minor">
+            <a:schemeClr val="dk1"/>
+          </a:fontRef>
+        </p:style>
+      </p:cxnSp>
+      <p:sp>
+        <p:nvSpPr>
+          <p:cNvPr id="11" name="Rectangle 10">
+            <a:extLst>
+              <a:ext uri="{FF2B5EF4-FFF2-40B4-BE49-F238E27FC236}">
+                <a16:creationId xmlns:a16="http://schemas.microsoft.com/office/drawing/2014/main" id="{56E14C4B-C6DD-E647-BEA6-CB2092214D62}"/>
+              </a:ext>
+            </a:extLst>
+          </p:cNvPr>
+          <p:cNvSpPr/>
+          <p:nvPr/>
+        </p:nvSpPr>
+        <p:spPr>
+          <a:xfrm>
+            <a:off x="6006877" y="3205538"/>
+            <a:ext cx="165323" cy="313645"/>
+          </a:xfrm>
+          <a:prstGeom prst="rect">
+            <a:avLst/>
+          </a:prstGeom>
+          <a:solidFill>
+            <a:srgbClr val="0070C0"/>
+          </a:solidFill>
+          <a:ln>
+            <a:solidFill>
+              <a:srgbClr val="0070C0"/>
+            </a:solidFill>
+          </a:ln>
+          <a:effectLst/>
+        </p:spPr>
+        <p:style>
+          <a:lnRef idx="1">
+            <a:schemeClr val="accent3"/>
+          </a:lnRef>
+          <a:fillRef idx="2">
+            <a:schemeClr val="accent3"/>
+          </a:fillRef>
+          <a:effectRef idx="1">
+            <a:schemeClr val="accent3"/>
+          </a:effectRef>
+          <a:fontRef idx="minor">
+            <a:schemeClr val="dk1"/>
+          </a:fontRef>
+        </p:style>
+        <p:txBody>
+          <a:bodyPr rtlCol="0" anchor="ctr"/>
+          <a:lstStyle/>
+          <a:p>
+            <a:pPr algn="ctr"/>
+            <a:endParaRPr lang="en-SG" sz="1400"/>
+          </a:p>
+        </p:txBody>
+      </p:sp>
+      <p:cxnSp>
+        <p:nvCxnSpPr>
+          <p:cNvPr id="12" name="Straight Arrow Connector 11">
+            <a:extLst>
+              <a:ext uri="{FF2B5EF4-FFF2-40B4-BE49-F238E27FC236}">
+                <a16:creationId xmlns:a16="http://schemas.microsoft.com/office/drawing/2014/main" id="{20C52E40-4E6E-C34B-9705-E91F2DD1A521}"/>
+              </a:ext>
+            </a:extLst>
+          </p:cNvPr>
+          <p:cNvCxnSpPr/>
+          <p:nvPr/>
+        </p:nvCxnSpPr>
+        <p:spPr>
+          <a:xfrm>
+            <a:off x="76200" y="2443313"/>
+            <a:ext cx="1119851" cy="0"/>
+          </a:xfrm>
+          <a:prstGeom prst="straightConnector1">
+            <a:avLst/>
+          </a:prstGeom>
+          <a:ln w="19050">
+            <a:solidFill>
+              <a:srgbClr val="00B050"/>
+            </a:solidFill>
+            <a:tailEnd type="arrow"/>
+          </a:ln>
+        </p:spPr>
+        <p:style>
+          <a:lnRef idx="1">
+            <a:schemeClr val="accent1"/>
+          </a:lnRef>
+          <a:fillRef idx="0">
+            <a:schemeClr val="accent1"/>
+          </a:fillRef>
+          <a:effectRef idx="0">
+            <a:schemeClr val="accent1"/>
+          </a:effectRef>
+          <a:fontRef idx="minor">
+            <a:schemeClr val="tx1"/>
+          </a:fontRef>
+        </p:style>
+      </p:cxnSp>
+      <p:cxnSp>
+        <p:nvCxnSpPr>
+          <p:cNvPr id="13" name="Straight Arrow Connector 12">
+            <a:extLst>
+              <a:ext uri="{FF2B5EF4-FFF2-40B4-BE49-F238E27FC236}">
+                <a16:creationId xmlns:a16="http://schemas.microsoft.com/office/drawing/2014/main" id="{528384A3-1524-7549-A545-A467EAD4ADCA}"/>
+              </a:ext>
+            </a:extLst>
+          </p:cNvPr>
+          <p:cNvCxnSpPr>
+            <a:cxnSpLocks/>
+          </p:cNvCxnSpPr>
+          <p:nvPr/>
+        </p:nvCxnSpPr>
+        <p:spPr>
+          <a:xfrm flipV="1">
+            <a:off x="1371600" y="2565368"/>
+            <a:ext cx="1631332" cy="25432"/>
+          </a:xfrm>
+          <a:prstGeom prst="straightConnector1">
+            <a:avLst/>
+          </a:prstGeom>
+          <a:ln w="19050">
+            <a:solidFill>
+              <a:srgbClr val="0070C0"/>
+            </a:solidFill>
+            <a:tailEnd type="arrow"/>
+          </a:ln>
+        </p:spPr>
+        <p:style>
+          <a:lnRef idx="1">
+            <a:schemeClr val="accent1"/>
+          </a:lnRef>
+          <a:fillRef idx="0">
+            <a:schemeClr val="accent1"/>
+          </a:fillRef>
+          <a:effectRef idx="0">
+            <a:schemeClr val="accent1"/>
+          </a:effectRef>
+          <a:fontRef idx="minor">
+            <a:schemeClr val="tx1"/>
+          </a:fontRef>
+        </p:style>
+      </p:cxnSp>
+      <p:cxnSp>
+        <p:nvCxnSpPr>
+          <p:cNvPr id="14" name="Straight Arrow Connector 13">
+            <a:extLst>
+              <a:ext uri="{FF2B5EF4-FFF2-40B4-BE49-F238E27FC236}">
+                <a16:creationId xmlns:a16="http://schemas.microsoft.com/office/drawing/2014/main" id="{F8CA97AC-9B6B-DE4D-8BEB-32B528C698D2}"/>
+              </a:ext>
+            </a:extLst>
+          </p:cNvPr>
+          <p:cNvCxnSpPr>
+            <a:cxnSpLocks/>
+          </p:cNvCxnSpPr>
+          <p:nvPr/>
+        </p:nvCxnSpPr>
+        <p:spPr>
+          <a:xfrm>
+            <a:off x="4769306" y="3249966"/>
+            <a:ext cx="741494" cy="0"/>
+          </a:xfrm>
+          <a:prstGeom prst="straightConnector1">
+            <a:avLst/>
+          </a:prstGeom>
+          <a:ln w="19050">
+            <a:solidFill>
+              <a:srgbClr val="0070C0"/>
+            </a:solidFill>
+            <a:tailEnd type="arrow"/>
+          </a:ln>
+        </p:spPr>
+        <p:style>
+          <a:lnRef idx="1">
+            <a:schemeClr val="accent1"/>
+          </a:lnRef>
+          <a:fillRef idx="0">
+            <a:schemeClr val="accent1"/>
+          </a:fillRef>
+          <a:effectRef idx="0">
+            <a:schemeClr val="accent1"/>
+          </a:effectRef>
+          <a:fontRef idx="minor">
+            <a:schemeClr val="tx1"/>
+          </a:fontRef>
+        </p:style>
+      </p:cxnSp>
+      <p:sp>
+        <p:nvSpPr>
+          <p:cNvPr id="15" name="TextBox 14">
+            <a:extLst>
+              <a:ext uri="{FF2B5EF4-FFF2-40B4-BE49-F238E27FC236}">
+                <a16:creationId xmlns:a16="http://schemas.microsoft.com/office/drawing/2014/main" id="{9FC7A70B-CF4B-B549-9351-C1DDBD4508C7}"/>
+              </a:ext>
+            </a:extLst>
+          </p:cNvPr>
+          <p:cNvSpPr txBox="1"/>
+          <p:nvPr/>
+        </p:nvSpPr>
+        <p:spPr>
+          <a:xfrm>
+            <a:off x="3262913" y="3953709"/>
+            <a:ext cx="855809" cy="215444"/>
+          </a:xfrm>
+          <a:prstGeom prst="rect">
+            <a:avLst/>
+          </a:prstGeom>
+          <a:noFill/>
+        </p:spPr>
+        <p:txBody>
+          <a:bodyPr wrap="square" lIns="0" tIns="0" rIns="0" bIns="0" rtlCol="0">
+            <a:spAutoFit/>
+          </a:bodyPr>
+          <a:lstStyle>
+            <a:defPPr>
+              <a:defRPr lang="en-US"/>
+            </a:defPPr>
+            <a:lvl1pPr algn="r">
+              <a:defRPr sz="1400">
+                <a:solidFill>
+                  <a:srgbClr val="0070C0"/>
+                </a:solidFill>
+              </a:defRPr>
+            </a:lvl1pPr>
+          </a:lstStyle>
+          <a:p>
+            <a:r>
+              <a:rPr lang="en-US" dirty="0"/>
+              <a:t>execute()</a:t>
+            </a:r>
+          </a:p>
+        </p:txBody>
+      </p:sp>
+      <p:cxnSp>
+        <p:nvCxnSpPr>
+          <p:cNvPr id="16" name="Straight Arrow Connector 15">
+            <a:extLst>
+              <a:ext uri="{FF2B5EF4-FFF2-40B4-BE49-F238E27FC236}">
+                <a16:creationId xmlns:a16="http://schemas.microsoft.com/office/drawing/2014/main" id="{FEC386DD-2C66-EC47-9818-20503EDF20D8}"/>
+              </a:ext>
+            </a:extLst>
+          </p:cNvPr>
+          <p:cNvCxnSpPr>
+            <a:cxnSpLocks/>
+            <a:endCxn id="11" idx="2"/>
+          </p:cNvCxnSpPr>
+          <p:nvPr/>
+        </p:nvCxnSpPr>
+        <p:spPr>
+          <a:xfrm>
+            <a:off x="4828510" y="3519183"/>
+            <a:ext cx="1261029" cy="0"/>
+          </a:xfrm>
+          <a:prstGeom prst="straightConnector1">
+            <a:avLst/>
+          </a:prstGeom>
+          <a:ln w="19050">
+            <a:solidFill>
+              <a:srgbClr val="0070C0"/>
+            </a:solidFill>
+            <a:prstDash val="sysDash"/>
+            <a:headEnd type="arrow" w="med" len="med"/>
+            <a:tailEnd type="none" w="med" len="med"/>
+          </a:ln>
+        </p:spPr>
+        <p:style>
+          <a:lnRef idx="1">
+            <a:schemeClr val="accent1"/>
+          </a:lnRef>
+          <a:fillRef idx="0">
+            <a:schemeClr val="accent1"/>
+          </a:fillRef>
+          <a:effectRef idx="0">
+            <a:schemeClr val="accent1"/>
+          </a:effectRef>
+          <a:fontRef idx="minor">
+            <a:schemeClr val="tx1"/>
+          </a:fontRef>
+        </p:style>
+      </p:cxnSp>
+      <p:cxnSp>
+        <p:nvCxnSpPr>
+          <p:cNvPr id="17" name="Straight Arrow Connector 16">
+            <a:extLst>
+              <a:ext uri="{FF2B5EF4-FFF2-40B4-BE49-F238E27FC236}">
+                <a16:creationId xmlns:a16="http://schemas.microsoft.com/office/drawing/2014/main" id="{762146A6-2493-1542-B7B5-F6C40A2F4236}"/>
+              </a:ext>
+            </a:extLst>
+          </p:cNvPr>
+          <p:cNvCxnSpPr/>
+          <p:nvPr/>
+        </p:nvCxnSpPr>
+        <p:spPr>
+          <a:xfrm flipV="1">
+            <a:off x="1365386" y="3671945"/>
+            <a:ext cx="1596514" cy="5378"/>
+          </a:xfrm>
+          <a:prstGeom prst="straightConnector1">
+            <a:avLst/>
+          </a:prstGeom>
+          <a:ln w="19050">
+            <a:solidFill>
+              <a:srgbClr val="0070C0"/>
+            </a:solidFill>
+            <a:prstDash val="sysDash"/>
+            <a:headEnd type="arrow" w="med" len="med"/>
+            <a:tailEnd type="none" w="med" len="med"/>
+          </a:ln>
+        </p:spPr>
+        <p:style>
+          <a:lnRef idx="1">
+            <a:schemeClr val="accent1"/>
+          </a:lnRef>
+          <a:fillRef idx="0">
+            <a:schemeClr val="accent1"/>
+          </a:fillRef>
+          <a:effectRef idx="0">
+            <a:schemeClr val="accent1"/>
+          </a:effectRef>
+          <a:fontRef idx="minor">
+            <a:schemeClr val="tx1"/>
+          </a:fontRef>
+        </p:style>
+      </p:cxnSp>
+      <p:sp>
+        <p:nvSpPr>
+          <p:cNvPr id="18" name="Rectangle 62">
+            <a:extLst>
+              <a:ext uri="{FF2B5EF4-FFF2-40B4-BE49-F238E27FC236}">
+                <a16:creationId xmlns:a16="http://schemas.microsoft.com/office/drawing/2014/main" id="{9DC5EEAA-49BE-B54E-8965-925F39AB3DD9}"/>
+              </a:ext>
+            </a:extLst>
+          </p:cNvPr>
+          <p:cNvSpPr/>
+          <p:nvPr/>
+        </p:nvSpPr>
+        <p:spPr>
+          <a:xfrm>
+            <a:off x="7961096" y="1790914"/>
+            <a:ext cx="1030504" cy="346760"/>
+          </a:xfrm>
+          <a:prstGeom prst="rect">
+            <a:avLst/>
+          </a:prstGeom>
+          <a:solidFill>
+            <a:srgbClr val="9933FF"/>
+          </a:solidFill>
+          <a:ln w="19050">
+            <a:solidFill>
+              <a:srgbClr val="6F75F7"/>
+            </a:solidFill>
+          </a:ln>
+          <a:effectLst/>
+        </p:spPr>
+        <p:style>
+          <a:lnRef idx="1">
+            <a:schemeClr val="accent2"/>
+          </a:lnRef>
+          <a:fillRef idx="2">
+            <a:schemeClr val="accent2"/>
+          </a:fillRef>
+          <a:effectRef idx="1">
+            <a:schemeClr val="accent2"/>
+          </a:effectRef>
+          <a:fontRef idx="minor">
+            <a:schemeClr val="dk1"/>
+          </a:fontRef>
+        </p:style>
+        <p:txBody>
+          <a:bodyPr rtlCol="0" anchor="ctr"/>
+          <a:lstStyle/>
+          <a:p>
+            <a:pPr algn="ctr"/>
+            <a:r>
+              <a:rPr lang="en-US" sz="1600" dirty="0">
+                <a:solidFill>
+                  <a:schemeClr val="bg1"/>
+                </a:solidFill>
+              </a:rPr>
+              <a:t>:Model</a:t>
+            </a:r>
+            <a:endParaRPr lang="en-SG" sz="1600" dirty="0">
+              <a:solidFill>
+                <a:schemeClr val="bg1"/>
+              </a:solidFill>
+            </a:endParaRPr>
+          </a:p>
+        </p:txBody>
+      </p:sp>
+      <p:cxnSp>
+        <p:nvCxnSpPr>
+          <p:cNvPr id="20" name="Straight Connector 19">
+            <a:extLst>
+              <a:ext uri="{FF2B5EF4-FFF2-40B4-BE49-F238E27FC236}">
+                <a16:creationId xmlns:a16="http://schemas.microsoft.com/office/drawing/2014/main" id="{BADA4253-24B2-C042-A98D-BA16EE4DFED1}"/>
+              </a:ext>
+            </a:extLst>
+          </p:cNvPr>
+          <p:cNvCxnSpPr/>
+          <p:nvPr/>
+        </p:nvCxnSpPr>
+        <p:spPr>
+          <a:xfrm>
+            <a:off x="8476348" y="2129572"/>
+            <a:ext cx="0" cy="2830598"/>
+          </a:xfrm>
+          <a:prstGeom prst="line">
+            <a:avLst/>
+          </a:prstGeom>
+          <a:ln w="19050">
+            <a:solidFill>
+              <a:srgbClr val="9933FF"/>
+            </a:solidFill>
+            <a:prstDash val="sysDash"/>
+          </a:ln>
+          <a:effectLst/>
+        </p:spPr>
+        <p:style>
+          <a:lnRef idx="1">
+            <a:schemeClr val="accent1"/>
+          </a:lnRef>
+          <a:fillRef idx="2">
+            <a:schemeClr val="accent1"/>
+          </a:fillRef>
+          <a:effectRef idx="1">
+            <a:schemeClr val="accent1"/>
+          </a:effectRef>
+          <a:fontRef idx="minor">
+            <a:schemeClr val="dk1"/>
+          </a:fontRef>
+        </p:style>
+      </p:cxnSp>
+      <p:sp>
+        <p:nvSpPr>
+          <p:cNvPr id="21" name="Rectangle 20">
+            <a:extLst>
+              <a:ext uri="{FF2B5EF4-FFF2-40B4-BE49-F238E27FC236}">
+                <a16:creationId xmlns:a16="http://schemas.microsoft.com/office/drawing/2014/main" id="{239AE6A2-9262-874D-9CBF-C4403EDB004B}"/>
+              </a:ext>
+            </a:extLst>
+          </p:cNvPr>
+          <p:cNvSpPr/>
+          <p:nvPr/>
+        </p:nvSpPr>
+        <p:spPr>
+          <a:xfrm>
+            <a:off x="8413876" y="4109611"/>
+            <a:ext cx="132114" cy="291642"/>
+          </a:xfrm>
+          <a:prstGeom prst="rect">
+            <a:avLst/>
+          </a:prstGeom>
+          <a:solidFill>
+            <a:srgbClr val="9933FF"/>
+          </a:solidFill>
+          <a:ln>
+            <a:solidFill>
+              <a:srgbClr val="6F75F7"/>
+            </a:solidFill>
+          </a:ln>
+          <a:effectLst/>
+        </p:spPr>
+        <p:style>
+          <a:lnRef idx="1">
+            <a:schemeClr val="accent3"/>
+          </a:lnRef>
+          <a:fillRef idx="2">
+            <a:schemeClr val="accent3"/>
+          </a:fillRef>
+          <a:effectRef idx="1">
+            <a:schemeClr val="accent3"/>
+          </a:effectRef>
+          <a:fontRef idx="minor">
+            <a:schemeClr val="dk1"/>
+          </a:fontRef>
+        </p:style>
+        <p:txBody>
+          <a:bodyPr rtlCol="0" anchor="ctr"/>
+          <a:lstStyle/>
+          <a:p>
+            <a:pPr algn="ctr"/>
+            <a:endParaRPr lang="en-SG" sz="1400">
+              <a:solidFill>
+                <a:schemeClr val="dk1"/>
+              </a:solidFill>
+            </a:endParaRPr>
+          </a:p>
+        </p:txBody>
+      </p:sp>
+      <p:cxnSp>
+        <p:nvCxnSpPr>
+          <p:cNvPr id="22" name="Straight Arrow Connector 21">
+            <a:extLst>
+              <a:ext uri="{FF2B5EF4-FFF2-40B4-BE49-F238E27FC236}">
+                <a16:creationId xmlns:a16="http://schemas.microsoft.com/office/drawing/2014/main" id="{E3A3BCF2-19EE-484A-B288-3D37E4E9A894}"/>
+              </a:ext>
+            </a:extLst>
+          </p:cNvPr>
+          <p:cNvCxnSpPr>
+            <a:cxnSpLocks/>
+          </p:cNvCxnSpPr>
+          <p:nvPr/>
+        </p:nvCxnSpPr>
+        <p:spPr>
+          <a:xfrm>
+            <a:off x="6116207" y="4109611"/>
+            <a:ext cx="2297669" cy="0"/>
+          </a:xfrm>
+          <a:prstGeom prst="straightConnector1">
+            <a:avLst/>
+          </a:prstGeom>
+          <a:ln w="19050">
+            <a:solidFill>
+              <a:srgbClr val="9933FF"/>
+            </a:solidFill>
+            <a:tailEnd type="arrow"/>
+          </a:ln>
+        </p:spPr>
+        <p:style>
+          <a:lnRef idx="1">
+            <a:schemeClr val="accent1"/>
+          </a:lnRef>
+          <a:fillRef idx="0">
+            <a:schemeClr val="accent1"/>
+          </a:fillRef>
+          <a:effectRef idx="0">
+            <a:schemeClr val="accent1"/>
+          </a:effectRef>
+          <a:fontRef idx="minor">
+            <a:schemeClr val="tx1"/>
+          </a:fontRef>
+        </p:style>
+      </p:cxnSp>
+      <p:cxnSp>
+        <p:nvCxnSpPr>
+          <p:cNvPr id="24" name="Straight Arrow Connector 23">
+            <a:extLst>
+              <a:ext uri="{FF2B5EF4-FFF2-40B4-BE49-F238E27FC236}">
+                <a16:creationId xmlns:a16="http://schemas.microsoft.com/office/drawing/2014/main" id="{1DD046B9-DCA6-7346-8DED-A5564AE341FE}"/>
+              </a:ext>
+            </a:extLst>
+          </p:cNvPr>
+          <p:cNvCxnSpPr>
+            <a:cxnSpLocks/>
+          </p:cNvCxnSpPr>
+          <p:nvPr/>
+        </p:nvCxnSpPr>
+        <p:spPr>
+          <a:xfrm>
+            <a:off x="1348451" y="5071754"/>
+            <a:ext cx="4823749" cy="0"/>
+          </a:xfrm>
+          <a:prstGeom prst="straightConnector1">
+            <a:avLst/>
+          </a:prstGeom>
+          <a:ln w="19050">
+            <a:solidFill>
+              <a:srgbClr val="0070C0"/>
+            </a:solidFill>
+            <a:prstDash val="sysDash"/>
+            <a:headEnd type="arrow" w="med" len="med"/>
+            <a:tailEnd type="none" w="med" len="med"/>
+          </a:ln>
+        </p:spPr>
+        <p:style>
+          <a:lnRef idx="1">
+            <a:schemeClr val="accent1"/>
+          </a:lnRef>
+          <a:fillRef idx="0">
+            <a:schemeClr val="accent1"/>
+          </a:fillRef>
+          <a:effectRef idx="0">
+            <a:schemeClr val="accent1"/>
+          </a:effectRef>
+          <a:fontRef idx="minor">
+            <a:schemeClr val="tx1"/>
+          </a:fontRef>
+        </p:style>
+      </p:cxnSp>
+      <p:sp>
+        <p:nvSpPr>
+          <p:cNvPr id="25" name="TextBox 24">
+            <a:extLst>
+              <a:ext uri="{FF2B5EF4-FFF2-40B4-BE49-F238E27FC236}">
+                <a16:creationId xmlns:a16="http://schemas.microsoft.com/office/drawing/2014/main" id="{82326C9C-7A2F-874F-BD87-0662419289ED}"/>
+              </a:ext>
+            </a:extLst>
+          </p:cNvPr>
+          <p:cNvSpPr txBox="1"/>
+          <p:nvPr/>
+        </p:nvSpPr>
+        <p:spPr>
+          <a:xfrm>
+            <a:off x="6192471" y="3866615"/>
+            <a:ext cx="1424846" cy="215444"/>
+          </a:xfrm>
+          <a:prstGeom prst="rect">
+            <a:avLst/>
+          </a:prstGeom>
+          <a:noFill/>
+        </p:spPr>
+        <p:txBody>
+          <a:bodyPr wrap="square" lIns="0" tIns="0" rIns="0" bIns="0" rtlCol="0">
+            <a:spAutoFit/>
+          </a:bodyPr>
+          <a:lstStyle>
+            <a:defPPr>
+              <a:defRPr lang="en-US"/>
+            </a:defPPr>
+            <a:lvl1pPr algn="r">
+              <a:defRPr sz="1400">
+                <a:solidFill>
+                  <a:srgbClr val="0070C0"/>
+                </a:solidFill>
+              </a:defRPr>
+            </a:lvl1pPr>
+          </a:lstStyle>
+          <a:p>
+            <a:r>
+              <a:rPr lang="en-US" dirty="0" err="1">
+                <a:solidFill>
+                  <a:srgbClr val="7030A0"/>
+                </a:solidFill>
+              </a:rPr>
+              <a:t>saveUserFile</a:t>
+            </a:r>
+            <a:r>
+              <a:rPr lang="en-US" dirty="0">
+                <a:solidFill>
+                  <a:srgbClr val="7030A0"/>
+                </a:solidFill>
+              </a:rPr>
+              <a:t>(…)</a:t>
+            </a:r>
+          </a:p>
+        </p:txBody>
+      </p:sp>
+      <p:sp>
+        <p:nvSpPr>
+          <p:cNvPr id="26" name="TextBox 25">
+            <a:extLst>
+              <a:ext uri="{FF2B5EF4-FFF2-40B4-BE49-F238E27FC236}">
+                <a16:creationId xmlns:a16="http://schemas.microsoft.com/office/drawing/2014/main" id="{3EE1B429-6ECB-1745-986B-2AE13C06AB32}"/>
+              </a:ext>
+            </a:extLst>
+          </p:cNvPr>
+          <p:cNvSpPr txBox="1"/>
+          <p:nvPr/>
+        </p:nvSpPr>
+        <p:spPr>
+          <a:xfrm>
+            <a:off x="1380402" y="2565521"/>
+            <a:ext cx="1538917" cy="369332"/>
+          </a:xfrm>
+          <a:prstGeom prst="rect">
+            <a:avLst/>
+          </a:prstGeom>
+          <a:noFill/>
+        </p:spPr>
+        <p:txBody>
+          <a:bodyPr wrap="square" lIns="0" tIns="0" rIns="0" bIns="0" rtlCol="0">
+            <a:spAutoFit/>
+          </a:bodyPr>
+          <a:lstStyle>
+            <a:defPPr>
+              <a:defRPr lang="en-US"/>
+            </a:defPPr>
+            <a:lvl1pPr algn="r">
+              <a:defRPr sz="1400">
+                <a:solidFill>
+                  <a:srgbClr val="0070C0"/>
+                </a:solidFill>
+              </a:defRPr>
+            </a:lvl1pPr>
+          </a:lstStyle>
+          <a:p>
+            <a:pPr algn="l"/>
+            <a:r>
+              <a:rPr lang="en-US" sz="1200" dirty="0" err="1"/>
+              <a:t>parseCommand</a:t>
+            </a:r>
+            <a:endParaRPr lang="en-US" sz="1200" dirty="0"/>
+          </a:p>
+          <a:p>
+            <a:pPr algn="l"/>
+            <a:r>
+              <a:rPr lang="en-US" sz="1200" dirty="0"/>
+              <a:t>(“save </a:t>
+            </a:r>
+            <a:r>
+              <a:rPr lang="en-US" sz="1200" dirty="0" err="1"/>
+              <a:t>sp</a:t>
+            </a:r>
+            <a:r>
+              <a:rPr lang="en-US" sz="1200" dirty="0"/>
+              <a:t>/</a:t>
+            </a:r>
+            <a:r>
+              <a:rPr lang="en-US" sz="1200" dirty="0" err="1"/>
+              <a:t>userdata.xml</a:t>
+            </a:r>
+            <a:r>
+              <a:rPr lang="en-US" sz="1200" dirty="0"/>
+              <a:t>”)</a:t>
+            </a:r>
+          </a:p>
+        </p:txBody>
+      </p:sp>
+      <p:sp>
+        <p:nvSpPr>
+          <p:cNvPr id="27" name="TextBox 26">
+            <a:extLst>
+              <a:ext uri="{FF2B5EF4-FFF2-40B4-BE49-F238E27FC236}">
+                <a16:creationId xmlns:a16="http://schemas.microsoft.com/office/drawing/2014/main" id="{3590E1B2-2F98-4F4C-A7AC-1DF759B863E5}"/>
+              </a:ext>
+            </a:extLst>
+          </p:cNvPr>
+          <p:cNvSpPr txBox="1"/>
+          <p:nvPr/>
+        </p:nvSpPr>
+        <p:spPr>
+          <a:xfrm>
+            <a:off x="3934644" y="4852448"/>
+            <a:ext cx="621216" cy="215444"/>
+          </a:xfrm>
+          <a:prstGeom prst="rect">
+            <a:avLst/>
+          </a:prstGeom>
+          <a:noFill/>
+        </p:spPr>
+        <p:txBody>
+          <a:bodyPr wrap="square" lIns="0" tIns="0" rIns="0" bIns="0" rtlCol="0">
+            <a:spAutoFit/>
+          </a:bodyPr>
+          <a:lstStyle>
+            <a:defPPr>
+              <a:defRPr lang="en-US"/>
+            </a:defPPr>
+            <a:lvl1pPr algn="r">
+              <a:defRPr sz="1400">
+                <a:solidFill>
+                  <a:srgbClr val="0070C0"/>
+                </a:solidFill>
+              </a:defRPr>
+            </a:lvl1pPr>
+          </a:lstStyle>
+          <a:p>
+            <a:r>
+              <a:rPr lang="en-US" dirty="0"/>
+              <a:t>result</a:t>
+            </a:r>
+          </a:p>
+        </p:txBody>
+      </p:sp>
+      <p:sp>
+        <p:nvSpPr>
+          <p:cNvPr id="28" name="TextBox 27">
+            <a:extLst>
+              <a:ext uri="{FF2B5EF4-FFF2-40B4-BE49-F238E27FC236}">
+                <a16:creationId xmlns:a16="http://schemas.microsoft.com/office/drawing/2014/main" id="{63D60BEE-00AD-404C-87B9-BA4C7C1AB327}"/>
+              </a:ext>
+            </a:extLst>
+          </p:cNvPr>
+          <p:cNvSpPr txBox="1"/>
+          <p:nvPr/>
+        </p:nvSpPr>
+        <p:spPr>
+          <a:xfrm>
+            <a:off x="295183" y="4967202"/>
+            <a:ext cx="762000" cy="215444"/>
+          </a:xfrm>
+          <a:prstGeom prst="rect">
+            <a:avLst/>
+          </a:prstGeom>
+          <a:noFill/>
+        </p:spPr>
+        <p:txBody>
+          <a:bodyPr wrap="square" lIns="0" tIns="0" rIns="0" bIns="0" rtlCol="0">
+            <a:spAutoFit/>
+          </a:bodyPr>
+          <a:lstStyle>
+            <a:defPPr>
+              <a:defRPr lang="en-US"/>
+            </a:defPPr>
+            <a:lvl1pPr algn="r">
+              <a:defRPr sz="1400">
+                <a:solidFill>
+                  <a:srgbClr val="0070C0"/>
+                </a:solidFill>
+              </a:defRPr>
+            </a:lvl1pPr>
+          </a:lstStyle>
+          <a:p>
+            <a:r>
+              <a:rPr lang="en-US" dirty="0"/>
+              <a:t>result</a:t>
+            </a:r>
+          </a:p>
+        </p:txBody>
+      </p:sp>
+      <p:sp>
+        <p:nvSpPr>
+          <p:cNvPr id="29" name="Rectangle 62">
+            <a:extLst>
+              <a:ext uri="{FF2B5EF4-FFF2-40B4-BE49-F238E27FC236}">
+                <a16:creationId xmlns:a16="http://schemas.microsoft.com/office/drawing/2014/main" id="{F58EFEDD-E067-6844-A0D8-960334F20EDD}"/>
+              </a:ext>
+            </a:extLst>
+          </p:cNvPr>
+          <p:cNvSpPr/>
+          <p:nvPr/>
+        </p:nvSpPr>
+        <p:spPr>
+          <a:xfrm>
+            <a:off x="6578839" y="4495800"/>
+            <a:ext cx="1160722" cy="338178"/>
+          </a:xfrm>
+          <a:prstGeom prst="rect">
+            <a:avLst/>
+          </a:prstGeom>
+          <a:solidFill>
+            <a:srgbClr val="0070C0"/>
+          </a:solidFill>
+          <a:ln w="19050">
+            <a:solidFill>
+              <a:srgbClr val="0070C0"/>
+            </a:solidFill>
+          </a:ln>
+          <a:effectLst/>
+        </p:spPr>
+        <p:style>
+          <a:lnRef idx="1">
+            <a:schemeClr val="accent2"/>
+          </a:lnRef>
+          <a:fillRef idx="2">
+            <a:schemeClr val="accent2"/>
+          </a:fillRef>
+          <a:effectRef idx="1">
+            <a:schemeClr val="accent2"/>
+          </a:effectRef>
+          <a:fontRef idx="minor">
+            <a:schemeClr val="dk1"/>
+          </a:fontRef>
+        </p:style>
+        <p:txBody>
+          <a:bodyPr rtlCol="0" anchor="ctr"/>
+          <a:lstStyle/>
+          <a:p>
+            <a:pPr algn="ctr"/>
+            <a:r>
+              <a:rPr lang="en-US" sz="1050" dirty="0" err="1">
+                <a:solidFill>
+                  <a:schemeClr val="bg1"/>
+                </a:solidFill>
+              </a:rPr>
+              <a:t>result:Command</a:t>
+            </a:r>
+            <a:endParaRPr lang="en-US" sz="1050" dirty="0">
+              <a:solidFill>
+                <a:schemeClr val="bg1"/>
+              </a:solidFill>
+            </a:endParaRPr>
+          </a:p>
+          <a:p>
+            <a:pPr algn="ctr"/>
+            <a:r>
+              <a:rPr lang="en-US" sz="1050" dirty="0">
+                <a:solidFill>
+                  <a:schemeClr val="bg1"/>
+                </a:solidFill>
+              </a:rPr>
+              <a:t>Result</a:t>
+            </a:r>
+            <a:endParaRPr lang="en-SG" sz="1050" dirty="0">
+              <a:solidFill>
+                <a:schemeClr val="bg1"/>
+              </a:solidFill>
+            </a:endParaRPr>
+          </a:p>
+        </p:txBody>
+      </p:sp>
+      <p:sp>
+        <p:nvSpPr>
+          <p:cNvPr id="30" name="Rectangle 29">
+            <a:extLst>
+              <a:ext uri="{FF2B5EF4-FFF2-40B4-BE49-F238E27FC236}">
+                <a16:creationId xmlns:a16="http://schemas.microsoft.com/office/drawing/2014/main" id="{9037BBEF-36DA-C742-99A8-6A27718EAA02}"/>
+              </a:ext>
+            </a:extLst>
+          </p:cNvPr>
+          <p:cNvSpPr/>
+          <p:nvPr/>
+        </p:nvSpPr>
+        <p:spPr>
+          <a:xfrm>
+            <a:off x="7063451" y="4814752"/>
+            <a:ext cx="152400" cy="171376"/>
+          </a:xfrm>
+          <a:prstGeom prst="rect">
+            <a:avLst/>
+          </a:prstGeom>
+          <a:solidFill>
+            <a:srgbClr val="0070C0"/>
+          </a:solidFill>
+          <a:ln>
+            <a:solidFill>
+              <a:srgbClr val="0070C0"/>
+            </a:solidFill>
+          </a:ln>
+          <a:effectLst/>
+        </p:spPr>
+        <p:style>
+          <a:lnRef idx="1">
+            <a:schemeClr val="accent3"/>
+          </a:lnRef>
+          <a:fillRef idx="2">
+            <a:schemeClr val="accent3"/>
+          </a:fillRef>
+          <a:effectRef idx="1">
+            <a:schemeClr val="accent3"/>
+          </a:effectRef>
+          <a:fontRef idx="minor">
+            <a:schemeClr val="dk1"/>
+          </a:fontRef>
+        </p:style>
+        <p:txBody>
+          <a:bodyPr rtlCol="0" anchor="ctr"/>
+          <a:lstStyle/>
+          <a:p>
+            <a:pPr algn="ctr"/>
+            <a:endParaRPr lang="en-SG" sz="1400"/>
+          </a:p>
+        </p:txBody>
+      </p:sp>
+      <p:cxnSp>
+        <p:nvCxnSpPr>
+          <p:cNvPr id="31" name="Straight Arrow Connector 30">
+            <a:extLst>
+              <a:ext uri="{FF2B5EF4-FFF2-40B4-BE49-F238E27FC236}">
+                <a16:creationId xmlns:a16="http://schemas.microsoft.com/office/drawing/2014/main" id="{A4F16D55-6544-E243-A903-5B442E1A16CB}"/>
+              </a:ext>
+            </a:extLst>
+          </p:cNvPr>
+          <p:cNvCxnSpPr>
+            <a:cxnSpLocks/>
+          </p:cNvCxnSpPr>
+          <p:nvPr/>
+        </p:nvCxnSpPr>
+        <p:spPr>
+          <a:xfrm>
+            <a:off x="6152011" y="4981137"/>
+            <a:ext cx="911440" cy="3328"/>
+          </a:xfrm>
+          <a:prstGeom prst="straightConnector1">
+            <a:avLst/>
+          </a:prstGeom>
+          <a:ln w="19050">
+            <a:solidFill>
+              <a:srgbClr val="0070C0"/>
+            </a:solidFill>
+            <a:prstDash val="sysDash"/>
+            <a:headEnd type="arrow" w="med" len="med"/>
+            <a:tailEnd type="none" w="med" len="med"/>
+          </a:ln>
+        </p:spPr>
+        <p:style>
+          <a:lnRef idx="1">
+            <a:schemeClr val="accent1"/>
+          </a:lnRef>
+          <a:fillRef idx="0">
+            <a:schemeClr val="accent1"/>
+          </a:fillRef>
+          <a:effectRef idx="0">
+            <a:schemeClr val="accent1"/>
+          </a:effectRef>
+          <a:fontRef idx="minor">
+            <a:schemeClr val="tx1"/>
+          </a:fontRef>
+        </p:style>
+      </p:cxnSp>
+      <p:sp>
+        <p:nvSpPr>
+          <p:cNvPr id="32" name="Rectangle 62">
+            <a:extLst>
+              <a:ext uri="{FF2B5EF4-FFF2-40B4-BE49-F238E27FC236}">
+                <a16:creationId xmlns:a16="http://schemas.microsoft.com/office/drawing/2014/main" id="{7E535B44-B409-6845-89F2-5D4D2AA87098}"/>
+              </a:ext>
+            </a:extLst>
+          </p:cNvPr>
+          <p:cNvSpPr/>
+          <p:nvPr/>
+        </p:nvSpPr>
+        <p:spPr>
+          <a:xfrm>
+            <a:off x="3942067" y="2456499"/>
+            <a:ext cx="1541448" cy="362901"/>
+          </a:xfrm>
+          <a:prstGeom prst="rect">
+            <a:avLst/>
+          </a:prstGeom>
+          <a:solidFill>
+            <a:srgbClr val="0070C0"/>
+          </a:solidFill>
+          <a:ln w="19050">
+            <a:solidFill>
+              <a:srgbClr val="0070C0"/>
+            </a:solidFill>
+          </a:ln>
+          <a:effectLst/>
+        </p:spPr>
+        <p:style>
+          <a:lnRef idx="1">
+            <a:schemeClr val="accent2"/>
+          </a:lnRef>
+          <a:fillRef idx="2">
+            <a:schemeClr val="accent2"/>
+          </a:fillRef>
+          <a:effectRef idx="1">
+            <a:schemeClr val="accent2"/>
+          </a:effectRef>
+          <a:fontRef idx="minor">
+            <a:schemeClr val="dk1"/>
+          </a:fontRef>
+        </p:style>
+        <p:txBody>
+          <a:bodyPr rtlCol="0" anchor="ctr"/>
+          <a:lstStyle/>
+          <a:p>
+            <a:pPr algn="ctr"/>
+            <a:r>
+              <a:rPr lang="en-US" sz="1200" dirty="0">
+                <a:solidFill>
+                  <a:schemeClr val="bg1"/>
+                </a:solidFill>
+              </a:rPr>
+              <a:t>:</a:t>
+            </a:r>
+            <a:r>
+              <a:rPr lang="en-US" sz="1200" dirty="0" err="1">
+                <a:solidFill>
+                  <a:schemeClr val="bg1"/>
+                </a:solidFill>
+              </a:rPr>
+              <a:t>SaveCommandParser</a:t>
+            </a:r>
+            <a:endParaRPr lang="en-SG" sz="1200" dirty="0">
+              <a:solidFill>
+                <a:schemeClr val="bg1"/>
+              </a:solidFill>
+            </a:endParaRPr>
+          </a:p>
+        </p:txBody>
+      </p:sp>
+      <p:cxnSp>
+        <p:nvCxnSpPr>
+          <p:cNvPr id="33" name="Straight Arrow Connector 32">
+            <a:extLst>
+              <a:ext uri="{FF2B5EF4-FFF2-40B4-BE49-F238E27FC236}">
+                <a16:creationId xmlns:a16="http://schemas.microsoft.com/office/drawing/2014/main" id="{4EBA23C1-0278-ED42-9645-DEF321897EB5}"/>
+              </a:ext>
+            </a:extLst>
+          </p:cNvPr>
+          <p:cNvCxnSpPr>
+            <a:cxnSpLocks/>
+          </p:cNvCxnSpPr>
+          <p:nvPr/>
+        </p:nvCxnSpPr>
+        <p:spPr>
+          <a:xfrm flipV="1">
+            <a:off x="3048000" y="3159434"/>
+            <a:ext cx="1596697" cy="3080"/>
+          </a:xfrm>
+          <a:prstGeom prst="straightConnector1">
+            <a:avLst/>
+          </a:prstGeom>
+          <a:ln w="19050">
+            <a:headEnd type="none" w="med" len="med"/>
+            <a:tailEnd type="arrow" w="med" len="med"/>
+          </a:ln>
+        </p:spPr>
+        <p:style>
+          <a:lnRef idx="1">
+            <a:schemeClr val="accent1"/>
+          </a:lnRef>
+          <a:fillRef idx="0">
+            <a:schemeClr val="accent1"/>
+          </a:fillRef>
+          <a:effectRef idx="0">
+            <a:schemeClr val="accent1"/>
+          </a:effectRef>
+          <a:fontRef idx="minor">
+            <a:schemeClr val="tx1"/>
+          </a:fontRef>
+        </p:style>
+      </p:cxnSp>
+      <p:sp>
+        <p:nvSpPr>
+          <p:cNvPr id="34" name="Rectangle 33">
+            <a:extLst>
+              <a:ext uri="{FF2B5EF4-FFF2-40B4-BE49-F238E27FC236}">
+                <a16:creationId xmlns:a16="http://schemas.microsoft.com/office/drawing/2014/main" id="{CD9719B9-A83B-944F-BC32-A6571C524D47}"/>
+              </a:ext>
+            </a:extLst>
+          </p:cNvPr>
+          <p:cNvSpPr/>
+          <p:nvPr/>
+        </p:nvSpPr>
+        <p:spPr>
+          <a:xfrm>
+            <a:off x="4622667" y="2818026"/>
+            <a:ext cx="205843" cy="190647"/>
+          </a:xfrm>
+          <a:prstGeom prst="rect">
+            <a:avLst/>
+          </a:prstGeom>
+          <a:solidFill>
+            <a:srgbClr val="0070C0"/>
+          </a:solidFill>
+          <a:ln>
+            <a:solidFill>
+              <a:srgbClr val="0070C0"/>
+            </a:solidFill>
+          </a:ln>
+          <a:effectLst/>
+        </p:spPr>
+        <p:style>
+          <a:lnRef idx="1">
+            <a:schemeClr val="accent3"/>
+          </a:lnRef>
+          <a:fillRef idx="2">
+            <a:schemeClr val="accent3"/>
+          </a:fillRef>
+          <a:effectRef idx="1">
+            <a:schemeClr val="accent3"/>
+          </a:effectRef>
+          <a:fontRef idx="minor">
+            <a:schemeClr val="dk1"/>
+          </a:fontRef>
+        </p:style>
+        <p:txBody>
+          <a:bodyPr rtlCol="0" anchor="ctr"/>
+          <a:lstStyle/>
+          <a:p>
+            <a:pPr algn="ctr"/>
+            <a:endParaRPr lang="en-SG" sz="1400"/>
+          </a:p>
+        </p:txBody>
+      </p:sp>
+      <p:cxnSp>
+        <p:nvCxnSpPr>
+          <p:cNvPr id="35" name="Straight Connector 34">
+            <a:extLst>
+              <a:ext uri="{FF2B5EF4-FFF2-40B4-BE49-F238E27FC236}">
+                <a16:creationId xmlns:a16="http://schemas.microsoft.com/office/drawing/2014/main" id="{542B0C39-C0C9-C34C-A704-58DDDAB9DD1A}"/>
+              </a:ext>
+            </a:extLst>
+          </p:cNvPr>
+          <p:cNvCxnSpPr>
+            <a:cxnSpLocks/>
+            <a:stCxn id="34" idx="0"/>
+          </p:cNvCxnSpPr>
+          <p:nvPr/>
+        </p:nvCxnSpPr>
+        <p:spPr>
+          <a:xfrm>
+            <a:off x="4725589" y="2818026"/>
+            <a:ext cx="7144" cy="909383"/>
+          </a:xfrm>
+          <a:prstGeom prst="line">
+            <a:avLst/>
+          </a:prstGeom>
+          <a:ln w="19050">
+            <a:solidFill>
+              <a:srgbClr val="0070C0"/>
+            </a:solidFill>
+            <a:prstDash val="sysDash"/>
+          </a:ln>
+          <a:effectLst/>
+        </p:spPr>
+        <p:style>
+          <a:lnRef idx="1">
+            <a:schemeClr val="accent1"/>
+          </a:lnRef>
+          <a:fillRef idx="2">
+            <a:schemeClr val="accent1"/>
+          </a:fillRef>
+          <a:effectRef idx="1">
+            <a:schemeClr val="accent1"/>
+          </a:effectRef>
+          <a:fontRef idx="minor">
+            <a:schemeClr val="dk1"/>
+          </a:fontRef>
+        </p:style>
+      </p:cxnSp>
+      <p:sp>
+        <p:nvSpPr>
+          <p:cNvPr id="36" name="Rectangle 35">
+            <a:extLst>
+              <a:ext uri="{FF2B5EF4-FFF2-40B4-BE49-F238E27FC236}">
+                <a16:creationId xmlns:a16="http://schemas.microsoft.com/office/drawing/2014/main" id="{76F36F92-4B66-FB48-BE7A-9F175CAA418F}"/>
+              </a:ext>
+            </a:extLst>
+          </p:cNvPr>
+          <p:cNvSpPr/>
+          <p:nvPr/>
+        </p:nvSpPr>
+        <p:spPr>
+          <a:xfrm>
+            <a:off x="4629813" y="3156782"/>
+            <a:ext cx="198698" cy="433463"/>
+          </a:xfrm>
+          <a:prstGeom prst="rect">
+            <a:avLst/>
+          </a:prstGeom>
+          <a:solidFill>
+            <a:srgbClr val="0070C0"/>
+          </a:solidFill>
+          <a:ln>
+            <a:solidFill>
+              <a:srgbClr val="0070C0"/>
+            </a:solidFill>
+          </a:ln>
+          <a:effectLst/>
+        </p:spPr>
+        <p:style>
+          <a:lnRef idx="1">
+            <a:schemeClr val="accent3"/>
+          </a:lnRef>
+          <a:fillRef idx="2">
+            <a:schemeClr val="accent3"/>
+          </a:fillRef>
+          <a:effectRef idx="1">
+            <a:schemeClr val="accent3"/>
+          </a:effectRef>
+          <a:fontRef idx="minor">
+            <a:schemeClr val="dk1"/>
+          </a:fontRef>
+        </p:style>
+        <p:txBody>
+          <a:bodyPr rtlCol="0" anchor="ctr"/>
+          <a:lstStyle/>
+          <a:p>
+            <a:pPr algn="ctr"/>
+            <a:endParaRPr lang="en-SG" sz="1400"/>
+          </a:p>
+        </p:txBody>
+      </p:sp>
+      <p:cxnSp>
+        <p:nvCxnSpPr>
+          <p:cNvPr id="37" name="Straight Arrow Connector 36">
+            <a:extLst>
+              <a:ext uri="{FF2B5EF4-FFF2-40B4-BE49-F238E27FC236}">
+                <a16:creationId xmlns:a16="http://schemas.microsoft.com/office/drawing/2014/main" id="{8CA44145-D86D-5441-8D0E-38CC8FFDDA4E}"/>
+              </a:ext>
+            </a:extLst>
+          </p:cNvPr>
+          <p:cNvCxnSpPr>
+            <a:cxnSpLocks/>
+          </p:cNvCxnSpPr>
+          <p:nvPr/>
+        </p:nvCxnSpPr>
+        <p:spPr>
+          <a:xfrm>
+            <a:off x="3129200" y="3605885"/>
+            <a:ext cx="1707082" cy="0"/>
+          </a:xfrm>
+          <a:prstGeom prst="straightConnector1">
+            <a:avLst/>
+          </a:prstGeom>
+          <a:ln w="19050">
+            <a:solidFill>
+              <a:srgbClr val="0070C0"/>
+            </a:solidFill>
+            <a:prstDash val="sysDash"/>
+            <a:headEnd type="arrow" w="med" len="med"/>
+            <a:tailEnd type="none" w="med" len="med"/>
+          </a:ln>
+        </p:spPr>
+        <p:style>
+          <a:lnRef idx="1">
+            <a:schemeClr val="accent1"/>
+          </a:lnRef>
+          <a:fillRef idx="0">
+            <a:schemeClr val="accent1"/>
+          </a:fillRef>
+          <a:effectRef idx="0">
+            <a:schemeClr val="accent1"/>
+          </a:effectRef>
+          <a:fontRef idx="minor">
+            <a:schemeClr val="tx1"/>
+          </a:fontRef>
+        </p:style>
+      </p:cxnSp>
+      <p:cxnSp>
+        <p:nvCxnSpPr>
+          <p:cNvPr id="38" name="Straight Arrow Connector 37">
+            <a:extLst>
+              <a:ext uri="{FF2B5EF4-FFF2-40B4-BE49-F238E27FC236}">
+                <a16:creationId xmlns:a16="http://schemas.microsoft.com/office/drawing/2014/main" id="{ADCBF3FF-A630-034B-88CE-15B7089CDBA7}"/>
+              </a:ext>
+            </a:extLst>
+          </p:cNvPr>
+          <p:cNvCxnSpPr>
+            <a:cxnSpLocks/>
+          </p:cNvCxnSpPr>
+          <p:nvPr/>
+        </p:nvCxnSpPr>
+        <p:spPr>
+          <a:xfrm>
+            <a:off x="6019800" y="4648200"/>
+            <a:ext cx="546708" cy="1966"/>
+          </a:xfrm>
+          <a:prstGeom prst="straightConnector1">
+            <a:avLst/>
+          </a:prstGeom>
+          <a:ln w="19050">
+            <a:headEnd type="none" w="med" len="med"/>
+            <a:tailEnd type="arrow" w="med" len="med"/>
+          </a:ln>
+        </p:spPr>
+        <p:style>
+          <a:lnRef idx="1">
+            <a:schemeClr val="accent1"/>
+          </a:lnRef>
+          <a:fillRef idx="0">
+            <a:schemeClr val="accent1"/>
+          </a:fillRef>
+          <a:effectRef idx="0">
+            <a:schemeClr val="accent1"/>
+          </a:effectRef>
+          <a:fontRef idx="minor">
+            <a:schemeClr val="tx1"/>
+          </a:fontRef>
+        </p:style>
+      </p:cxnSp>
+      <p:cxnSp>
+        <p:nvCxnSpPr>
+          <p:cNvPr id="39" name="Straight Arrow Connector 38">
+            <a:extLst>
+              <a:ext uri="{FF2B5EF4-FFF2-40B4-BE49-F238E27FC236}">
+                <a16:creationId xmlns:a16="http://schemas.microsoft.com/office/drawing/2014/main" id="{B6A280C3-1946-A24C-B56F-A261A22B8760}"/>
+              </a:ext>
+            </a:extLst>
+          </p:cNvPr>
+          <p:cNvCxnSpPr>
+            <a:cxnSpLocks/>
+          </p:cNvCxnSpPr>
+          <p:nvPr/>
+        </p:nvCxnSpPr>
+        <p:spPr>
+          <a:xfrm>
+            <a:off x="3129200" y="2663565"/>
+            <a:ext cx="812866" cy="3435"/>
+          </a:xfrm>
+          <a:prstGeom prst="straightConnector1">
+            <a:avLst/>
+          </a:prstGeom>
+          <a:ln w="19050">
+            <a:solidFill>
+              <a:srgbClr val="0070C0"/>
+            </a:solidFill>
+            <a:tailEnd type="arrow"/>
+          </a:ln>
+        </p:spPr>
+        <p:style>
+          <a:lnRef idx="1">
+            <a:schemeClr val="accent1"/>
+          </a:lnRef>
+          <a:fillRef idx="0">
+            <a:schemeClr val="accent1"/>
+          </a:fillRef>
+          <a:effectRef idx="0">
+            <a:schemeClr val="accent1"/>
+          </a:effectRef>
+          <a:fontRef idx="minor">
+            <a:schemeClr val="tx1"/>
+          </a:fontRef>
+        </p:style>
+      </p:cxnSp>
+      <p:cxnSp>
+        <p:nvCxnSpPr>
+          <p:cNvPr id="40" name="Straight Arrow Connector 39">
+            <a:extLst>
+              <a:ext uri="{FF2B5EF4-FFF2-40B4-BE49-F238E27FC236}">
+                <a16:creationId xmlns:a16="http://schemas.microsoft.com/office/drawing/2014/main" id="{9F6547B2-AC0F-EA47-8659-40CFC6CDCE0E}"/>
+              </a:ext>
+            </a:extLst>
+          </p:cNvPr>
+          <p:cNvCxnSpPr>
+            <a:cxnSpLocks/>
+          </p:cNvCxnSpPr>
+          <p:nvPr/>
+        </p:nvCxnSpPr>
+        <p:spPr>
+          <a:xfrm>
+            <a:off x="3129200" y="3008673"/>
+            <a:ext cx="1640106" cy="0"/>
+          </a:xfrm>
+          <a:prstGeom prst="straightConnector1">
+            <a:avLst/>
+          </a:prstGeom>
+          <a:ln w="19050">
+            <a:solidFill>
+              <a:srgbClr val="0070C0"/>
+            </a:solidFill>
+            <a:prstDash val="sysDash"/>
+            <a:headEnd type="arrow" w="med" len="med"/>
+            <a:tailEnd type="none" w="med" len="med"/>
+          </a:ln>
+        </p:spPr>
+        <p:style>
+          <a:lnRef idx="1">
+            <a:schemeClr val="accent1"/>
+          </a:lnRef>
+          <a:fillRef idx="0">
+            <a:schemeClr val="accent1"/>
+          </a:fillRef>
+          <a:effectRef idx="0">
+            <a:schemeClr val="accent1"/>
+          </a:effectRef>
+          <a:fontRef idx="minor">
+            <a:schemeClr val="tx1"/>
+          </a:fontRef>
+        </p:style>
+      </p:cxnSp>
+      <p:sp>
+        <p:nvSpPr>
+          <p:cNvPr id="41" name="TextBox 40">
+            <a:extLst>
+              <a:ext uri="{FF2B5EF4-FFF2-40B4-BE49-F238E27FC236}">
+                <a16:creationId xmlns:a16="http://schemas.microsoft.com/office/drawing/2014/main" id="{6852F537-D88E-3146-8D2C-E25FE1328EDB}"/>
+              </a:ext>
+            </a:extLst>
+          </p:cNvPr>
+          <p:cNvSpPr txBox="1"/>
+          <p:nvPr/>
+        </p:nvSpPr>
+        <p:spPr>
+          <a:xfrm>
+            <a:off x="2971800" y="3200400"/>
+            <a:ext cx="1609145" cy="161583"/>
+          </a:xfrm>
+          <a:prstGeom prst="rect">
+            <a:avLst/>
+          </a:prstGeom>
+          <a:noFill/>
+        </p:spPr>
+        <p:txBody>
+          <a:bodyPr wrap="square" lIns="0" tIns="0" rIns="0" bIns="0" rtlCol="0">
+            <a:spAutoFit/>
+          </a:bodyPr>
+          <a:lstStyle>
+            <a:defPPr>
+              <a:defRPr lang="en-US"/>
+            </a:defPPr>
+            <a:lvl1pPr algn="r">
+              <a:defRPr sz="1400">
+                <a:solidFill>
+                  <a:srgbClr val="0070C0"/>
+                </a:solidFill>
+              </a:defRPr>
+            </a:lvl1pPr>
+          </a:lstStyle>
+          <a:p>
+            <a:r>
+              <a:rPr lang="en-US" sz="1050" dirty="0"/>
+              <a:t>parse (“</a:t>
+            </a:r>
+            <a:r>
+              <a:rPr lang="en-US" sz="1050" dirty="0" err="1"/>
+              <a:t>sp</a:t>
+            </a:r>
+            <a:r>
+              <a:rPr lang="en-US" sz="1050" dirty="0"/>
+              <a:t>/</a:t>
+            </a:r>
+            <a:r>
+              <a:rPr lang="en-US" sz="1050" dirty="0" err="1"/>
+              <a:t>userdata.xml</a:t>
+            </a:r>
+            <a:r>
+              <a:rPr lang="en-US" sz="1050" dirty="0"/>
+              <a:t>”)</a:t>
+            </a:r>
+          </a:p>
+        </p:txBody>
+      </p:sp>
+      <p:pic>
+        <p:nvPicPr>
+          <p:cNvPr id="42" name="Graphic 41" descr="Close">
+            <a:extLst>
+              <a:ext uri="{FF2B5EF4-FFF2-40B4-BE49-F238E27FC236}">
+                <a16:creationId xmlns:a16="http://schemas.microsoft.com/office/drawing/2014/main" id="{51B43B21-9CFA-9D44-AD0D-FC704D789EA2}"/>
+              </a:ext>
+            </a:extLst>
+          </p:cNvPr>
+          <p:cNvPicPr>
+            <a:picLocks noChangeAspect="1"/>
+          </p:cNvPicPr>
+          <p:nvPr/>
+        </p:nvPicPr>
+        <p:blipFill>
+          <a:blip r:embed="rId2">
+            <a:extLst>
+              <a:ext uri="{28A0092B-C50C-407E-A947-70E740481C1C}">
+                <a14:useLocalDpi xmlns:a14="http://schemas.microsoft.com/office/drawing/2010/main" val="0"/>
+              </a:ext>
+              <a:ext uri="{96DAC541-7B7A-43D3-8B79-37D633B846F1}">
+                <asvg:svgBlip xmlns:asvg="http://schemas.microsoft.com/office/drawing/2016/SVG/main" r:embed="rId3"/>
+              </a:ext>
+            </a:extLst>
+          </a:blip>
+          <a:stretch>
+            <a:fillRect/>
+          </a:stretch>
+        </p:blipFill>
+        <p:spPr>
+          <a:xfrm>
+            <a:off x="4609533" y="3639800"/>
+            <a:ext cx="246400" cy="246400"/>
+          </a:xfrm>
+          <a:prstGeom prst="rect">
+            <a:avLst/>
+          </a:prstGeom>
+        </p:spPr>
+      </p:pic>
+      <p:cxnSp>
+        <p:nvCxnSpPr>
+          <p:cNvPr id="46" name="Straight Arrow Connector 45">
+            <a:extLst>
+              <a:ext uri="{FF2B5EF4-FFF2-40B4-BE49-F238E27FC236}">
+                <a16:creationId xmlns:a16="http://schemas.microsoft.com/office/drawing/2014/main" id="{CEB8E53E-0E97-7F43-A549-AF51379A454F}"/>
+              </a:ext>
+            </a:extLst>
+          </p:cNvPr>
+          <p:cNvCxnSpPr>
+            <a:cxnSpLocks/>
+          </p:cNvCxnSpPr>
+          <p:nvPr/>
+        </p:nvCxnSpPr>
+        <p:spPr>
+          <a:xfrm>
+            <a:off x="6153264" y="4401253"/>
+            <a:ext cx="2297669" cy="0"/>
+          </a:xfrm>
+          <a:prstGeom prst="straightConnector1">
+            <a:avLst/>
+          </a:prstGeom>
+          <a:ln w="19050">
+            <a:solidFill>
+              <a:srgbClr val="9933FF"/>
+            </a:solidFill>
+            <a:prstDash val="sysDash"/>
+            <a:headEnd type="arrow" w="med" len="med"/>
+            <a:tailEnd type="none" w="med" len="med"/>
+          </a:ln>
+        </p:spPr>
+        <p:style>
+          <a:lnRef idx="1">
+            <a:schemeClr val="accent1"/>
+          </a:lnRef>
+          <a:fillRef idx="0">
+            <a:schemeClr val="accent1"/>
+          </a:fillRef>
+          <a:effectRef idx="0">
+            <a:schemeClr val="accent1"/>
+          </a:effectRef>
+          <a:fontRef idx="minor">
+            <a:schemeClr val="tx1"/>
+          </a:fontRef>
+        </p:style>
+      </p:cxnSp>
+      <p:cxnSp>
+        <p:nvCxnSpPr>
+          <p:cNvPr id="49" name="Straight Arrow Connector 48">
+            <a:extLst>
+              <a:ext uri="{FF2B5EF4-FFF2-40B4-BE49-F238E27FC236}">
+                <a16:creationId xmlns:a16="http://schemas.microsoft.com/office/drawing/2014/main" id="{3BE8E052-7328-3346-8CC5-0153CE2E466B}"/>
+              </a:ext>
+            </a:extLst>
+          </p:cNvPr>
+          <p:cNvCxnSpPr>
+            <a:cxnSpLocks/>
+          </p:cNvCxnSpPr>
+          <p:nvPr/>
+        </p:nvCxnSpPr>
+        <p:spPr>
+          <a:xfrm flipH="1">
+            <a:off x="76200" y="5219912"/>
+            <a:ext cx="1119851" cy="0"/>
+          </a:xfrm>
+          <a:prstGeom prst="straightConnector1">
+            <a:avLst/>
+          </a:prstGeom>
+          <a:ln w="19050">
+            <a:solidFill>
+              <a:srgbClr val="00B050"/>
+            </a:solidFill>
+            <a:prstDash val="sysDash"/>
+            <a:tailEnd type="arrow"/>
+          </a:ln>
+        </p:spPr>
+        <p:style>
+          <a:lnRef idx="1">
+            <a:schemeClr val="accent1"/>
+          </a:lnRef>
+          <a:fillRef idx="0">
+            <a:schemeClr val="accent1"/>
+          </a:fillRef>
+          <a:effectRef idx="0">
+            <a:schemeClr val="accent1"/>
+          </a:effectRef>
+          <a:fontRef idx="minor">
+            <a:schemeClr val="tx1"/>
+          </a:fontRef>
+        </p:style>
+      </p:cxnSp>
+      <p:pic>
+        <p:nvPicPr>
+          <p:cNvPr id="67" name="Graphic 66" descr="Close">
+            <a:extLst>
+              <a:ext uri="{FF2B5EF4-FFF2-40B4-BE49-F238E27FC236}">
+                <a16:creationId xmlns:a16="http://schemas.microsoft.com/office/drawing/2014/main" id="{0F4A0785-F05A-4845-9486-8ACAA03CF340}"/>
+              </a:ext>
+            </a:extLst>
+          </p:cNvPr>
+          <p:cNvPicPr>
+            <a:picLocks noChangeAspect="1"/>
+          </p:cNvPicPr>
+          <p:nvPr/>
+        </p:nvPicPr>
+        <p:blipFill>
+          <a:blip r:embed="rId2">
+            <a:extLst>
+              <a:ext uri="{28A0092B-C50C-407E-A947-70E740481C1C}">
+                <a14:useLocalDpi xmlns:a14="http://schemas.microsoft.com/office/drawing/2010/main" val="0"/>
+              </a:ext>
+              <a:ext uri="{96DAC541-7B7A-43D3-8B79-37D633B846F1}">
+                <asvg:svgBlip xmlns:asvg="http://schemas.microsoft.com/office/drawing/2016/SVG/main" r:embed="rId3"/>
+              </a:ext>
+            </a:extLst>
+          </a:blip>
+          <a:stretch>
+            <a:fillRect/>
+          </a:stretch>
+        </p:blipFill>
+        <p:spPr>
+          <a:xfrm>
+            <a:off x="2936268" y="3677120"/>
+            <a:ext cx="246400" cy="246400"/>
+          </a:xfrm>
+          <a:prstGeom prst="rect">
+            <a:avLst/>
+          </a:prstGeom>
+        </p:spPr>
+      </p:pic>
+      <p:sp>
+        <p:nvSpPr>
+          <p:cNvPr id="9" name="Rectangle 62">
+            <a:extLst>
+              <a:ext uri="{FF2B5EF4-FFF2-40B4-BE49-F238E27FC236}">
+                <a16:creationId xmlns:a16="http://schemas.microsoft.com/office/drawing/2014/main" id="{29DE4FBA-A056-1348-BBDE-C7F04D8121A7}"/>
+              </a:ext>
+            </a:extLst>
+          </p:cNvPr>
+          <p:cNvSpPr/>
+          <p:nvPr/>
+        </p:nvSpPr>
+        <p:spPr>
+          <a:xfrm>
+            <a:off x="5510800" y="3069204"/>
+            <a:ext cx="1271000" cy="283596"/>
+          </a:xfrm>
+          <a:prstGeom prst="rect">
+            <a:avLst/>
+          </a:prstGeom>
+          <a:solidFill>
+            <a:srgbClr val="0070C0"/>
+          </a:solidFill>
+          <a:ln w="19050">
+            <a:solidFill>
+              <a:srgbClr val="0070C0"/>
+            </a:solidFill>
+          </a:ln>
+          <a:effectLst/>
+        </p:spPr>
+        <p:style>
+          <a:lnRef idx="1">
+            <a:schemeClr val="accent2"/>
+          </a:lnRef>
+          <a:fillRef idx="2">
+            <a:schemeClr val="accent2"/>
+          </a:fillRef>
+          <a:effectRef idx="1">
+            <a:schemeClr val="accent2"/>
+          </a:effectRef>
+          <a:fontRef idx="minor">
+            <a:schemeClr val="dk1"/>
+          </a:fontRef>
+        </p:style>
+        <p:txBody>
+          <a:bodyPr rtlCol="0" anchor="ctr"/>
+          <a:lstStyle/>
+          <a:p>
+            <a:pPr algn="ctr"/>
+            <a:r>
+              <a:rPr lang="en-US" sz="1200" dirty="0">
+                <a:solidFill>
+                  <a:schemeClr val="bg1"/>
+                </a:solidFill>
+              </a:rPr>
+              <a:t> :</a:t>
+            </a:r>
+            <a:r>
+              <a:rPr lang="en-US" sz="1200" dirty="0" err="1">
+                <a:solidFill>
+                  <a:schemeClr val="bg1"/>
+                </a:solidFill>
+              </a:rPr>
+              <a:t>LoginCommand</a:t>
+            </a:r>
+            <a:endParaRPr lang="en-SG" sz="1200" dirty="0">
+              <a:solidFill>
+                <a:schemeClr val="bg1"/>
+              </a:solidFill>
+            </a:endParaRPr>
+          </a:p>
+        </p:txBody>
+      </p:sp>
+      <p:cxnSp>
+        <p:nvCxnSpPr>
+          <p:cNvPr id="75" name="Straight Arrow Connector 74">
+            <a:extLst>
+              <a:ext uri="{FF2B5EF4-FFF2-40B4-BE49-F238E27FC236}">
+                <a16:creationId xmlns:a16="http://schemas.microsoft.com/office/drawing/2014/main" id="{80AEC76C-2CA4-7A4A-A59F-6891533C0E27}"/>
+              </a:ext>
+            </a:extLst>
+          </p:cNvPr>
+          <p:cNvCxnSpPr>
+            <a:cxnSpLocks/>
+          </p:cNvCxnSpPr>
+          <p:nvPr/>
+        </p:nvCxnSpPr>
+        <p:spPr>
+          <a:xfrm>
+            <a:off x="1371600" y="3960840"/>
+            <a:ext cx="4678254" cy="24402"/>
+          </a:xfrm>
+          <a:prstGeom prst="straightConnector1">
+            <a:avLst/>
+          </a:prstGeom>
+          <a:ln w="19050">
+            <a:solidFill>
+              <a:srgbClr val="0070C0"/>
+            </a:solidFill>
+            <a:tailEnd type="arrow"/>
+          </a:ln>
+        </p:spPr>
+        <p:style>
+          <a:lnRef idx="1">
+            <a:schemeClr val="accent1"/>
+          </a:lnRef>
+          <a:fillRef idx="0">
+            <a:schemeClr val="accent1"/>
+          </a:fillRef>
+          <a:effectRef idx="0">
+            <a:schemeClr val="accent1"/>
+          </a:effectRef>
+          <a:fontRef idx="minor">
+            <a:schemeClr val="tx1"/>
+          </a:fontRef>
+        </p:style>
+      </p:cxnSp>
+      <p:sp>
+        <p:nvSpPr>
+          <p:cNvPr id="19" name="Rectangle 18">
+            <a:extLst>
+              <a:ext uri="{FF2B5EF4-FFF2-40B4-BE49-F238E27FC236}">
+                <a16:creationId xmlns:a16="http://schemas.microsoft.com/office/drawing/2014/main" id="{FD3AC21D-97DF-2744-978E-E907F049E0C5}"/>
+              </a:ext>
+            </a:extLst>
+          </p:cNvPr>
+          <p:cNvSpPr/>
+          <p:nvPr/>
+        </p:nvSpPr>
+        <p:spPr>
+          <a:xfrm>
+            <a:off x="6019800" y="3960473"/>
+            <a:ext cx="152400" cy="1111281"/>
+          </a:xfrm>
+          <a:prstGeom prst="rect">
+            <a:avLst/>
+          </a:prstGeom>
+          <a:solidFill>
+            <a:srgbClr val="0070C0"/>
+          </a:solidFill>
+          <a:ln>
+            <a:solidFill>
+              <a:srgbClr val="0070C0"/>
+            </a:solidFill>
+          </a:ln>
+          <a:effectLst/>
+        </p:spPr>
+        <p:style>
+          <a:lnRef idx="1">
+            <a:schemeClr val="accent3"/>
+          </a:lnRef>
+          <a:fillRef idx="2">
+            <a:schemeClr val="accent3"/>
+          </a:fillRef>
+          <a:effectRef idx="1">
+            <a:schemeClr val="accent3"/>
+          </a:effectRef>
+          <a:fontRef idx="minor">
+            <a:schemeClr val="dk1"/>
+          </a:fontRef>
+        </p:style>
+        <p:txBody>
+          <a:bodyPr rtlCol="0" anchor="ctr"/>
+          <a:lstStyle/>
+          <a:p>
+            <a:pPr algn="ctr"/>
+            <a:endParaRPr lang="en-SG" sz="1400"/>
+          </a:p>
+        </p:txBody>
+      </p:sp>
+      <p:pic>
+        <p:nvPicPr>
+          <p:cNvPr id="97" name="Graphic 96" descr="Close">
+            <a:extLst>
+              <a:ext uri="{FF2B5EF4-FFF2-40B4-BE49-F238E27FC236}">
+                <a16:creationId xmlns:a16="http://schemas.microsoft.com/office/drawing/2014/main" id="{B423E7C1-9A93-5646-A6A4-FC3C81042C42}"/>
+              </a:ext>
+            </a:extLst>
+          </p:cNvPr>
+          <p:cNvPicPr>
+            <a:picLocks noChangeAspect="1"/>
+          </p:cNvPicPr>
+          <p:nvPr/>
+        </p:nvPicPr>
+        <p:blipFill>
+          <a:blip r:embed="rId2">
+            <a:extLst>
+              <a:ext uri="{28A0092B-C50C-407E-A947-70E740481C1C}">
+                <a14:useLocalDpi xmlns:a14="http://schemas.microsoft.com/office/drawing/2010/main" val="0"/>
+              </a:ext>
+              <a:ext uri="{96DAC541-7B7A-43D3-8B79-37D633B846F1}">
+                <asvg:svgBlip xmlns:asvg="http://schemas.microsoft.com/office/drawing/2016/SVG/main" r:embed="rId3"/>
+              </a:ext>
+            </a:extLst>
+          </a:blip>
+          <a:stretch>
+            <a:fillRect/>
+          </a:stretch>
+        </p:blipFill>
+        <p:spPr>
+          <a:xfrm>
+            <a:off x="5966338" y="5163800"/>
+            <a:ext cx="246400" cy="246400"/>
+          </a:xfrm>
+          <a:prstGeom prst="rect">
+            <a:avLst/>
+          </a:prstGeom>
+        </p:spPr>
+      </p:pic>
+      <p:cxnSp>
+        <p:nvCxnSpPr>
+          <p:cNvPr id="98" name="Straight Connector 97">
+            <a:extLst>
+              <a:ext uri="{FF2B5EF4-FFF2-40B4-BE49-F238E27FC236}">
+                <a16:creationId xmlns:a16="http://schemas.microsoft.com/office/drawing/2014/main" id="{8E75F648-F091-604F-B4A6-A2387A6188D3}"/>
+              </a:ext>
+            </a:extLst>
+          </p:cNvPr>
+          <p:cNvCxnSpPr>
+            <a:cxnSpLocks/>
+          </p:cNvCxnSpPr>
+          <p:nvPr/>
+        </p:nvCxnSpPr>
+        <p:spPr>
+          <a:xfrm flipH="1">
+            <a:off x="7132787" y="4758660"/>
+            <a:ext cx="6864" cy="528340"/>
+          </a:xfrm>
+          <a:prstGeom prst="line">
+            <a:avLst/>
+          </a:prstGeom>
+          <a:ln w="19050">
+            <a:solidFill>
+              <a:srgbClr val="0070C0"/>
+            </a:solidFill>
+            <a:prstDash val="sysDash"/>
+          </a:ln>
+          <a:effectLst/>
+        </p:spPr>
+        <p:style>
+          <a:lnRef idx="1">
+            <a:schemeClr val="accent1"/>
+          </a:lnRef>
+          <a:fillRef idx="2">
+            <a:schemeClr val="accent1"/>
+          </a:fillRef>
+          <a:effectRef idx="1">
+            <a:schemeClr val="accent1"/>
+          </a:effectRef>
+          <a:fontRef idx="minor">
+            <a:schemeClr val="dk1"/>
+          </a:fontRef>
+        </p:style>
+      </p:cxnSp>
+      <p:pic>
+        <p:nvPicPr>
+          <p:cNvPr id="100" name="Graphic 99" descr="Close">
+            <a:extLst>
+              <a:ext uri="{FF2B5EF4-FFF2-40B4-BE49-F238E27FC236}">
+                <a16:creationId xmlns:a16="http://schemas.microsoft.com/office/drawing/2014/main" id="{1B03F269-7351-294F-B0A2-CDCEE7B440B2}"/>
+              </a:ext>
+            </a:extLst>
+          </p:cNvPr>
+          <p:cNvPicPr>
+            <a:picLocks noChangeAspect="1"/>
+          </p:cNvPicPr>
+          <p:nvPr/>
+        </p:nvPicPr>
+        <p:blipFill>
+          <a:blip r:embed="rId2">
+            <a:extLst>
+              <a:ext uri="{28A0092B-C50C-407E-A947-70E740481C1C}">
+                <a14:useLocalDpi xmlns:a14="http://schemas.microsoft.com/office/drawing/2010/main" val="0"/>
+              </a:ext>
+              <a:ext uri="{96DAC541-7B7A-43D3-8B79-37D633B846F1}">
+                <asvg:svgBlip xmlns:asvg="http://schemas.microsoft.com/office/drawing/2016/SVG/main" r:embed="rId3"/>
+              </a:ext>
+            </a:extLst>
+          </a:blip>
+          <a:stretch>
+            <a:fillRect/>
+          </a:stretch>
+        </p:blipFill>
+        <p:spPr>
+          <a:xfrm>
+            <a:off x="7010400" y="5163800"/>
+            <a:ext cx="246400" cy="246400"/>
+          </a:xfrm>
+          <a:prstGeom prst="rect">
+            <a:avLst/>
+          </a:prstGeom>
+        </p:spPr>
+      </p:pic>
+    </p:spTree>
+    <p:extLst>
+      <p:ext uri="{BB962C8B-B14F-4D97-AF65-F5344CB8AC3E}">
+        <p14:creationId xmlns:p14="http://schemas.microsoft.com/office/powerpoint/2010/main" val="3398261043"/>
+      </p:ext>
+    </p:extLst>
+  </p:cSld>
+  <p:clrMapOvr>
+    <a:masterClrMapping/>
+  </p:clrMapOvr>
+</p:sld>
+</file>
+
+<file path=ppt/slides/slide3.xml><?xml version="1.0" encoding="utf-8"?>
+<p:sld xmlns:a="http://schemas.openxmlformats.org/drawingml/2006/main" xmlns:r="http://schemas.openxmlformats.org/officeDocument/2006/relationships" xmlns:p="http://schemas.openxmlformats.org/presentationml/2006/main">
+  <p:cSld>
+    <p:spTree>
+      <p:nvGrpSpPr>
+        <p:cNvPr id="1" name=""/>
+        <p:cNvGrpSpPr/>
+        <p:nvPr/>
+      </p:nvGrpSpPr>
+      <p:grpSpPr>
+        <a:xfrm>
+          <a:off x="0" y="0"/>
+          <a:ext cx="0" cy="0"/>
+          <a:chOff x="0" y="0"/>
+          <a:chExt cx="0" cy="0"/>
+        </a:xfrm>
+      </p:grpSpPr>
+      <p:sp>
+        <p:nvSpPr>
           <p:cNvPr id="2" name="Rectangle 62"/>
           <p:cNvSpPr/>
           <p:nvPr/>
@@ -5686,434 +8549,6 @@
     <p:extLst>
       <p:ext uri="{BB962C8B-B14F-4D97-AF65-F5344CB8AC3E}">
         <p14:creationId xmlns:p14="http://schemas.microsoft.com/office/powerpoint/2010/main" val="4023378879"/>
-      </p:ext>
-    </p:extLst>
-  </p:cSld>
-  <p:clrMapOvr>
-    <a:masterClrMapping/>
-  </p:clrMapOvr>
-</p:sld>
-</file>
-
-<file path=ppt/slides/slide2.xml><?xml version="1.0" encoding="utf-8"?>
-<p:sld xmlns:a="http://schemas.openxmlformats.org/drawingml/2006/main" xmlns:r="http://schemas.openxmlformats.org/officeDocument/2006/relationships" xmlns:p="http://schemas.openxmlformats.org/presentationml/2006/main">
-  <p:cSld>
-    <p:spTree>
-      <p:nvGrpSpPr>
-        <p:cNvPr id="1" name=""/>
-        <p:cNvGrpSpPr/>
-        <p:nvPr/>
-      </p:nvGrpSpPr>
-      <p:grpSpPr>
-        <a:xfrm>
-          <a:off x="0" y="0"/>
-          <a:ext cx="0" cy="0"/>
-          <a:chOff x="0" y="0"/>
-          <a:chExt cx="0" cy="0"/>
-        </a:xfrm>
-      </p:grpSpPr>
-      <p:sp>
-        <p:nvSpPr>
-          <p:cNvPr id="7" name="Rectangle 8">
-            <a:extLst>
-              <a:ext uri="{FF2B5EF4-FFF2-40B4-BE49-F238E27FC236}">
-                <a16:creationId xmlns:a16="http://schemas.microsoft.com/office/drawing/2014/main" id="{A90748A2-4053-1F4B-AE0C-9C15236A2B5F}"/>
-              </a:ext>
-            </a:extLst>
-          </p:cNvPr>
-          <p:cNvSpPr/>
-          <p:nvPr/>
-        </p:nvSpPr>
-        <p:spPr>
-          <a:xfrm>
-            <a:off x="1981200" y="2007561"/>
-            <a:ext cx="2962620" cy="346760"/>
-          </a:xfrm>
-          <a:prstGeom prst="rect">
-            <a:avLst/>
-          </a:prstGeom>
-          <a:ln/>
-        </p:spPr>
-        <p:style>
-          <a:lnRef idx="2">
-            <a:schemeClr val="accent3">
-              <a:shade val="50000"/>
-            </a:schemeClr>
-          </a:lnRef>
-          <a:fillRef idx="1">
-            <a:schemeClr val="accent3"/>
-          </a:fillRef>
-          <a:effectRef idx="0">
-            <a:schemeClr val="accent3"/>
-          </a:effectRef>
-          <a:fontRef idx="minor">
-            <a:schemeClr val="lt1"/>
-          </a:fontRef>
-        </p:style>
-        <p:txBody>
-          <a:bodyPr rtlCol="0" anchor="ctr"/>
-          <a:lstStyle/>
-          <a:p>
-            <a:pPr algn="ctr"/>
-            <a:r>
-              <a:rPr lang="en-US" sz="1400" b="1" dirty="0" err="1">
-                <a:solidFill>
-                  <a:schemeClr val="bg1"/>
-                </a:solidFill>
-              </a:rPr>
-              <a:t>SaveCommand</a:t>
-            </a:r>
-            <a:endParaRPr lang="en-SG" sz="1050" b="1" dirty="0">
-              <a:solidFill>
-                <a:schemeClr val="bg1"/>
-              </a:solidFill>
-            </a:endParaRPr>
-          </a:p>
-        </p:txBody>
-      </p:sp>
-      <p:cxnSp>
-        <p:nvCxnSpPr>
-          <p:cNvPr id="8" name="Straight Connector 7">
-            <a:extLst>
-              <a:ext uri="{FF2B5EF4-FFF2-40B4-BE49-F238E27FC236}">
-                <a16:creationId xmlns:a16="http://schemas.microsoft.com/office/drawing/2014/main" id="{526D96DB-788F-734E-A0A0-E8601618E4A6}"/>
-              </a:ext>
-            </a:extLst>
-          </p:cNvPr>
-          <p:cNvCxnSpPr>
-            <a:cxnSpLocks/>
-            <a:stCxn id="7" idx="0"/>
-            <a:endCxn id="9" idx="0"/>
-          </p:cNvCxnSpPr>
-          <p:nvPr/>
-        </p:nvCxnSpPr>
-        <p:spPr>
-          <a:xfrm flipV="1">
-            <a:off x="3462510" y="1687744"/>
-            <a:ext cx="2263" cy="319817"/>
-          </a:xfrm>
-          <a:prstGeom prst="line">
-            <a:avLst/>
-          </a:prstGeom>
-        </p:spPr>
-        <p:style>
-          <a:lnRef idx="2">
-            <a:schemeClr val="accent3">
-              <a:shade val="50000"/>
-            </a:schemeClr>
-          </a:lnRef>
-          <a:fillRef idx="1">
-            <a:schemeClr val="accent3"/>
-          </a:fillRef>
-          <a:effectRef idx="0">
-            <a:schemeClr val="accent3"/>
-          </a:effectRef>
-          <a:fontRef idx="minor">
-            <a:schemeClr val="lt1"/>
-          </a:fontRef>
-        </p:style>
-      </p:cxnSp>
-      <p:sp>
-        <p:nvSpPr>
-          <p:cNvPr id="9" name="Isosceles Triangle 10">
-            <a:extLst>
-              <a:ext uri="{FF2B5EF4-FFF2-40B4-BE49-F238E27FC236}">
-                <a16:creationId xmlns:a16="http://schemas.microsoft.com/office/drawing/2014/main" id="{3C51DA7D-98B6-8247-BACD-12E515589416}"/>
-              </a:ext>
-            </a:extLst>
-          </p:cNvPr>
-          <p:cNvSpPr/>
-          <p:nvPr/>
-        </p:nvSpPr>
-        <p:spPr>
-          <a:xfrm>
-            <a:off x="3322625" y="1687744"/>
-            <a:ext cx="284295" cy="156155"/>
-          </a:xfrm>
-          <a:prstGeom prst="triangle">
-            <a:avLst/>
-          </a:prstGeom>
-        </p:spPr>
-        <p:style>
-          <a:lnRef idx="2">
-            <a:schemeClr val="accent3">
-              <a:shade val="50000"/>
-            </a:schemeClr>
-          </a:lnRef>
-          <a:fillRef idx="1">
-            <a:schemeClr val="accent3"/>
-          </a:fillRef>
-          <a:effectRef idx="0">
-            <a:schemeClr val="accent3"/>
-          </a:effectRef>
-          <a:fontRef idx="minor">
-            <a:schemeClr val="lt1"/>
-          </a:fontRef>
-        </p:style>
-        <p:txBody>
-          <a:bodyPr rtlCol="0" anchor="ctr"/>
-          <a:lstStyle/>
-          <a:p>
-            <a:pPr algn="ctr"/>
-            <a:endParaRPr lang="en-IN">
-              <a:solidFill>
-                <a:schemeClr val="bg1"/>
-              </a:solidFill>
-            </a:endParaRPr>
-          </a:p>
-        </p:txBody>
-      </p:sp>
-      <p:sp>
-        <p:nvSpPr>
-          <p:cNvPr id="10" name="Rectangle 8">
-            <a:extLst>
-              <a:ext uri="{FF2B5EF4-FFF2-40B4-BE49-F238E27FC236}">
-                <a16:creationId xmlns:a16="http://schemas.microsoft.com/office/drawing/2014/main" id="{389B8C2B-1FCC-774A-B328-3387F82EF7AF}"/>
-              </a:ext>
-            </a:extLst>
-          </p:cNvPr>
-          <p:cNvSpPr/>
-          <p:nvPr/>
-        </p:nvSpPr>
-        <p:spPr>
-          <a:xfrm>
-            <a:off x="2671041" y="1317538"/>
-            <a:ext cx="1589103" cy="346760"/>
-          </a:xfrm>
-          <a:prstGeom prst="rect">
-            <a:avLst/>
-          </a:prstGeom>
-          <a:ln/>
-        </p:spPr>
-        <p:style>
-          <a:lnRef idx="2">
-            <a:schemeClr val="accent3">
-              <a:shade val="50000"/>
-            </a:schemeClr>
-          </a:lnRef>
-          <a:fillRef idx="1">
-            <a:schemeClr val="accent3"/>
-          </a:fillRef>
-          <a:effectRef idx="0">
-            <a:schemeClr val="accent3"/>
-          </a:effectRef>
-          <a:fontRef idx="minor">
-            <a:schemeClr val="lt1"/>
-          </a:fontRef>
-        </p:style>
-        <p:txBody>
-          <a:bodyPr rtlCol="0" anchor="ctr"/>
-          <a:lstStyle/>
-          <a:p>
-            <a:pPr algn="ctr"/>
-            <a:r>
-              <a:rPr lang="en-US" sz="1400" b="1" i="1" dirty="0">
-                <a:solidFill>
-                  <a:schemeClr val="bg1"/>
-                </a:solidFill>
-              </a:rPr>
-              <a:t>Command</a:t>
-            </a:r>
-            <a:endParaRPr lang="en-SG" sz="1200" b="1" i="1" dirty="0">
-              <a:solidFill>
-                <a:schemeClr val="bg1"/>
-              </a:solidFill>
-            </a:endParaRPr>
-          </a:p>
-        </p:txBody>
-      </p:sp>
-      <p:sp>
-        <p:nvSpPr>
-          <p:cNvPr id="11" name="Rectangle 8">
-            <a:extLst>
-              <a:ext uri="{FF2B5EF4-FFF2-40B4-BE49-F238E27FC236}">
-                <a16:creationId xmlns:a16="http://schemas.microsoft.com/office/drawing/2014/main" id="{F098972C-035C-484A-AFB6-7661ED85C19B}"/>
-              </a:ext>
-            </a:extLst>
-          </p:cNvPr>
-          <p:cNvSpPr/>
-          <p:nvPr/>
-        </p:nvSpPr>
-        <p:spPr>
-          <a:xfrm>
-            <a:off x="2819400" y="2730730"/>
-            <a:ext cx="1259718" cy="346760"/>
-          </a:xfrm>
-          <a:prstGeom prst="rect">
-            <a:avLst/>
-          </a:prstGeom>
-          <a:ln/>
-        </p:spPr>
-        <p:style>
-          <a:lnRef idx="2">
-            <a:schemeClr val="accent3">
-              <a:shade val="50000"/>
-            </a:schemeClr>
-          </a:lnRef>
-          <a:fillRef idx="1">
-            <a:schemeClr val="accent3"/>
-          </a:fillRef>
-          <a:effectRef idx="0">
-            <a:schemeClr val="accent3"/>
-          </a:effectRef>
-          <a:fontRef idx="minor">
-            <a:schemeClr val="lt1"/>
-          </a:fontRef>
-        </p:style>
-        <p:txBody>
-          <a:bodyPr rtlCol="0" anchor="ctr"/>
-          <a:lstStyle/>
-          <a:p>
-            <a:pPr algn="ctr"/>
-            <a:r>
-              <a:rPr lang="en-US" sz="1200" b="1" dirty="0">
-                <a:solidFill>
-                  <a:schemeClr val="bg1"/>
-                </a:solidFill>
-              </a:rPr>
-              <a:t>File</a:t>
-            </a:r>
-            <a:endParaRPr lang="en-SG" sz="1050" b="1" dirty="0">
-              <a:solidFill>
-                <a:schemeClr val="bg1"/>
-              </a:solidFill>
-            </a:endParaRPr>
-          </a:p>
-        </p:txBody>
-      </p:sp>
-      <p:sp>
-        <p:nvSpPr>
-          <p:cNvPr id="12" name="Diamond 11">
-            <a:extLst>
-              <a:ext uri="{FF2B5EF4-FFF2-40B4-BE49-F238E27FC236}">
-                <a16:creationId xmlns:a16="http://schemas.microsoft.com/office/drawing/2014/main" id="{6E42F9EE-166A-6848-B340-2535CA643215}"/>
-              </a:ext>
-            </a:extLst>
-          </p:cNvPr>
-          <p:cNvSpPr/>
-          <p:nvPr/>
-        </p:nvSpPr>
-        <p:spPr>
-          <a:xfrm>
-            <a:off x="3351326" y="2364134"/>
-            <a:ext cx="195865" cy="186962"/>
-          </a:xfrm>
-          <a:prstGeom prst="diamond">
-            <a:avLst/>
-          </a:prstGeom>
-          <a:ln/>
-        </p:spPr>
-        <p:style>
-          <a:lnRef idx="2">
-            <a:schemeClr val="accent3">
-              <a:shade val="50000"/>
-            </a:schemeClr>
-          </a:lnRef>
-          <a:fillRef idx="1">
-            <a:schemeClr val="accent3"/>
-          </a:fillRef>
-          <a:effectRef idx="0">
-            <a:schemeClr val="accent3"/>
-          </a:effectRef>
-          <a:fontRef idx="minor">
-            <a:schemeClr val="lt1"/>
-          </a:fontRef>
-        </p:style>
-        <p:txBody>
-          <a:bodyPr rtlCol="0" anchor="ctr"/>
-          <a:lstStyle/>
-          <a:p>
-            <a:pPr algn="ctr"/>
-            <a:endParaRPr lang="en-IN">
-              <a:solidFill>
-                <a:schemeClr val="bg1"/>
-              </a:solidFill>
-            </a:endParaRPr>
-          </a:p>
-        </p:txBody>
-      </p:sp>
-      <p:cxnSp>
-        <p:nvCxnSpPr>
-          <p:cNvPr id="13" name="Straight Connector 12">
-            <a:extLst>
-              <a:ext uri="{FF2B5EF4-FFF2-40B4-BE49-F238E27FC236}">
-                <a16:creationId xmlns:a16="http://schemas.microsoft.com/office/drawing/2014/main" id="{5332BE21-1550-4043-B8C0-BF5F0737F050}"/>
-              </a:ext>
-            </a:extLst>
-          </p:cNvPr>
-          <p:cNvCxnSpPr>
-            <a:cxnSpLocks/>
-            <a:stCxn id="12" idx="2"/>
-            <a:endCxn id="11" idx="0"/>
-          </p:cNvCxnSpPr>
-          <p:nvPr/>
-        </p:nvCxnSpPr>
-        <p:spPr>
-          <a:xfrm>
-            <a:off x="3449259" y="2551096"/>
-            <a:ext cx="0" cy="179634"/>
-          </a:xfrm>
-          <a:prstGeom prst="line">
-            <a:avLst/>
-          </a:prstGeom>
-        </p:spPr>
-        <p:style>
-          <a:lnRef idx="2">
-            <a:schemeClr val="accent3">
-              <a:shade val="50000"/>
-            </a:schemeClr>
-          </a:lnRef>
-          <a:fillRef idx="1">
-            <a:schemeClr val="accent3"/>
-          </a:fillRef>
-          <a:effectRef idx="0">
-            <a:schemeClr val="accent3"/>
-          </a:effectRef>
-          <a:fontRef idx="minor">
-            <a:schemeClr val="lt1"/>
-          </a:fontRef>
-        </p:style>
-      </p:cxnSp>
-      <p:sp>
-        <p:nvSpPr>
-          <p:cNvPr id="19" name="TextBox 18">
-            <a:extLst>
-              <a:ext uri="{FF2B5EF4-FFF2-40B4-BE49-F238E27FC236}">
-                <a16:creationId xmlns:a16="http://schemas.microsoft.com/office/drawing/2014/main" id="{1AF4D04D-CD12-CE44-91C6-DE706474572D}"/>
-              </a:ext>
-            </a:extLst>
-          </p:cNvPr>
-          <p:cNvSpPr txBox="1"/>
-          <p:nvPr/>
-        </p:nvSpPr>
-        <p:spPr>
-          <a:xfrm>
-            <a:off x="3124200" y="2435423"/>
-            <a:ext cx="276038" cy="307777"/>
-          </a:xfrm>
-          <a:prstGeom prst="rect">
-            <a:avLst/>
-          </a:prstGeom>
-          <a:noFill/>
-        </p:spPr>
-        <p:txBody>
-          <a:bodyPr wrap="none" rtlCol="0">
-            <a:spAutoFit/>
-          </a:bodyPr>
-          <a:lstStyle/>
-          <a:p>
-            <a:r>
-              <a:rPr lang="en-US" sz="1400" dirty="0"/>
-              <a:t>1</a:t>
-            </a:r>
-            <a:endParaRPr lang="en-US" dirty="0"/>
-          </a:p>
-        </p:txBody>
-      </p:sp>
-    </p:spTree>
-    <p:extLst>
-      <p:ext uri="{BB962C8B-B14F-4D97-AF65-F5344CB8AC3E}">
-        <p14:creationId xmlns:p14="http://schemas.microsoft.com/office/powerpoint/2010/main" val="1234922879"/>
       </p:ext>
     </p:extLst>
   </p:cSld>

</xml_diff>

<commit_message>
Fix diagram in DG for save command
</commit_message>
<xml_diff>
--- a/docs/diagrams/SaveFeatureDiagrams.pptx
+++ b/docs/diagrams/SaveFeatureDiagrams.pptx
@@ -210,7 +210,7 @@
           <a:p>
             <a:fld id="{F5CC4B3F-88C1-4FFA-B1B6-F41C21DC6924}" type="datetimeFigureOut">
               <a:rPr lang="en-US" smtClean="0"/>
-              <a:t>10/24/18</a:t>
+              <a:t>10/25/18</a:t>
             </a:fld>
             <a:endParaRPr lang="en-US"/>
           </a:p>
@@ -656,7 +656,7 @@
           <a:p>
             <a:fld id="{78C97017-6FC3-485B-9764-EAC9E56C1D49}" type="datetimeFigureOut">
               <a:rPr lang="en-US" smtClean="0"/>
-              <a:t>10/24/18</a:t>
+              <a:t>10/25/18</a:t>
             </a:fld>
             <a:endParaRPr lang="en-US"/>
           </a:p>
@@ -824,7 +824,7 @@
           <a:p>
             <a:fld id="{78C97017-6FC3-485B-9764-EAC9E56C1D49}" type="datetimeFigureOut">
               <a:rPr lang="en-US" smtClean="0"/>
-              <a:t>10/24/18</a:t>
+              <a:t>10/25/18</a:t>
             </a:fld>
             <a:endParaRPr lang="en-US"/>
           </a:p>
@@ -1002,7 +1002,7 @@
           <a:p>
             <a:fld id="{78C97017-6FC3-485B-9764-EAC9E56C1D49}" type="datetimeFigureOut">
               <a:rPr lang="en-US" smtClean="0"/>
-              <a:t>10/24/18</a:t>
+              <a:t>10/25/18</a:t>
             </a:fld>
             <a:endParaRPr lang="en-US"/>
           </a:p>
@@ -1170,7 +1170,7 @@
           <a:p>
             <a:fld id="{78C97017-6FC3-485B-9764-EAC9E56C1D49}" type="datetimeFigureOut">
               <a:rPr lang="en-US" smtClean="0"/>
-              <a:t>10/24/18</a:t>
+              <a:t>10/25/18</a:t>
             </a:fld>
             <a:endParaRPr lang="en-US"/>
           </a:p>
@@ -1415,7 +1415,7 @@
           <a:p>
             <a:fld id="{78C97017-6FC3-485B-9764-EAC9E56C1D49}" type="datetimeFigureOut">
               <a:rPr lang="en-US" smtClean="0"/>
-              <a:t>10/24/18</a:t>
+              <a:t>10/25/18</a:t>
             </a:fld>
             <a:endParaRPr lang="en-US"/>
           </a:p>
@@ -1700,7 +1700,7 @@
           <a:p>
             <a:fld id="{78C97017-6FC3-485B-9764-EAC9E56C1D49}" type="datetimeFigureOut">
               <a:rPr lang="en-US" smtClean="0"/>
-              <a:t>10/24/18</a:t>
+              <a:t>10/25/18</a:t>
             </a:fld>
             <a:endParaRPr lang="en-US"/>
           </a:p>
@@ -2119,7 +2119,7 @@
           <a:p>
             <a:fld id="{78C97017-6FC3-485B-9764-EAC9E56C1D49}" type="datetimeFigureOut">
               <a:rPr lang="en-US" smtClean="0"/>
-              <a:t>10/24/18</a:t>
+              <a:t>10/25/18</a:t>
             </a:fld>
             <a:endParaRPr lang="en-US"/>
           </a:p>
@@ -2236,7 +2236,7 @@
           <a:p>
             <a:fld id="{78C97017-6FC3-485B-9764-EAC9E56C1D49}" type="datetimeFigureOut">
               <a:rPr lang="en-US" smtClean="0"/>
-              <a:t>10/24/18</a:t>
+              <a:t>10/25/18</a:t>
             </a:fld>
             <a:endParaRPr lang="en-US"/>
           </a:p>
@@ -2331,7 +2331,7 @@
           <a:p>
             <a:fld id="{78C97017-6FC3-485B-9764-EAC9E56C1D49}" type="datetimeFigureOut">
               <a:rPr lang="en-US" smtClean="0"/>
-              <a:t>10/24/18</a:t>
+              <a:t>10/25/18</a:t>
             </a:fld>
             <a:endParaRPr lang="en-US"/>
           </a:p>
@@ -2606,7 +2606,7 @@
           <a:p>
             <a:fld id="{78C97017-6FC3-485B-9764-EAC9E56C1D49}" type="datetimeFigureOut">
               <a:rPr lang="en-US" smtClean="0"/>
-              <a:t>10/24/18</a:t>
+              <a:t>10/25/18</a:t>
             </a:fld>
             <a:endParaRPr lang="en-US"/>
           </a:p>
@@ -2858,7 +2858,7 @@
           <a:p>
             <a:fld id="{78C97017-6FC3-485B-9764-EAC9E56C1D49}" type="datetimeFigureOut">
               <a:rPr lang="en-US" smtClean="0"/>
-              <a:t>10/24/18</a:t>
+              <a:t>10/25/18</a:t>
             </a:fld>
             <a:endParaRPr lang="en-US"/>
           </a:p>
@@ -3072,7 +3072,7 @@
           <a:p>
             <a:fld id="{78C97017-6FC3-485B-9764-EAC9E56C1D49}" type="datetimeFigureOut">
               <a:rPr lang="en-US" smtClean="0"/>
-              <a:t>10/24/18</a:t>
+              <a:t>10/25/18</a:t>
             </a:fld>
             <a:endParaRPr lang="en-US"/>
           </a:p>
@@ -4231,63 +4231,6 @@
           </a:fontRef>
         </p:style>
       </p:cxnSp>
-      <p:sp>
-        <p:nvSpPr>
-          <p:cNvPr id="8" name="Rectangle 7">
-            <a:extLst>
-              <a:ext uri="{FF2B5EF4-FFF2-40B4-BE49-F238E27FC236}">
-                <a16:creationId xmlns:a16="http://schemas.microsoft.com/office/drawing/2014/main" id="{EE1F2453-AD1D-014F-8DDF-87BB93167CD4}"/>
-              </a:ext>
-            </a:extLst>
-          </p:cNvPr>
-          <p:cNvSpPr/>
-          <p:nvPr/>
-        </p:nvSpPr>
-        <p:spPr>
-          <a:xfrm>
-            <a:off x="2979790" y="2550810"/>
-            <a:ext cx="174929" cy="1129459"/>
-          </a:xfrm>
-          <a:prstGeom prst="rect">
-            <a:avLst/>
-          </a:prstGeom>
-          <a:solidFill>
-            <a:srgbClr val="0070C0"/>
-          </a:solidFill>
-          <a:ln>
-            <a:solidFill>
-              <a:srgbClr val="0070C0"/>
-            </a:solidFill>
-          </a:ln>
-          <a:effectLst/>
-        </p:spPr>
-        <p:style>
-          <a:lnRef idx="1">
-            <a:schemeClr val="accent3"/>
-          </a:lnRef>
-          <a:fillRef idx="2">
-            <a:schemeClr val="accent3"/>
-          </a:fillRef>
-          <a:effectRef idx="1">
-            <a:schemeClr val="accent3"/>
-          </a:effectRef>
-          <a:fontRef idx="minor">
-            <a:schemeClr val="dk1"/>
-          </a:fontRef>
-        </p:style>
-        <p:txBody>
-          <a:bodyPr rtlCol="0" anchor="ctr"/>
-          <a:lstStyle/>
-          <a:p>
-            <a:pPr algn="ctr"/>
-            <a:endParaRPr lang="en-SG" sz="1400">
-              <a:solidFill>
-                <a:schemeClr val="dk1"/>
-              </a:solidFill>
-            </a:endParaRPr>
-          </a:p>
-        </p:txBody>
-      </p:sp>
       <p:cxnSp>
         <p:nvCxnSpPr>
           <p:cNvPr id="10" name="Straight Connector 9">
@@ -4444,9 +4387,9 @@
           <p:nvPr/>
         </p:nvCxnSpPr>
         <p:spPr>
-          <a:xfrm flipV="1">
-            <a:off x="1371600" y="2565368"/>
-            <a:ext cx="1631332" cy="25432"/>
+          <a:xfrm>
+            <a:off x="1237829" y="2565368"/>
+            <a:ext cx="1765103" cy="0"/>
           </a:xfrm>
           <a:prstGeom prst="straightConnector1">
             <a:avLst/>
@@ -4531,7 +4474,7 @@
         </p:nvSpPr>
         <p:spPr>
           <a:xfrm>
-            <a:off x="3262913" y="3953709"/>
+            <a:off x="3262913" y="3975556"/>
             <a:ext cx="855809" cy="215444"/>
           </a:xfrm>
           <a:prstGeom prst="rect">
@@ -4574,13 +4517,12 @@
           </p:cNvPr>
           <p:cNvCxnSpPr>
             <a:cxnSpLocks/>
-            <a:endCxn id="11" idx="2"/>
           </p:cNvCxnSpPr>
           <p:nvPr/>
         </p:nvCxnSpPr>
         <p:spPr>
           <a:xfrm>
-            <a:off x="4828510" y="3519183"/>
+            <a:off x="4788825" y="3506890"/>
             <a:ext cx="1261029" cy="0"/>
           </a:xfrm>
           <a:prstGeom prst="straightConnector1">
@@ -4619,13 +4561,15 @@
               </a:ext>
             </a:extLst>
           </p:cNvPr>
-          <p:cNvCxnSpPr/>
+          <p:cNvCxnSpPr>
+            <a:cxnSpLocks/>
+          </p:cNvCxnSpPr>
           <p:nvPr/>
         </p:nvCxnSpPr>
         <p:spPr>
-          <a:xfrm flipV="1">
-            <a:off x="1365386" y="3671945"/>
-            <a:ext cx="1596514" cy="5378"/>
+          <a:xfrm>
+            <a:off x="1337798" y="3671945"/>
+            <a:ext cx="1624102" cy="0"/>
           </a:xfrm>
           <a:prstGeom prst="straightConnector1">
             <a:avLst/>
@@ -5132,10 +5076,10 @@
       </p:sp>
       <p:sp>
         <p:nvSpPr>
-          <p:cNvPr id="29" name="Rectangle 62">
+          <p:cNvPr id="30" name="Rectangle 29">
             <a:extLst>
               <a:ext uri="{FF2B5EF4-FFF2-40B4-BE49-F238E27FC236}">
-                <a16:creationId xmlns:a16="http://schemas.microsoft.com/office/drawing/2014/main" id="{F58EFEDD-E067-6844-A0D8-960334F20EDD}"/>
+                <a16:creationId xmlns:a16="http://schemas.microsoft.com/office/drawing/2014/main" id="{9037BBEF-36DA-C742-99A8-6A27718EAA02}"/>
               </a:ext>
             </a:extLst>
           </p:cNvPr>
@@ -5144,8 +5088,107 @@
         </p:nvSpPr>
         <p:spPr>
           <a:xfrm>
-            <a:off x="6578839" y="4495800"/>
-            <a:ext cx="1160722" cy="338178"/>
+            <a:off x="7063451" y="4814752"/>
+            <a:ext cx="152400" cy="171376"/>
+          </a:xfrm>
+          <a:prstGeom prst="rect">
+            <a:avLst/>
+          </a:prstGeom>
+          <a:solidFill>
+            <a:srgbClr val="0070C0"/>
+          </a:solidFill>
+          <a:ln>
+            <a:solidFill>
+              <a:srgbClr val="0070C0"/>
+            </a:solidFill>
+          </a:ln>
+          <a:effectLst/>
+        </p:spPr>
+        <p:style>
+          <a:lnRef idx="1">
+            <a:schemeClr val="accent3"/>
+          </a:lnRef>
+          <a:fillRef idx="2">
+            <a:schemeClr val="accent3"/>
+          </a:fillRef>
+          <a:effectRef idx="1">
+            <a:schemeClr val="accent3"/>
+          </a:effectRef>
+          <a:fontRef idx="minor">
+            <a:schemeClr val="dk1"/>
+          </a:fontRef>
+        </p:style>
+        <p:txBody>
+          <a:bodyPr rtlCol="0" anchor="ctr"/>
+          <a:lstStyle/>
+          <a:p>
+            <a:pPr algn="ctr"/>
+            <a:endParaRPr lang="en-SG" sz="1400"/>
+          </a:p>
+        </p:txBody>
+      </p:sp>
+      <p:cxnSp>
+        <p:nvCxnSpPr>
+          <p:cNvPr id="31" name="Straight Arrow Connector 30">
+            <a:extLst>
+              <a:ext uri="{FF2B5EF4-FFF2-40B4-BE49-F238E27FC236}">
+                <a16:creationId xmlns:a16="http://schemas.microsoft.com/office/drawing/2014/main" id="{A4F16D55-6544-E243-A903-5B442E1A16CB}"/>
+              </a:ext>
+            </a:extLst>
+          </p:cNvPr>
+          <p:cNvCxnSpPr>
+            <a:cxnSpLocks/>
+          </p:cNvCxnSpPr>
+          <p:nvPr/>
+        </p:nvCxnSpPr>
+        <p:spPr>
+          <a:xfrm>
+            <a:off x="6152011" y="4981137"/>
+            <a:ext cx="911440" cy="3328"/>
+          </a:xfrm>
+          <a:prstGeom prst="straightConnector1">
+            <a:avLst/>
+          </a:prstGeom>
+          <a:ln w="19050">
+            <a:solidFill>
+              <a:srgbClr val="0070C0"/>
+            </a:solidFill>
+            <a:prstDash val="sysDash"/>
+            <a:headEnd type="arrow" w="med" len="med"/>
+            <a:tailEnd type="none" w="med" len="med"/>
+          </a:ln>
+        </p:spPr>
+        <p:style>
+          <a:lnRef idx="1">
+            <a:schemeClr val="accent1"/>
+          </a:lnRef>
+          <a:fillRef idx="0">
+            <a:schemeClr val="accent1"/>
+          </a:fillRef>
+          <a:effectRef idx="0">
+            <a:schemeClr val="accent1"/>
+          </a:effectRef>
+          <a:fontRef idx="minor">
+            <a:schemeClr val="tx1"/>
+          </a:fontRef>
+        </p:style>
+      </p:cxnSp>
+      <p:sp>
+        <p:nvSpPr>
+          <p:cNvPr id="32" name="Rectangle 62">
+            <a:extLst>
+              <a:ext uri="{FF2B5EF4-FFF2-40B4-BE49-F238E27FC236}">
+                <a16:creationId xmlns:a16="http://schemas.microsoft.com/office/drawing/2014/main" id="{7E535B44-B409-6845-89F2-5D4D2AA87098}"/>
+              </a:ext>
+            </a:extLst>
+          </p:cNvPr>
+          <p:cNvSpPr/>
+          <p:nvPr/>
+        </p:nvSpPr>
+        <p:spPr>
+          <a:xfrm>
+            <a:off x="3886200" y="2550810"/>
+            <a:ext cx="1696733" cy="268590"/>
           </a:xfrm>
           <a:prstGeom prst="rect">
             <a:avLst/>
@@ -5180,43 +5223,77 @@
           <a:p>
             <a:pPr algn="ctr"/>
             <a:r>
-              <a:rPr lang="en-US" sz="1050" dirty="0" err="1">
+              <a:rPr lang="en-US" sz="1200" dirty="0">
                 <a:solidFill>
                   <a:schemeClr val="bg1"/>
                 </a:solidFill>
               </a:rPr>
-              <a:t>result:Command</a:t>
-            </a:r>
-            <a:endParaRPr lang="en-US" sz="1050" dirty="0">
+              <a:t>:</a:t>
+            </a:r>
+            <a:r>
+              <a:rPr lang="en-US" sz="1200" dirty="0" err="1">
+                <a:solidFill>
+                  <a:schemeClr val="bg1"/>
+                </a:solidFill>
+              </a:rPr>
+              <a:t>SaveCommandParser</a:t>
+            </a:r>
+            <a:endParaRPr lang="en-SG" sz="1200" dirty="0">
               <a:solidFill>
                 <a:schemeClr val="bg1"/>
               </a:solidFill>
             </a:endParaRPr>
           </a:p>
-          <a:p>
-            <a:pPr algn="ctr"/>
-            <a:r>
-              <a:rPr lang="en-US" sz="1050" dirty="0">
-                <a:solidFill>
-                  <a:schemeClr val="bg1"/>
-                </a:solidFill>
-              </a:rPr>
-              <a:t>Result</a:t>
-            </a:r>
-            <a:endParaRPr lang="en-SG" sz="1050" dirty="0">
-              <a:solidFill>
-                <a:schemeClr val="bg1"/>
-              </a:solidFill>
-            </a:endParaRPr>
-          </a:p>
-        </p:txBody>
-      </p:sp>
-      <p:sp>
-        <p:nvSpPr>
-          <p:cNvPr id="30" name="Rectangle 29">
+        </p:txBody>
+      </p:sp>
+      <p:cxnSp>
+        <p:nvCxnSpPr>
+          <p:cNvPr id="33" name="Straight Arrow Connector 32">
             <a:extLst>
               <a:ext uri="{FF2B5EF4-FFF2-40B4-BE49-F238E27FC236}">
-                <a16:creationId xmlns:a16="http://schemas.microsoft.com/office/drawing/2014/main" id="{9037BBEF-36DA-C742-99A8-6A27718EAA02}"/>
+                <a16:creationId xmlns:a16="http://schemas.microsoft.com/office/drawing/2014/main" id="{4EBA23C1-0278-ED42-9645-DEF321897EB5}"/>
+              </a:ext>
+            </a:extLst>
+          </p:cNvPr>
+          <p:cNvCxnSpPr>
+            <a:cxnSpLocks/>
+          </p:cNvCxnSpPr>
+          <p:nvPr/>
+        </p:nvCxnSpPr>
+        <p:spPr>
+          <a:xfrm flipV="1">
+            <a:off x="3048000" y="3159434"/>
+            <a:ext cx="1596697" cy="3080"/>
+          </a:xfrm>
+          <a:prstGeom prst="straightConnector1">
+            <a:avLst/>
+          </a:prstGeom>
+          <a:ln w="19050">
+            <a:headEnd type="none" w="med" len="med"/>
+            <a:tailEnd type="arrow" w="med" len="med"/>
+          </a:ln>
+        </p:spPr>
+        <p:style>
+          <a:lnRef idx="1">
+            <a:schemeClr val="accent1"/>
+          </a:lnRef>
+          <a:fillRef idx="0">
+            <a:schemeClr val="accent1"/>
+          </a:fillRef>
+          <a:effectRef idx="0">
+            <a:schemeClr val="accent1"/>
+          </a:effectRef>
+          <a:fontRef idx="minor">
+            <a:schemeClr val="tx1"/>
+          </a:fontRef>
+        </p:style>
+      </p:cxnSp>
+      <p:sp>
+        <p:nvSpPr>
+          <p:cNvPr id="34" name="Rectangle 33">
+            <a:extLst>
+              <a:ext uri="{FF2B5EF4-FFF2-40B4-BE49-F238E27FC236}">
+                <a16:creationId xmlns:a16="http://schemas.microsoft.com/office/drawing/2014/main" id="{CD9719B9-A83B-944F-BC32-A6571C524D47}"/>
               </a:ext>
             </a:extLst>
           </p:cNvPr>
@@ -5225,8 +5302,8 @@
         </p:nvSpPr>
         <p:spPr>
           <a:xfrm>
-            <a:off x="7063451" y="4814752"/>
-            <a:ext cx="152400" cy="171376"/>
+            <a:off x="4622667" y="2818026"/>
+            <a:ext cx="205843" cy="190647"/>
           </a:xfrm>
           <a:prstGeom prst="rect">
             <a:avLst/>
@@ -5266,24 +5343,25 @@
       </p:sp>
       <p:cxnSp>
         <p:nvCxnSpPr>
-          <p:cNvPr id="31" name="Straight Arrow Connector 30">
+          <p:cNvPr id="35" name="Straight Connector 34">
             <a:extLst>
               <a:ext uri="{FF2B5EF4-FFF2-40B4-BE49-F238E27FC236}">
-                <a16:creationId xmlns:a16="http://schemas.microsoft.com/office/drawing/2014/main" id="{A4F16D55-6544-E243-A903-5B442E1A16CB}"/>
+                <a16:creationId xmlns:a16="http://schemas.microsoft.com/office/drawing/2014/main" id="{542B0C39-C0C9-C34C-A704-58DDDAB9DD1A}"/>
               </a:ext>
             </a:extLst>
           </p:cNvPr>
           <p:cNvCxnSpPr>
             <a:cxnSpLocks/>
+            <a:stCxn id="34" idx="0"/>
           </p:cNvCxnSpPr>
           <p:nvPr/>
         </p:nvCxnSpPr>
         <p:spPr>
           <a:xfrm>
-            <a:off x="6152011" y="4981137"/>
-            <a:ext cx="911440" cy="3328"/>
-          </a:xfrm>
-          <a:prstGeom prst="straightConnector1">
+            <a:off x="4725589" y="2818026"/>
+            <a:ext cx="7144" cy="909383"/>
+          </a:xfrm>
+          <a:prstGeom prst="line">
             <a:avLst/>
           </a:prstGeom>
           <a:ln w="19050">
@@ -5291,146 +5369,30 @@
               <a:srgbClr val="0070C0"/>
             </a:solidFill>
             <a:prstDash val="sysDash"/>
-            <a:headEnd type="arrow" w="med" len="med"/>
-            <a:tailEnd type="none" w="med" len="med"/>
           </a:ln>
+          <a:effectLst/>
         </p:spPr>
         <p:style>
           <a:lnRef idx="1">
             <a:schemeClr val="accent1"/>
           </a:lnRef>
-          <a:fillRef idx="0">
-            <a:schemeClr val="accent1"/>
-          </a:fillRef>
-          <a:effectRef idx="0">
-            <a:schemeClr val="accent1"/>
-          </a:effectRef>
-          <a:fontRef idx="minor">
-            <a:schemeClr val="tx1"/>
-          </a:fontRef>
-        </p:style>
-      </p:cxnSp>
-      <p:sp>
-        <p:nvSpPr>
-          <p:cNvPr id="32" name="Rectangle 62">
-            <a:extLst>
-              <a:ext uri="{FF2B5EF4-FFF2-40B4-BE49-F238E27FC236}">
-                <a16:creationId xmlns:a16="http://schemas.microsoft.com/office/drawing/2014/main" id="{7E535B44-B409-6845-89F2-5D4D2AA87098}"/>
-              </a:ext>
-            </a:extLst>
-          </p:cNvPr>
-          <p:cNvSpPr/>
-          <p:nvPr/>
-        </p:nvSpPr>
-        <p:spPr>
-          <a:xfrm>
-            <a:off x="3942067" y="2456499"/>
-            <a:ext cx="1541448" cy="362901"/>
-          </a:xfrm>
-          <a:prstGeom prst="rect">
-            <a:avLst/>
-          </a:prstGeom>
-          <a:solidFill>
-            <a:srgbClr val="0070C0"/>
-          </a:solidFill>
-          <a:ln w="19050">
-            <a:solidFill>
-              <a:srgbClr val="0070C0"/>
-            </a:solidFill>
-          </a:ln>
-          <a:effectLst/>
-        </p:spPr>
-        <p:style>
-          <a:lnRef idx="1">
-            <a:schemeClr val="accent2"/>
-          </a:lnRef>
           <a:fillRef idx="2">
-            <a:schemeClr val="accent2"/>
+            <a:schemeClr val="accent1"/>
           </a:fillRef>
           <a:effectRef idx="1">
-            <a:schemeClr val="accent2"/>
+            <a:schemeClr val="accent1"/>
           </a:effectRef>
           <a:fontRef idx="minor">
             <a:schemeClr val="dk1"/>
           </a:fontRef>
         </p:style>
-        <p:txBody>
-          <a:bodyPr rtlCol="0" anchor="ctr"/>
-          <a:lstStyle/>
-          <a:p>
-            <a:pPr algn="ctr"/>
-            <a:r>
-              <a:rPr lang="en-US" sz="1200" dirty="0">
-                <a:solidFill>
-                  <a:schemeClr val="bg1"/>
-                </a:solidFill>
-              </a:rPr>
-              <a:t>:</a:t>
-            </a:r>
-            <a:r>
-              <a:rPr lang="en-US" sz="1200" dirty="0" err="1">
-                <a:solidFill>
-                  <a:schemeClr val="bg1"/>
-                </a:solidFill>
-              </a:rPr>
-              <a:t>SaveCommandParser</a:t>
-            </a:r>
-            <a:endParaRPr lang="en-SG" sz="1200" dirty="0">
-              <a:solidFill>
-                <a:schemeClr val="bg1"/>
-              </a:solidFill>
-            </a:endParaRPr>
-          </a:p>
-        </p:txBody>
-      </p:sp>
-      <p:cxnSp>
-        <p:nvCxnSpPr>
-          <p:cNvPr id="33" name="Straight Arrow Connector 32">
+      </p:cxnSp>
+      <p:sp>
+        <p:nvSpPr>
+          <p:cNvPr id="36" name="Rectangle 35">
             <a:extLst>
               <a:ext uri="{FF2B5EF4-FFF2-40B4-BE49-F238E27FC236}">
-                <a16:creationId xmlns:a16="http://schemas.microsoft.com/office/drawing/2014/main" id="{4EBA23C1-0278-ED42-9645-DEF321897EB5}"/>
-              </a:ext>
-            </a:extLst>
-          </p:cNvPr>
-          <p:cNvCxnSpPr>
-            <a:cxnSpLocks/>
-          </p:cNvCxnSpPr>
-          <p:nvPr/>
-        </p:nvCxnSpPr>
-        <p:spPr>
-          <a:xfrm flipV="1">
-            <a:off x="3048000" y="3159434"/>
-            <a:ext cx="1596697" cy="3080"/>
-          </a:xfrm>
-          <a:prstGeom prst="straightConnector1">
-            <a:avLst/>
-          </a:prstGeom>
-          <a:ln w="19050">
-            <a:headEnd type="none" w="med" len="med"/>
-            <a:tailEnd type="arrow" w="med" len="med"/>
-          </a:ln>
-        </p:spPr>
-        <p:style>
-          <a:lnRef idx="1">
-            <a:schemeClr val="accent1"/>
-          </a:lnRef>
-          <a:fillRef idx="0">
-            <a:schemeClr val="accent1"/>
-          </a:fillRef>
-          <a:effectRef idx="0">
-            <a:schemeClr val="accent1"/>
-          </a:effectRef>
-          <a:fontRef idx="minor">
-            <a:schemeClr val="tx1"/>
-          </a:fontRef>
-        </p:style>
-      </p:cxnSp>
-      <p:sp>
-        <p:nvSpPr>
-          <p:cNvPr id="34" name="Rectangle 33">
-            <a:extLst>
-              <a:ext uri="{FF2B5EF4-FFF2-40B4-BE49-F238E27FC236}">
-                <a16:creationId xmlns:a16="http://schemas.microsoft.com/office/drawing/2014/main" id="{CD9719B9-A83B-944F-BC32-A6571C524D47}"/>
+                <a16:creationId xmlns:a16="http://schemas.microsoft.com/office/drawing/2014/main" id="{76F36F92-4B66-FB48-BE7A-9F175CAA418F}"/>
               </a:ext>
             </a:extLst>
           </p:cNvPr>
@@ -5439,8 +5401,8 @@
         </p:nvSpPr>
         <p:spPr>
           <a:xfrm>
-            <a:off x="4622667" y="2818026"/>
-            <a:ext cx="205843" cy="190647"/>
+            <a:off x="4629813" y="3156782"/>
+            <a:ext cx="198698" cy="433463"/>
           </a:xfrm>
           <a:prstGeom prst="rect">
             <a:avLst/>
@@ -5480,105 +5442,6 @@
       </p:sp>
       <p:cxnSp>
         <p:nvCxnSpPr>
-          <p:cNvPr id="35" name="Straight Connector 34">
-            <a:extLst>
-              <a:ext uri="{FF2B5EF4-FFF2-40B4-BE49-F238E27FC236}">
-                <a16:creationId xmlns:a16="http://schemas.microsoft.com/office/drawing/2014/main" id="{542B0C39-C0C9-C34C-A704-58DDDAB9DD1A}"/>
-              </a:ext>
-            </a:extLst>
-          </p:cNvPr>
-          <p:cNvCxnSpPr>
-            <a:cxnSpLocks/>
-            <a:stCxn id="34" idx="0"/>
-          </p:cNvCxnSpPr>
-          <p:nvPr/>
-        </p:nvCxnSpPr>
-        <p:spPr>
-          <a:xfrm>
-            <a:off x="4725589" y="2818026"/>
-            <a:ext cx="7144" cy="909383"/>
-          </a:xfrm>
-          <a:prstGeom prst="line">
-            <a:avLst/>
-          </a:prstGeom>
-          <a:ln w="19050">
-            <a:solidFill>
-              <a:srgbClr val="0070C0"/>
-            </a:solidFill>
-            <a:prstDash val="sysDash"/>
-          </a:ln>
-          <a:effectLst/>
-        </p:spPr>
-        <p:style>
-          <a:lnRef idx="1">
-            <a:schemeClr val="accent1"/>
-          </a:lnRef>
-          <a:fillRef idx="2">
-            <a:schemeClr val="accent1"/>
-          </a:fillRef>
-          <a:effectRef idx="1">
-            <a:schemeClr val="accent1"/>
-          </a:effectRef>
-          <a:fontRef idx="minor">
-            <a:schemeClr val="dk1"/>
-          </a:fontRef>
-        </p:style>
-      </p:cxnSp>
-      <p:sp>
-        <p:nvSpPr>
-          <p:cNvPr id="36" name="Rectangle 35">
-            <a:extLst>
-              <a:ext uri="{FF2B5EF4-FFF2-40B4-BE49-F238E27FC236}">
-                <a16:creationId xmlns:a16="http://schemas.microsoft.com/office/drawing/2014/main" id="{76F36F92-4B66-FB48-BE7A-9F175CAA418F}"/>
-              </a:ext>
-            </a:extLst>
-          </p:cNvPr>
-          <p:cNvSpPr/>
-          <p:nvPr/>
-        </p:nvSpPr>
-        <p:spPr>
-          <a:xfrm>
-            <a:off x="4629813" y="3156782"/>
-            <a:ext cx="198698" cy="433463"/>
-          </a:xfrm>
-          <a:prstGeom prst="rect">
-            <a:avLst/>
-          </a:prstGeom>
-          <a:solidFill>
-            <a:srgbClr val="0070C0"/>
-          </a:solidFill>
-          <a:ln>
-            <a:solidFill>
-              <a:srgbClr val="0070C0"/>
-            </a:solidFill>
-          </a:ln>
-          <a:effectLst/>
-        </p:spPr>
-        <p:style>
-          <a:lnRef idx="1">
-            <a:schemeClr val="accent3"/>
-          </a:lnRef>
-          <a:fillRef idx="2">
-            <a:schemeClr val="accent3"/>
-          </a:fillRef>
-          <a:effectRef idx="1">
-            <a:schemeClr val="accent3"/>
-          </a:effectRef>
-          <a:fontRef idx="minor">
-            <a:schemeClr val="dk1"/>
-          </a:fontRef>
-        </p:style>
-        <p:txBody>
-          <a:bodyPr rtlCol="0" anchor="ctr"/>
-          <a:lstStyle/>
-          <a:p>
-            <a:pPr algn="ctr"/>
-            <a:endParaRPr lang="en-SG" sz="1400"/>
-          </a:p>
-        </p:txBody>
-      </p:sp>
-      <p:cxnSp>
-        <p:nvCxnSpPr>
           <p:cNvPr id="37" name="Straight Arrow Connector 36">
             <a:extLst>
               <a:ext uri="{FF2B5EF4-FFF2-40B4-BE49-F238E27FC236}">
@@ -5593,7 +5456,7 @@
         </p:nvCxnSpPr>
         <p:spPr>
           <a:xfrm>
-            <a:off x="3129200" y="3605885"/>
+            <a:off x="3121428" y="3590245"/>
             <a:ext cx="1707082" cy="0"/>
           </a:xfrm>
           <a:prstGeom prst="straightConnector1">
@@ -5682,7 +5545,7 @@
         <p:spPr>
           <a:xfrm>
             <a:off x="3129200" y="2663565"/>
-            <a:ext cx="812866" cy="3435"/>
+            <a:ext cx="757000" cy="0"/>
           </a:xfrm>
           <a:prstGeom prst="straightConnector1">
             <a:avLst/>
@@ -5769,8 +5632,8 @@
         </p:nvSpPr>
         <p:spPr>
           <a:xfrm>
-            <a:off x="2971800" y="3200400"/>
-            <a:ext cx="1609145" cy="161583"/>
+            <a:off x="3312643" y="3170769"/>
+            <a:ext cx="1345334" cy="369332"/>
           </a:xfrm>
           <a:prstGeom prst="rect">
             <a:avLst/>
@@ -5794,24 +5657,32 @@
             </a:lvl1pPr>
           </a:lstStyle>
           <a:p>
-            <a:r>
-              <a:rPr lang="en-US" sz="1050" dirty="0"/>
-              <a:t>parse (“</a:t>
-            </a:r>
-            <a:r>
-              <a:rPr lang="en-US" sz="1050" dirty="0" err="1"/>
+            <a:pPr algn="l"/>
+            <a:r>
+              <a:rPr lang="en-US" sz="1200" dirty="0"/>
+              <a:t>parse </a:t>
+            </a:r>
+          </a:p>
+          <a:p>
+            <a:pPr algn="l"/>
+            <a:r>
+              <a:rPr lang="en-US" sz="1200" dirty="0"/>
+              <a:t>(“</a:t>
+            </a:r>
+            <a:r>
+              <a:rPr lang="en-US" sz="1200" dirty="0" err="1"/>
               <a:t>sp</a:t>
             </a:r>
             <a:r>
-              <a:rPr lang="en-US" sz="1050" dirty="0"/>
+              <a:rPr lang="en-US" sz="1200" dirty="0"/>
               <a:t>/</a:t>
             </a:r>
             <a:r>
-              <a:rPr lang="en-US" sz="1050" dirty="0" err="1"/>
+              <a:rPr lang="en-US" sz="1200" dirty="0" err="1"/>
               <a:t>userdata.xml</a:t>
             </a:r>
             <a:r>
-              <a:rPr lang="en-US" sz="1050" dirty="0"/>
+              <a:rPr lang="en-US" sz="1200" dirty="0"/>
               <a:t>”)</a:t>
             </a:r>
           </a:p>
@@ -6074,9 +5945,9 @@
           <p:nvPr/>
         </p:nvCxnSpPr>
         <p:spPr>
-          <a:xfrm>
-            <a:off x="1371600" y="3960840"/>
-            <a:ext cx="4678254" cy="24402"/>
+          <a:xfrm flipV="1">
+            <a:off x="1237829" y="3985242"/>
+            <a:ext cx="4812025" cy="4718"/>
           </a:xfrm>
           <a:prstGeom prst="straightConnector1">
             <a:avLst/>
@@ -6279,6 +6150,144 @@
           </a:prstGeom>
         </p:spPr>
       </p:pic>
+      <p:sp>
+        <p:nvSpPr>
+          <p:cNvPr id="8" name="Rectangle 7">
+            <a:extLst>
+              <a:ext uri="{FF2B5EF4-FFF2-40B4-BE49-F238E27FC236}">
+                <a16:creationId xmlns:a16="http://schemas.microsoft.com/office/drawing/2014/main" id="{EE1F2453-AD1D-014F-8DDF-87BB93167CD4}"/>
+              </a:ext>
+            </a:extLst>
+          </p:cNvPr>
+          <p:cNvSpPr/>
+          <p:nvPr/>
+        </p:nvSpPr>
+        <p:spPr>
+          <a:xfrm>
+            <a:off x="2979790" y="2550810"/>
+            <a:ext cx="174929" cy="1129459"/>
+          </a:xfrm>
+          <a:prstGeom prst="rect">
+            <a:avLst/>
+          </a:prstGeom>
+          <a:solidFill>
+            <a:srgbClr val="0070C0"/>
+          </a:solidFill>
+          <a:ln>
+            <a:solidFill>
+              <a:srgbClr val="0070C0"/>
+            </a:solidFill>
+          </a:ln>
+          <a:effectLst/>
+        </p:spPr>
+        <p:style>
+          <a:lnRef idx="1">
+            <a:schemeClr val="accent3"/>
+          </a:lnRef>
+          <a:fillRef idx="2">
+            <a:schemeClr val="accent3"/>
+          </a:fillRef>
+          <a:effectRef idx="1">
+            <a:schemeClr val="accent3"/>
+          </a:effectRef>
+          <a:fontRef idx="minor">
+            <a:schemeClr val="dk1"/>
+          </a:fontRef>
+        </p:style>
+        <p:txBody>
+          <a:bodyPr rtlCol="0" anchor="ctr"/>
+          <a:lstStyle/>
+          <a:p>
+            <a:pPr algn="ctr"/>
+            <a:endParaRPr lang="en-SG" sz="1400">
+              <a:solidFill>
+                <a:schemeClr val="dk1"/>
+              </a:solidFill>
+            </a:endParaRPr>
+          </a:p>
+        </p:txBody>
+      </p:sp>
+      <p:sp>
+        <p:nvSpPr>
+          <p:cNvPr id="29" name="Rectangle 62">
+            <a:extLst>
+              <a:ext uri="{FF2B5EF4-FFF2-40B4-BE49-F238E27FC236}">
+                <a16:creationId xmlns:a16="http://schemas.microsoft.com/office/drawing/2014/main" id="{F58EFEDD-E067-6844-A0D8-960334F20EDD}"/>
+              </a:ext>
+            </a:extLst>
+          </p:cNvPr>
+          <p:cNvSpPr/>
+          <p:nvPr/>
+        </p:nvSpPr>
+        <p:spPr>
+          <a:xfrm>
+            <a:off x="6578839" y="4495800"/>
+            <a:ext cx="1160722" cy="338178"/>
+          </a:xfrm>
+          <a:prstGeom prst="rect">
+            <a:avLst/>
+          </a:prstGeom>
+          <a:solidFill>
+            <a:srgbClr val="0070C0"/>
+          </a:solidFill>
+          <a:ln w="19050">
+            <a:solidFill>
+              <a:srgbClr val="0070C0"/>
+            </a:solidFill>
+          </a:ln>
+          <a:effectLst/>
+        </p:spPr>
+        <p:style>
+          <a:lnRef idx="1">
+            <a:schemeClr val="accent2"/>
+          </a:lnRef>
+          <a:fillRef idx="2">
+            <a:schemeClr val="accent2"/>
+          </a:fillRef>
+          <a:effectRef idx="1">
+            <a:schemeClr val="accent2"/>
+          </a:effectRef>
+          <a:fontRef idx="minor">
+            <a:schemeClr val="dk1"/>
+          </a:fontRef>
+        </p:style>
+        <p:txBody>
+          <a:bodyPr rtlCol="0" anchor="ctr"/>
+          <a:lstStyle/>
+          <a:p>
+            <a:pPr algn="ctr"/>
+            <a:r>
+              <a:rPr lang="en-US" sz="1050" dirty="0" err="1">
+                <a:solidFill>
+                  <a:schemeClr val="bg1"/>
+                </a:solidFill>
+              </a:rPr>
+              <a:t>result:Command</a:t>
+            </a:r>
+            <a:endParaRPr lang="en-US" sz="1050" dirty="0">
+              <a:solidFill>
+                <a:schemeClr val="bg1"/>
+              </a:solidFill>
+            </a:endParaRPr>
+          </a:p>
+          <a:p>
+            <a:pPr algn="ctr"/>
+            <a:r>
+              <a:rPr lang="en-US" sz="1050" dirty="0">
+                <a:solidFill>
+                  <a:schemeClr val="bg1"/>
+                </a:solidFill>
+              </a:rPr>
+              <a:t>Result</a:t>
+            </a:r>
+            <a:endParaRPr lang="en-SG" sz="1050" dirty="0">
+              <a:solidFill>
+                <a:schemeClr val="bg1"/>
+              </a:solidFill>
+            </a:endParaRPr>
+          </a:p>
+        </p:txBody>
+      </p:sp>
     </p:spTree>
     <p:extLst>
       <p:ext uri="{BB962C8B-B14F-4D97-AF65-F5344CB8AC3E}">

</xml_diff>

<commit_message>
Update encryption feature in DG
</commit_message>
<xml_diff>
--- a/docs/diagrams/SaveFeatureDiagrams.pptx
+++ b/docs/diagrams/SaveFeatureDiagrams.pptx
@@ -4203,7 +4203,7 @@
         <p:spPr>
           <a:xfrm>
             <a:off x="3051799" y="1997532"/>
-            <a:ext cx="7669" cy="1841668"/>
+            <a:ext cx="2664" cy="3412668"/>
           </a:xfrm>
           <a:prstGeom prst="line">
             <a:avLst/>
@@ -5773,90 +5773,6 @@
           </a:fontRef>
         </p:style>
       </p:cxnSp>
-      <p:cxnSp>
-        <p:nvCxnSpPr>
-          <p:cNvPr id="49" name="Straight Arrow Connector 48">
-            <a:extLst>
-              <a:ext uri="{FF2B5EF4-FFF2-40B4-BE49-F238E27FC236}">
-                <a16:creationId xmlns:a16="http://schemas.microsoft.com/office/drawing/2014/main" id="{3BE8E052-7328-3346-8CC5-0153CE2E466B}"/>
-              </a:ext>
-            </a:extLst>
-          </p:cNvPr>
-          <p:cNvCxnSpPr>
-            <a:cxnSpLocks/>
-          </p:cNvCxnSpPr>
-          <p:nvPr/>
-        </p:nvCxnSpPr>
-        <p:spPr>
-          <a:xfrm flipH="1">
-            <a:off x="76200" y="5219912"/>
-            <a:ext cx="1119851" cy="0"/>
-          </a:xfrm>
-          <a:prstGeom prst="straightConnector1">
-            <a:avLst/>
-          </a:prstGeom>
-          <a:ln w="19050">
-            <a:solidFill>
-              <a:srgbClr val="00B050"/>
-            </a:solidFill>
-            <a:prstDash val="sysDash"/>
-            <a:tailEnd type="arrow"/>
-          </a:ln>
-        </p:spPr>
-        <p:style>
-          <a:lnRef idx="1">
-            <a:schemeClr val="accent1"/>
-          </a:lnRef>
-          <a:fillRef idx="0">
-            <a:schemeClr val="accent1"/>
-          </a:fillRef>
-          <a:effectRef idx="0">
-            <a:schemeClr val="accent1"/>
-          </a:effectRef>
-          <a:fontRef idx="minor">
-            <a:schemeClr val="tx1"/>
-          </a:fontRef>
-        </p:style>
-      </p:cxnSp>
-      <p:pic>
-        <p:nvPicPr>
-          <p:cNvPr id="67" name="Graphic 66" descr="Close">
-            <a:extLst>
-              <a:ext uri="{FF2B5EF4-FFF2-40B4-BE49-F238E27FC236}">
-                <a16:creationId xmlns:a16="http://schemas.microsoft.com/office/drawing/2014/main" id="{0F4A0785-F05A-4845-9486-8ACAA03CF340}"/>
-              </a:ext>
-            </a:extLst>
-          </p:cNvPr>
-          <p:cNvPicPr>
-            <a:picLocks noChangeAspect="1"/>
-          </p:cNvPicPr>
-          <p:nvPr/>
-        </p:nvPicPr>
-        <p:blipFill>
-          <a:blip r:embed="rId2">
-            <a:extLst>
-              <a:ext uri="{28A0092B-C50C-407E-A947-70E740481C1C}">
-                <a14:useLocalDpi xmlns:a14="http://schemas.microsoft.com/office/drawing/2010/main" val="0"/>
-              </a:ext>
-              <a:ext uri="{96DAC541-7B7A-43D3-8B79-37D633B846F1}">
-                <asvg:svgBlip xmlns:asvg="http://schemas.microsoft.com/office/drawing/2016/SVG/main" r:embed="rId3"/>
-              </a:ext>
-            </a:extLst>
-          </a:blip>
-          <a:stretch>
-            <a:fillRect/>
-          </a:stretch>
-        </p:blipFill>
-        <p:spPr>
-          <a:xfrm>
-            <a:off x="2936268" y="3677120"/>
-            <a:ext cx="246400" cy="246400"/>
-          </a:xfrm>
-          <a:prstGeom prst="rect">
-            <a:avLst/>
-          </a:prstGeom>
-        </p:spPr>
-      </p:pic>
       <p:sp>
         <p:nvSpPr>
           <p:cNvPr id="9" name="Rectangle 62">
@@ -6164,7 +6080,7 @@
         </p:nvSpPr>
         <p:spPr>
           <a:xfrm>
-            <a:off x="2979790" y="2550810"/>
+            <a:off x="2949271" y="2550810"/>
             <a:ext cx="174929" cy="1129459"/>
           </a:xfrm>
           <a:prstGeom prst="rect">
@@ -6288,6 +6204,53 @@
           </a:p>
         </p:txBody>
       </p:sp>
+      <p:cxnSp>
+        <p:nvCxnSpPr>
+          <p:cNvPr id="48" name="Straight Arrow Connector 47">
+            <a:extLst>
+              <a:ext uri="{FF2B5EF4-FFF2-40B4-BE49-F238E27FC236}">
+                <a16:creationId xmlns:a16="http://schemas.microsoft.com/office/drawing/2014/main" id="{C022C69E-7109-8049-A5DB-2C203FEA4D97}"/>
+              </a:ext>
+            </a:extLst>
+          </p:cNvPr>
+          <p:cNvCxnSpPr>
+            <a:cxnSpLocks/>
+            <a:endCxn id="5" idx="2"/>
+          </p:cNvCxnSpPr>
+          <p:nvPr/>
+        </p:nvCxnSpPr>
+        <p:spPr>
+          <a:xfrm>
+            <a:off x="76200" y="5219912"/>
+            <a:ext cx="1196051" cy="0"/>
+          </a:xfrm>
+          <a:prstGeom prst="straightConnector1">
+            <a:avLst/>
+          </a:prstGeom>
+          <a:ln w="19050">
+            <a:solidFill>
+              <a:srgbClr val="0070C0"/>
+            </a:solidFill>
+            <a:prstDash val="sysDash"/>
+            <a:headEnd type="arrow" w="med" len="med"/>
+            <a:tailEnd type="none" w="med" len="med"/>
+          </a:ln>
+        </p:spPr>
+        <p:style>
+          <a:lnRef idx="1">
+            <a:schemeClr val="accent1"/>
+          </a:lnRef>
+          <a:fillRef idx="0">
+            <a:schemeClr val="accent1"/>
+          </a:fillRef>
+          <a:effectRef idx="0">
+            <a:schemeClr val="accent1"/>
+          </a:effectRef>
+          <a:fontRef idx="minor">
+            <a:schemeClr val="tx1"/>
+          </a:fontRef>
+        </p:style>
+      </p:cxnSp>
     </p:spTree>
     <p:extLst>
       <p:ext uri="{BB962C8B-B14F-4D97-AF65-F5344CB8AC3E}">

</xml_diff>

<commit_message>
Add abstract to SaveCommandUML.png in DG
</commit_message>
<xml_diff>
--- a/docs/diagrams/SaveFeatureDiagrams.pptx
+++ b/docs/diagrams/SaveFeatureDiagrams.pptx
@@ -210,7 +210,7 @@
           <a:p>
             <a:fld id="{F5CC4B3F-88C1-4FFA-B1B6-F41C21DC6924}" type="datetimeFigureOut">
               <a:rPr lang="en-US" smtClean="0"/>
-              <a:t>10/25/18</a:t>
+              <a:t>11/9/18</a:t>
             </a:fld>
             <a:endParaRPr lang="en-US"/>
           </a:p>
@@ -656,7 +656,7 @@
           <a:p>
             <a:fld id="{78C97017-6FC3-485B-9764-EAC9E56C1D49}" type="datetimeFigureOut">
               <a:rPr lang="en-US" smtClean="0"/>
-              <a:t>10/25/18</a:t>
+              <a:t>11/9/18</a:t>
             </a:fld>
             <a:endParaRPr lang="en-US"/>
           </a:p>
@@ -824,7 +824,7 @@
           <a:p>
             <a:fld id="{78C97017-6FC3-485B-9764-EAC9E56C1D49}" type="datetimeFigureOut">
               <a:rPr lang="en-US" smtClean="0"/>
-              <a:t>10/25/18</a:t>
+              <a:t>11/9/18</a:t>
             </a:fld>
             <a:endParaRPr lang="en-US"/>
           </a:p>
@@ -1002,7 +1002,7 @@
           <a:p>
             <a:fld id="{78C97017-6FC3-485B-9764-EAC9E56C1D49}" type="datetimeFigureOut">
               <a:rPr lang="en-US" smtClean="0"/>
-              <a:t>10/25/18</a:t>
+              <a:t>11/9/18</a:t>
             </a:fld>
             <a:endParaRPr lang="en-US"/>
           </a:p>
@@ -1170,7 +1170,7 @@
           <a:p>
             <a:fld id="{78C97017-6FC3-485B-9764-EAC9E56C1D49}" type="datetimeFigureOut">
               <a:rPr lang="en-US" smtClean="0"/>
-              <a:t>10/25/18</a:t>
+              <a:t>11/9/18</a:t>
             </a:fld>
             <a:endParaRPr lang="en-US"/>
           </a:p>
@@ -1415,7 +1415,7 @@
           <a:p>
             <a:fld id="{78C97017-6FC3-485B-9764-EAC9E56C1D49}" type="datetimeFigureOut">
               <a:rPr lang="en-US" smtClean="0"/>
-              <a:t>10/25/18</a:t>
+              <a:t>11/9/18</a:t>
             </a:fld>
             <a:endParaRPr lang="en-US"/>
           </a:p>
@@ -1700,7 +1700,7 @@
           <a:p>
             <a:fld id="{78C97017-6FC3-485B-9764-EAC9E56C1D49}" type="datetimeFigureOut">
               <a:rPr lang="en-US" smtClean="0"/>
-              <a:t>10/25/18</a:t>
+              <a:t>11/9/18</a:t>
             </a:fld>
             <a:endParaRPr lang="en-US"/>
           </a:p>
@@ -2119,7 +2119,7 @@
           <a:p>
             <a:fld id="{78C97017-6FC3-485B-9764-EAC9E56C1D49}" type="datetimeFigureOut">
               <a:rPr lang="en-US" smtClean="0"/>
-              <a:t>10/25/18</a:t>
+              <a:t>11/9/18</a:t>
             </a:fld>
             <a:endParaRPr lang="en-US"/>
           </a:p>
@@ -2236,7 +2236,7 @@
           <a:p>
             <a:fld id="{78C97017-6FC3-485B-9764-EAC9E56C1D49}" type="datetimeFigureOut">
               <a:rPr lang="en-US" smtClean="0"/>
-              <a:t>10/25/18</a:t>
+              <a:t>11/9/18</a:t>
             </a:fld>
             <a:endParaRPr lang="en-US"/>
           </a:p>
@@ -2331,7 +2331,7 @@
           <a:p>
             <a:fld id="{78C97017-6FC3-485B-9764-EAC9E56C1D49}" type="datetimeFigureOut">
               <a:rPr lang="en-US" smtClean="0"/>
-              <a:t>10/25/18</a:t>
+              <a:t>11/9/18</a:t>
             </a:fld>
             <a:endParaRPr lang="en-US"/>
           </a:p>
@@ -2606,7 +2606,7 @@
           <a:p>
             <a:fld id="{78C97017-6FC3-485B-9764-EAC9E56C1D49}" type="datetimeFigureOut">
               <a:rPr lang="en-US" smtClean="0"/>
-              <a:t>10/25/18</a:t>
+              <a:t>11/9/18</a:t>
             </a:fld>
             <a:endParaRPr lang="en-US"/>
           </a:p>
@@ -2858,7 +2858,7 @@
           <a:p>
             <a:fld id="{78C97017-6FC3-485B-9764-EAC9E56C1D49}" type="datetimeFigureOut">
               <a:rPr lang="en-US" smtClean="0"/>
-              <a:t>10/25/18</a:t>
+              <a:t>11/9/18</a:t>
             </a:fld>
             <a:endParaRPr lang="en-US"/>
           </a:p>
@@ -3072,7 +3072,7 @@
           <a:p>
             <a:fld id="{78C97017-6FC3-485B-9764-EAC9E56C1D49}" type="datetimeFigureOut">
               <a:rPr lang="en-US" smtClean="0"/>
-              <a:t>10/25/18</a:t>
+              <a:t>11/9/18</a:t>
             </a:fld>
             <a:endParaRPr lang="en-US"/>
           </a:p>
@@ -3612,8 +3612,8 @@
         </p:nvSpPr>
         <p:spPr>
           <a:xfrm>
-            <a:off x="2671041" y="1317538"/>
-            <a:ext cx="1589103" cy="346760"/>
+            <a:off x="2671041" y="1143000"/>
+            <a:ext cx="1589103" cy="521298"/>
           </a:xfrm>
           <a:prstGeom prst="rect">
             <a:avLst/>
@@ -3639,6 +3639,17 @@
         <p:txBody>
           <a:bodyPr rtlCol="0" anchor="ctr"/>
           <a:lstStyle/>
+          <a:p>
+            <a:pPr algn="ctr"/>
+            <a:r>
+              <a:rPr lang="en-US" sz="1400" b="1" i="1" dirty="0">
+                <a:solidFill>
+                  <a:schemeClr val="bg1"/>
+                </a:solidFill>
+              </a:rPr>
+              <a:t>{abstract}</a:t>
+            </a:r>
+          </a:p>
           <a:p>
             <a:pPr algn="ctr"/>
             <a:r>

</xml_diff>

<commit_message>
Minor update to DG
</commit_message>
<xml_diff>
--- a/docs/diagrams/SaveFeatureDiagrams.pptx
+++ b/docs/diagrams/SaveFeatureDiagrams.pptx
@@ -5,12 +5,13 @@
     <p:sldMasterId id="2147483648" r:id="rId1"/>
   </p:sldMasterIdLst>
   <p:notesMasterIdLst>
-    <p:notesMasterId r:id="rId5"/>
+    <p:notesMasterId r:id="rId6"/>
   </p:notesMasterIdLst>
   <p:sldIdLst>
     <p:sldId id="267" r:id="rId2"/>
     <p:sldId id="268" r:id="rId3"/>
     <p:sldId id="266" r:id="rId4"/>
+    <p:sldId id="269" r:id="rId5"/>
   </p:sldIdLst>
   <p:sldSz cx="9144000" cy="6858000" type="screen4x3"/>
   <p:notesSz cx="6858000" cy="9144000"/>
@@ -210,7 +211,7 @@
           <a:p>
             <a:fld id="{F5CC4B3F-88C1-4FFA-B1B6-F41C21DC6924}" type="datetimeFigureOut">
               <a:rPr lang="en-US" smtClean="0"/>
-              <a:t>11/9/18</a:t>
+              <a:t>11/12/18</a:t>
             </a:fld>
             <a:endParaRPr lang="en-US"/>
           </a:p>
@@ -656,7 +657,7 @@
           <a:p>
             <a:fld id="{78C97017-6FC3-485B-9764-EAC9E56C1D49}" type="datetimeFigureOut">
               <a:rPr lang="en-US" smtClean="0"/>
-              <a:t>11/9/18</a:t>
+              <a:t>11/12/18</a:t>
             </a:fld>
             <a:endParaRPr lang="en-US"/>
           </a:p>
@@ -824,7 +825,7 @@
           <a:p>
             <a:fld id="{78C97017-6FC3-485B-9764-EAC9E56C1D49}" type="datetimeFigureOut">
               <a:rPr lang="en-US" smtClean="0"/>
-              <a:t>11/9/18</a:t>
+              <a:t>11/12/18</a:t>
             </a:fld>
             <a:endParaRPr lang="en-US"/>
           </a:p>
@@ -1002,7 +1003,7 @@
           <a:p>
             <a:fld id="{78C97017-6FC3-485B-9764-EAC9E56C1D49}" type="datetimeFigureOut">
               <a:rPr lang="en-US" smtClean="0"/>
-              <a:t>11/9/18</a:t>
+              <a:t>11/12/18</a:t>
             </a:fld>
             <a:endParaRPr lang="en-US"/>
           </a:p>
@@ -1170,7 +1171,7 @@
           <a:p>
             <a:fld id="{78C97017-6FC3-485B-9764-EAC9E56C1D49}" type="datetimeFigureOut">
               <a:rPr lang="en-US" smtClean="0"/>
-              <a:t>11/9/18</a:t>
+              <a:t>11/12/18</a:t>
             </a:fld>
             <a:endParaRPr lang="en-US"/>
           </a:p>
@@ -1415,7 +1416,7 @@
           <a:p>
             <a:fld id="{78C97017-6FC3-485B-9764-EAC9E56C1D49}" type="datetimeFigureOut">
               <a:rPr lang="en-US" smtClean="0"/>
-              <a:t>11/9/18</a:t>
+              <a:t>11/12/18</a:t>
             </a:fld>
             <a:endParaRPr lang="en-US"/>
           </a:p>
@@ -1700,7 +1701,7 @@
           <a:p>
             <a:fld id="{78C97017-6FC3-485B-9764-EAC9E56C1D49}" type="datetimeFigureOut">
               <a:rPr lang="en-US" smtClean="0"/>
-              <a:t>11/9/18</a:t>
+              <a:t>11/12/18</a:t>
             </a:fld>
             <a:endParaRPr lang="en-US"/>
           </a:p>
@@ -2119,7 +2120,7 @@
           <a:p>
             <a:fld id="{78C97017-6FC3-485B-9764-EAC9E56C1D49}" type="datetimeFigureOut">
               <a:rPr lang="en-US" smtClean="0"/>
-              <a:t>11/9/18</a:t>
+              <a:t>11/12/18</a:t>
             </a:fld>
             <a:endParaRPr lang="en-US"/>
           </a:p>
@@ -2236,7 +2237,7 @@
           <a:p>
             <a:fld id="{78C97017-6FC3-485B-9764-EAC9E56C1D49}" type="datetimeFigureOut">
               <a:rPr lang="en-US" smtClean="0"/>
-              <a:t>11/9/18</a:t>
+              <a:t>11/12/18</a:t>
             </a:fld>
             <a:endParaRPr lang="en-US"/>
           </a:p>
@@ -2331,7 +2332,7 @@
           <a:p>
             <a:fld id="{78C97017-6FC3-485B-9764-EAC9E56C1D49}" type="datetimeFigureOut">
               <a:rPr lang="en-US" smtClean="0"/>
-              <a:t>11/9/18</a:t>
+              <a:t>11/12/18</a:t>
             </a:fld>
             <a:endParaRPr lang="en-US"/>
           </a:p>
@@ -2606,7 +2607,7 @@
           <a:p>
             <a:fld id="{78C97017-6FC3-485B-9764-EAC9E56C1D49}" type="datetimeFigureOut">
               <a:rPr lang="en-US" smtClean="0"/>
-              <a:t>11/9/18</a:t>
+              <a:t>11/12/18</a:t>
             </a:fld>
             <a:endParaRPr lang="en-US"/>
           </a:p>
@@ -2858,7 +2859,7 @@
           <a:p>
             <a:fld id="{78C97017-6FC3-485B-9764-EAC9E56C1D49}" type="datetimeFigureOut">
               <a:rPr lang="en-US" smtClean="0"/>
-              <a:t>11/9/18</a:t>
+              <a:t>11/12/18</a:t>
             </a:fld>
             <a:endParaRPr lang="en-US"/>
           </a:p>
@@ -3072,7 +3073,7 @@
           <a:p>
             <a:fld id="{78C97017-6FC3-485B-9764-EAC9E56C1D49}" type="datetimeFigureOut">
               <a:rPr lang="en-US" smtClean="0"/>
-              <a:t>11/9/18</a:t>
+              <a:t>11/12/18</a:t>
             </a:fld>
             <a:endParaRPr lang="en-US"/>
           </a:p>
@@ -8532,6 +8533,932 @@
     <p:extLst>
       <p:ext uri="{BB962C8B-B14F-4D97-AF65-F5344CB8AC3E}">
         <p14:creationId xmlns:p14="http://schemas.microsoft.com/office/powerpoint/2010/main" val="4023378879"/>
+      </p:ext>
+    </p:extLst>
+  </p:cSld>
+  <p:clrMapOvr>
+    <a:masterClrMapping/>
+  </p:clrMapOvr>
+</p:sld>
+</file>
+
+<file path=ppt/slides/slide4.xml><?xml version="1.0" encoding="utf-8"?>
+<p:sld xmlns:a="http://schemas.openxmlformats.org/drawingml/2006/main" xmlns:r="http://schemas.openxmlformats.org/officeDocument/2006/relationships" xmlns:p="http://schemas.openxmlformats.org/presentationml/2006/main">
+  <p:cSld>
+    <p:spTree>
+      <p:nvGrpSpPr>
+        <p:cNvPr id="1" name=""/>
+        <p:cNvGrpSpPr/>
+        <p:nvPr/>
+      </p:nvGrpSpPr>
+      <p:grpSpPr>
+        <a:xfrm>
+          <a:off x="0" y="0"/>
+          <a:ext cx="0" cy="0"/>
+          <a:chOff x="0" y="0"/>
+          <a:chExt cx="0" cy="0"/>
+        </a:xfrm>
+      </p:grpSpPr>
+      <p:sp>
+        <p:nvSpPr>
+          <p:cNvPr id="2" name="Oval 1">
+            <a:extLst>
+              <a:ext uri="{FF2B5EF4-FFF2-40B4-BE49-F238E27FC236}">
+                <a16:creationId xmlns:a16="http://schemas.microsoft.com/office/drawing/2014/main" id="{F1FA7AD3-69B8-A64A-9F45-C1F132ED0E90}"/>
+              </a:ext>
+            </a:extLst>
+          </p:cNvPr>
+          <p:cNvSpPr/>
+          <p:nvPr/>
+        </p:nvSpPr>
+        <p:spPr>
+          <a:xfrm>
+            <a:off x="-1371600" y="3075738"/>
+            <a:ext cx="235669" cy="235669"/>
+          </a:xfrm>
+          <a:prstGeom prst="ellipse">
+            <a:avLst/>
+          </a:prstGeom>
+        </p:spPr>
+        <p:style>
+          <a:lnRef idx="1">
+            <a:schemeClr val="accent1"/>
+          </a:lnRef>
+          <a:fillRef idx="2">
+            <a:schemeClr val="accent1"/>
+          </a:fillRef>
+          <a:effectRef idx="1">
+            <a:schemeClr val="accent1"/>
+          </a:effectRef>
+          <a:fontRef idx="minor">
+            <a:schemeClr val="dk1"/>
+          </a:fontRef>
+        </p:style>
+        <p:txBody>
+          <a:bodyPr rot="0" spcFirstLastPara="0" vertOverflow="overflow" horzOverflow="overflow" vert="horz" wrap="square" lIns="91440" tIns="45721" rIns="91440" bIns="45721" numCol="1" spcCol="0" rtlCol="0" fromWordArt="0" anchor="ctr" anchorCtr="0" forceAA="0" compatLnSpc="1">
+            <a:prstTxWarp prst="textNoShape">
+              <a:avLst/>
+            </a:prstTxWarp>
+            <a:noAutofit/>
+          </a:bodyPr>
+          <a:lstStyle/>
+          <a:p>
+            <a:pPr algn="ctr"/>
+            <a:endParaRPr lang="en-SG" sz="1801"/>
+          </a:p>
+        </p:txBody>
+      </p:sp>
+      <p:cxnSp>
+        <p:nvCxnSpPr>
+          <p:cNvPr id="3" name="Straight Arrow Connector 2">
+            <a:extLst>
+              <a:ext uri="{FF2B5EF4-FFF2-40B4-BE49-F238E27FC236}">
+                <a16:creationId xmlns:a16="http://schemas.microsoft.com/office/drawing/2014/main" id="{D425398A-7393-7146-AF16-F80324A81D97}"/>
+              </a:ext>
+            </a:extLst>
+          </p:cNvPr>
+          <p:cNvCxnSpPr>
+            <a:cxnSpLocks/>
+            <a:stCxn id="2" idx="6"/>
+            <a:endCxn id="4" idx="1"/>
+          </p:cNvCxnSpPr>
+          <p:nvPr/>
+        </p:nvCxnSpPr>
+        <p:spPr>
+          <a:xfrm>
+            <a:off x="-1135931" y="3193573"/>
+            <a:ext cx="227605" cy="1772"/>
+          </a:xfrm>
+          <a:prstGeom prst="straightConnector1">
+            <a:avLst/>
+          </a:prstGeom>
+          <a:ln>
+            <a:tailEnd type="triangle"/>
+          </a:ln>
+        </p:spPr>
+        <p:style>
+          <a:lnRef idx="1">
+            <a:schemeClr val="dk1"/>
+          </a:lnRef>
+          <a:fillRef idx="0">
+            <a:schemeClr val="dk1"/>
+          </a:fillRef>
+          <a:effectRef idx="0">
+            <a:schemeClr val="dk1"/>
+          </a:effectRef>
+          <a:fontRef idx="minor">
+            <a:schemeClr val="tx1"/>
+          </a:fontRef>
+        </p:style>
+      </p:cxnSp>
+      <p:sp>
+        <p:nvSpPr>
+          <p:cNvPr id="4" name="Rectangle: Rounded Corners 7">
+            <a:extLst>
+              <a:ext uri="{FF2B5EF4-FFF2-40B4-BE49-F238E27FC236}">
+                <a16:creationId xmlns:a16="http://schemas.microsoft.com/office/drawing/2014/main" id="{AEDDD6A1-EA16-F744-BEEC-28D04C4183C7}"/>
+              </a:ext>
+            </a:extLst>
+          </p:cNvPr>
+          <p:cNvSpPr/>
+          <p:nvPr/>
+        </p:nvSpPr>
+        <p:spPr>
+          <a:xfrm>
+            <a:off x="-908326" y="2721413"/>
+            <a:ext cx="1570355" cy="947864"/>
+          </a:xfrm>
+          <a:prstGeom prst="roundRect">
+            <a:avLst/>
+          </a:prstGeom>
+        </p:spPr>
+        <p:style>
+          <a:lnRef idx="1">
+            <a:schemeClr val="accent5"/>
+          </a:lnRef>
+          <a:fillRef idx="2">
+            <a:schemeClr val="accent5"/>
+          </a:fillRef>
+          <a:effectRef idx="1">
+            <a:schemeClr val="accent5"/>
+          </a:effectRef>
+          <a:fontRef idx="minor">
+            <a:schemeClr val="dk1"/>
+          </a:fontRef>
+        </p:style>
+        <p:txBody>
+          <a:bodyPr rot="0" spcFirstLastPara="0" vertOverflow="overflow" horzOverflow="overflow" vert="horz" wrap="square" lIns="91440" tIns="45721" rIns="91440" bIns="45721" numCol="1" spcCol="0" rtlCol="0" fromWordArt="0" anchor="ctr" anchorCtr="0" forceAA="0" compatLnSpc="1">
+            <a:prstTxWarp prst="textNoShape">
+              <a:avLst/>
+            </a:prstTxWarp>
+            <a:noAutofit/>
+          </a:bodyPr>
+          <a:lstStyle/>
+          <a:p>
+            <a:pPr algn="ctr"/>
+            <a:r>
+              <a:rPr lang="en-SG" sz="1801" dirty="0"/>
+              <a:t>User executes save command</a:t>
+            </a:r>
+          </a:p>
+        </p:txBody>
+      </p:sp>
+      <p:cxnSp>
+        <p:nvCxnSpPr>
+          <p:cNvPr id="5" name="Straight Arrow Connector 4">
+            <a:extLst>
+              <a:ext uri="{FF2B5EF4-FFF2-40B4-BE49-F238E27FC236}">
+                <a16:creationId xmlns:a16="http://schemas.microsoft.com/office/drawing/2014/main" id="{2BF992BE-D2EE-7443-839B-59993B2DD1D7}"/>
+              </a:ext>
+            </a:extLst>
+          </p:cNvPr>
+          <p:cNvCxnSpPr>
+            <a:cxnSpLocks/>
+            <a:stCxn id="4" idx="3"/>
+            <a:endCxn id="10" idx="1"/>
+          </p:cNvCxnSpPr>
+          <p:nvPr/>
+        </p:nvCxnSpPr>
+        <p:spPr>
+          <a:xfrm flipV="1">
+            <a:off x="662029" y="3191462"/>
+            <a:ext cx="1043331" cy="3883"/>
+          </a:xfrm>
+          <a:prstGeom prst="straightConnector1">
+            <a:avLst/>
+          </a:prstGeom>
+          <a:ln>
+            <a:tailEnd type="triangle"/>
+          </a:ln>
+        </p:spPr>
+        <p:style>
+          <a:lnRef idx="1">
+            <a:schemeClr val="dk1"/>
+          </a:lnRef>
+          <a:fillRef idx="0">
+            <a:schemeClr val="dk1"/>
+          </a:fillRef>
+          <a:effectRef idx="0">
+            <a:schemeClr val="dk1"/>
+          </a:effectRef>
+          <a:fontRef idx="minor">
+            <a:schemeClr val="tx1"/>
+          </a:fontRef>
+        </p:style>
+      </p:cxnSp>
+      <p:sp>
+        <p:nvSpPr>
+          <p:cNvPr id="6" name="Diamond 5">
+            <a:extLst>
+              <a:ext uri="{FF2B5EF4-FFF2-40B4-BE49-F238E27FC236}">
+                <a16:creationId xmlns:a16="http://schemas.microsoft.com/office/drawing/2014/main" id="{44962464-8970-7046-BA8A-9AEB1F53A0F6}"/>
+              </a:ext>
+            </a:extLst>
+          </p:cNvPr>
+          <p:cNvSpPr/>
+          <p:nvPr/>
+        </p:nvSpPr>
+        <p:spPr>
+          <a:xfrm>
+            <a:off x="7855788" y="2819400"/>
+            <a:ext cx="480766" cy="480766"/>
+          </a:xfrm>
+          <a:prstGeom prst="diamond">
+            <a:avLst/>
+          </a:prstGeom>
+        </p:spPr>
+        <p:style>
+          <a:lnRef idx="1">
+            <a:schemeClr val="accent6"/>
+          </a:lnRef>
+          <a:fillRef idx="2">
+            <a:schemeClr val="accent6"/>
+          </a:fillRef>
+          <a:effectRef idx="1">
+            <a:schemeClr val="accent6"/>
+          </a:effectRef>
+          <a:fontRef idx="minor">
+            <a:schemeClr val="dk1"/>
+          </a:fontRef>
+        </p:style>
+        <p:txBody>
+          <a:bodyPr rot="0" spcFirstLastPara="0" vertOverflow="overflow" horzOverflow="overflow" vert="horz" wrap="square" lIns="91440" tIns="45721" rIns="91440" bIns="45721" numCol="1" spcCol="0" rtlCol="0" fromWordArt="0" anchor="ctr" anchorCtr="0" forceAA="0" compatLnSpc="1">
+            <a:prstTxWarp prst="textNoShape">
+              <a:avLst/>
+            </a:prstTxWarp>
+            <a:noAutofit/>
+          </a:bodyPr>
+          <a:lstStyle/>
+          <a:p>
+            <a:pPr algn="ctr"/>
+            <a:endParaRPr lang="en-SG" sz="1801"/>
+          </a:p>
+        </p:txBody>
+      </p:sp>
+      <p:sp>
+        <p:nvSpPr>
+          <p:cNvPr id="7" name="TextBox 6">
+            <a:extLst>
+              <a:ext uri="{FF2B5EF4-FFF2-40B4-BE49-F238E27FC236}">
+                <a16:creationId xmlns:a16="http://schemas.microsoft.com/office/drawing/2014/main" id="{44F0EA4E-0EA0-3049-B4FD-373F15478AE8}"/>
+              </a:ext>
+            </a:extLst>
+          </p:cNvPr>
+          <p:cNvSpPr txBox="1"/>
+          <p:nvPr/>
+        </p:nvSpPr>
+        <p:spPr>
+          <a:xfrm>
+            <a:off x="1294229" y="3672227"/>
+            <a:ext cx="853127" cy="369460"/>
+          </a:xfrm>
+          <a:prstGeom prst="rect">
+            <a:avLst/>
+          </a:prstGeom>
+          <a:noFill/>
+        </p:spPr>
+        <p:txBody>
+          <a:bodyPr wrap="square" rtlCol="0">
+            <a:spAutoFit/>
+          </a:bodyPr>
+          <a:lstStyle/>
+          <a:p>
+            <a:r>
+              <a:rPr lang="en-SG" sz="1801" dirty="0"/>
+              <a:t>[else]</a:t>
+            </a:r>
+          </a:p>
+        </p:txBody>
+      </p:sp>
+      <p:sp>
+        <p:nvSpPr>
+          <p:cNvPr id="8" name="TextBox 7">
+            <a:extLst>
+              <a:ext uri="{FF2B5EF4-FFF2-40B4-BE49-F238E27FC236}">
+                <a16:creationId xmlns:a16="http://schemas.microsoft.com/office/drawing/2014/main" id="{788B994D-6B72-9E41-ACBC-E4B75E7D2CFF}"/>
+              </a:ext>
+            </a:extLst>
+          </p:cNvPr>
+          <p:cNvSpPr txBox="1"/>
+          <p:nvPr/>
+        </p:nvSpPr>
+        <p:spPr>
+          <a:xfrm>
+            <a:off x="511247" y="2187412"/>
+            <a:ext cx="2066045" cy="369460"/>
+          </a:xfrm>
+          <a:prstGeom prst="rect">
+            <a:avLst/>
+          </a:prstGeom>
+          <a:noFill/>
+        </p:spPr>
+        <p:txBody>
+          <a:bodyPr wrap="square" rtlCol="0">
+            <a:spAutoFit/>
+          </a:bodyPr>
+          <a:lstStyle/>
+          <a:p>
+            <a:r>
+              <a:rPr lang="en-SG" sz="1801" dirty="0"/>
+              <a:t>[</a:t>
+            </a:r>
+            <a:r>
+              <a:rPr lang="en-US" dirty="0"/>
+              <a:t>user is logged in]</a:t>
+            </a:r>
+            <a:endParaRPr lang="en-SG" sz="1801" dirty="0"/>
+          </a:p>
+        </p:txBody>
+      </p:sp>
+      <p:sp>
+        <p:nvSpPr>
+          <p:cNvPr id="9" name="Rectangle: Rounded Corners 50">
+            <a:extLst>
+              <a:ext uri="{FF2B5EF4-FFF2-40B4-BE49-F238E27FC236}">
+                <a16:creationId xmlns:a16="http://schemas.microsoft.com/office/drawing/2014/main" id="{F8582E35-EC06-2245-849A-86EA5BEC4727}"/>
+              </a:ext>
+            </a:extLst>
+          </p:cNvPr>
+          <p:cNvSpPr/>
+          <p:nvPr/>
+        </p:nvSpPr>
+        <p:spPr>
+          <a:xfrm>
+            <a:off x="2426509" y="2381150"/>
+            <a:ext cx="1865543" cy="578937"/>
+          </a:xfrm>
+          <a:prstGeom prst="roundRect">
+            <a:avLst/>
+          </a:prstGeom>
+        </p:spPr>
+        <p:style>
+          <a:lnRef idx="1">
+            <a:schemeClr val="accent6"/>
+          </a:lnRef>
+          <a:fillRef idx="2">
+            <a:schemeClr val="accent6"/>
+          </a:fillRef>
+          <a:effectRef idx="1">
+            <a:schemeClr val="accent6"/>
+          </a:effectRef>
+          <a:fontRef idx="minor">
+            <a:schemeClr val="dk1"/>
+          </a:fontRef>
+        </p:style>
+        <p:txBody>
+          <a:bodyPr rot="0" spcFirstLastPara="0" vertOverflow="overflow" horzOverflow="overflow" vert="horz" wrap="square" lIns="91440" tIns="45721" rIns="91440" bIns="45721" numCol="1" spcCol="0" rtlCol="0" fromWordArt="0" anchor="ctr" anchorCtr="0" forceAA="0" compatLnSpc="1">
+            <a:prstTxWarp prst="textNoShape">
+              <a:avLst/>
+            </a:prstTxWarp>
+            <a:noAutofit/>
+          </a:bodyPr>
+          <a:lstStyle/>
+          <a:p>
+            <a:pPr algn="ctr"/>
+            <a:r>
+              <a:rPr lang="en-SG" sz="1801" dirty="0"/>
+              <a:t>Encrypts certain field</a:t>
+            </a:r>
+          </a:p>
+        </p:txBody>
+      </p:sp>
+      <p:sp>
+        <p:nvSpPr>
+          <p:cNvPr id="10" name="Diamond 9">
+            <a:extLst>
+              <a:ext uri="{FF2B5EF4-FFF2-40B4-BE49-F238E27FC236}">
+                <a16:creationId xmlns:a16="http://schemas.microsoft.com/office/drawing/2014/main" id="{E4EDCC9D-3527-1B4F-A14A-0F4E09949A29}"/>
+              </a:ext>
+            </a:extLst>
+          </p:cNvPr>
+          <p:cNvSpPr/>
+          <p:nvPr/>
+        </p:nvSpPr>
+        <p:spPr>
+          <a:xfrm>
+            <a:off x="1705360" y="2951079"/>
+            <a:ext cx="480766" cy="480766"/>
+          </a:xfrm>
+          <a:prstGeom prst="diamond">
+            <a:avLst/>
+          </a:prstGeom>
+        </p:spPr>
+        <p:style>
+          <a:lnRef idx="1">
+            <a:schemeClr val="accent6"/>
+          </a:lnRef>
+          <a:fillRef idx="2">
+            <a:schemeClr val="accent6"/>
+          </a:fillRef>
+          <a:effectRef idx="1">
+            <a:schemeClr val="accent6"/>
+          </a:effectRef>
+          <a:fontRef idx="minor">
+            <a:schemeClr val="dk1"/>
+          </a:fontRef>
+        </p:style>
+        <p:txBody>
+          <a:bodyPr rot="0" spcFirstLastPara="0" vertOverflow="overflow" horzOverflow="overflow" vert="horz" wrap="square" lIns="91440" tIns="45721" rIns="91440" bIns="45721" numCol="1" spcCol="0" rtlCol="0" fromWordArt="0" anchor="ctr" anchorCtr="0" forceAA="0" compatLnSpc="1">
+            <a:prstTxWarp prst="textNoShape">
+              <a:avLst/>
+            </a:prstTxWarp>
+            <a:noAutofit/>
+          </a:bodyPr>
+          <a:lstStyle/>
+          <a:p>
+            <a:pPr algn="ctr"/>
+            <a:endParaRPr lang="en-SG" sz="1801"/>
+          </a:p>
+        </p:txBody>
+      </p:sp>
+      <p:cxnSp>
+        <p:nvCxnSpPr>
+          <p:cNvPr id="11" name="Straight Arrow Connector 10">
+            <a:extLst>
+              <a:ext uri="{FF2B5EF4-FFF2-40B4-BE49-F238E27FC236}">
+                <a16:creationId xmlns:a16="http://schemas.microsoft.com/office/drawing/2014/main" id="{96DBDA5B-8FAB-1440-B246-2CA170944B16}"/>
+              </a:ext>
+            </a:extLst>
+          </p:cNvPr>
+          <p:cNvCxnSpPr>
+            <a:cxnSpLocks/>
+            <a:stCxn id="6" idx="3"/>
+            <a:endCxn id="13" idx="2"/>
+          </p:cNvCxnSpPr>
+          <p:nvPr/>
+        </p:nvCxnSpPr>
+        <p:spPr>
+          <a:xfrm>
+            <a:off x="8336554" y="3059783"/>
+            <a:ext cx="419377" cy="7529"/>
+          </a:xfrm>
+          <a:prstGeom prst="straightConnector1">
+            <a:avLst/>
+          </a:prstGeom>
+          <a:ln>
+            <a:tailEnd type="triangle"/>
+          </a:ln>
+        </p:spPr>
+        <p:style>
+          <a:lnRef idx="1">
+            <a:schemeClr val="dk1"/>
+          </a:lnRef>
+          <a:fillRef idx="0">
+            <a:schemeClr val="dk1"/>
+          </a:fillRef>
+          <a:effectRef idx="0">
+            <a:schemeClr val="dk1"/>
+          </a:effectRef>
+          <a:fontRef idx="minor">
+            <a:schemeClr val="tx1"/>
+          </a:fontRef>
+        </p:style>
+      </p:cxnSp>
+      <p:grpSp>
+        <p:nvGrpSpPr>
+          <p:cNvPr id="12" name="Group 11">
+            <a:extLst>
+              <a:ext uri="{FF2B5EF4-FFF2-40B4-BE49-F238E27FC236}">
+                <a16:creationId xmlns:a16="http://schemas.microsoft.com/office/drawing/2014/main" id="{F6D1A782-12C7-1948-874F-FD4723BB5209}"/>
+              </a:ext>
+            </a:extLst>
+          </p:cNvPr>
+          <p:cNvGrpSpPr/>
+          <p:nvPr/>
+        </p:nvGrpSpPr>
+        <p:grpSpPr>
+          <a:xfrm>
+            <a:off x="8755931" y="2949477"/>
+            <a:ext cx="235669" cy="235669"/>
+            <a:chOff x="8040730" y="5082186"/>
+            <a:chExt cx="235669" cy="235669"/>
+          </a:xfrm>
+        </p:grpSpPr>
+        <p:sp>
+          <p:nvSpPr>
+            <p:cNvPr id="13" name="Oval 12">
+              <a:extLst>
+                <a:ext uri="{FF2B5EF4-FFF2-40B4-BE49-F238E27FC236}">
+                  <a16:creationId xmlns:a16="http://schemas.microsoft.com/office/drawing/2014/main" id="{1469FAA7-C030-3141-B4E2-CC55B48A3B72}"/>
+                </a:ext>
+              </a:extLst>
+            </p:cNvPr>
+            <p:cNvSpPr/>
+            <p:nvPr/>
+          </p:nvSpPr>
+          <p:spPr>
+            <a:xfrm>
+              <a:off x="8040730" y="5082186"/>
+              <a:ext cx="235669" cy="235669"/>
+            </a:xfrm>
+            <a:prstGeom prst="ellipse">
+              <a:avLst/>
+            </a:prstGeom>
+            <a:solidFill>
+              <a:schemeClr val="bg1"/>
+            </a:solidFill>
+          </p:spPr>
+          <p:style>
+            <a:lnRef idx="1">
+              <a:schemeClr val="accent1"/>
+            </a:lnRef>
+            <a:fillRef idx="2">
+              <a:schemeClr val="accent1"/>
+            </a:fillRef>
+            <a:effectRef idx="1">
+              <a:schemeClr val="accent1"/>
+            </a:effectRef>
+            <a:fontRef idx="minor">
+              <a:schemeClr val="dk1"/>
+            </a:fontRef>
+          </p:style>
+          <p:txBody>
+            <a:bodyPr rot="0" spcFirstLastPara="0" vertOverflow="overflow" horzOverflow="overflow" vert="horz" wrap="square" lIns="91440" tIns="45721" rIns="91440" bIns="45721" numCol="1" spcCol="0" rtlCol="0" fromWordArt="0" anchor="ctr" anchorCtr="0" forceAA="0" compatLnSpc="1">
+              <a:prstTxWarp prst="textNoShape">
+                <a:avLst/>
+              </a:prstTxWarp>
+              <a:noAutofit/>
+            </a:bodyPr>
+            <a:lstStyle/>
+            <a:p>
+              <a:pPr algn="ctr"/>
+              <a:endParaRPr lang="en-SG" sz="1801"/>
+            </a:p>
+          </p:txBody>
+        </p:sp>
+        <p:sp>
+          <p:nvSpPr>
+            <p:cNvPr id="14" name="Oval 13">
+              <a:extLst>
+                <a:ext uri="{FF2B5EF4-FFF2-40B4-BE49-F238E27FC236}">
+                  <a16:creationId xmlns:a16="http://schemas.microsoft.com/office/drawing/2014/main" id="{2072D1DE-DB40-374B-8337-9EE59C55FBD9}"/>
+                </a:ext>
+              </a:extLst>
+            </p:cNvPr>
+            <p:cNvSpPr/>
+            <p:nvPr/>
+          </p:nvSpPr>
+          <p:spPr>
+            <a:xfrm>
+              <a:off x="8088348" y="5134633"/>
+              <a:ext cx="136201" cy="136201"/>
+            </a:xfrm>
+            <a:prstGeom prst="ellipse">
+              <a:avLst/>
+            </a:prstGeom>
+          </p:spPr>
+          <p:style>
+            <a:lnRef idx="1">
+              <a:schemeClr val="accent1"/>
+            </a:lnRef>
+            <a:fillRef idx="2">
+              <a:schemeClr val="accent1"/>
+            </a:fillRef>
+            <a:effectRef idx="1">
+              <a:schemeClr val="accent1"/>
+            </a:effectRef>
+            <a:fontRef idx="minor">
+              <a:schemeClr val="dk1"/>
+            </a:fontRef>
+          </p:style>
+          <p:txBody>
+            <a:bodyPr rot="0" spcFirstLastPara="0" vertOverflow="overflow" horzOverflow="overflow" vert="horz" wrap="square" lIns="91440" tIns="45721" rIns="91440" bIns="45721" numCol="1" spcCol="0" rtlCol="0" fromWordArt="0" anchor="ctr" anchorCtr="0" forceAA="0" compatLnSpc="1">
+              <a:prstTxWarp prst="textNoShape">
+                <a:avLst/>
+              </a:prstTxWarp>
+              <a:noAutofit/>
+            </a:bodyPr>
+            <a:lstStyle/>
+            <a:p>
+              <a:pPr algn="ctr"/>
+              <a:endParaRPr lang="en-SG" sz="1801"/>
+            </a:p>
+          </p:txBody>
+        </p:sp>
+      </p:grpSp>
+      <p:cxnSp>
+        <p:nvCxnSpPr>
+          <p:cNvPr id="15" name="Elbow Connector 14">
+            <a:extLst>
+              <a:ext uri="{FF2B5EF4-FFF2-40B4-BE49-F238E27FC236}">
+                <a16:creationId xmlns:a16="http://schemas.microsoft.com/office/drawing/2014/main" id="{FBDAB684-758D-B74E-8248-A9A495EE0AEF}"/>
+              </a:ext>
+            </a:extLst>
+          </p:cNvPr>
+          <p:cNvCxnSpPr>
+            <a:stCxn id="10" idx="0"/>
+          </p:cNvCxnSpPr>
+          <p:nvPr/>
+        </p:nvCxnSpPr>
+        <p:spPr>
+          <a:xfrm rot="5400000" flipH="1" flipV="1">
+            <a:off x="2071940" y="2595216"/>
+            <a:ext cx="229667" cy="482060"/>
+          </a:xfrm>
+          <a:prstGeom prst="bentConnector2">
+            <a:avLst/>
+          </a:prstGeom>
+          <a:ln>
+            <a:tailEnd type="triangle"/>
+          </a:ln>
+        </p:spPr>
+        <p:style>
+          <a:lnRef idx="1">
+            <a:schemeClr val="dk1"/>
+          </a:lnRef>
+          <a:fillRef idx="0">
+            <a:schemeClr val="dk1"/>
+          </a:fillRef>
+          <a:effectRef idx="0">
+            <a:schemeClr val="dk1"/>
+          </a:effectRef>
+          <a:fontRef idx="minor">
+            <a:schemeClr val="tx1"/>
+          </a:fontRef>
+        </p:style>
+      </p:cxnSp>
+      <p:cxnSp>
+        <p:nvCxnSpPr>
+          <p:cNvPr id="16" name="Elbow Connector 15">
+            <a:extLst>
+              <a:ext uri="{FF2B5EF4-FFF2-40B4-BE49-F238E27FC236}">
+                <a16:creationId xmlns:a16="http://schemas.microsoft.com/office/drawing/2014/main" id="{1B94CF18-373A-2F41-A573-F414B2652272}"/>
+              </a:ext>
+            </a:extLst>
+          </p:cNvPr>
+          <p:cNvCxnSpPr>
+            <a:cxnSpLocks/>
+            <a:stCxn id="10" idx="2"/>
+            <a:endCxn id="24" idx="1"/>
+          </p:cNvCxnSpPr>
+          <p:nvPr/>
+        </p:nvCxnSpPr>
+        <p:spPr>
+          <a:xfrm rot="16200000" flipH="1">
+            <a:off x="2051247" y="3326341"/>
+            <a:ext cx="279366" cy="490374"/>
+          </a:xfrm>
+          <a:prstGeom prst="bentConnector2">
+            <a:avLst/>
+          </a:prstGeom>
+          <a:ln>
+            <a:tailEnd type="triangle"/>
+          </a:ln>
+        </p:spPr>
+        <p:style>
+          <a:lnRef idx="1">
+            <a:schemeClr val="dk1"/>
+          </a:lnRef>
+          <a:fillRef idx="0">
+            <a:schemeClr val="dk1"/>
+          </a:fillRef>
+          <a:effectRef idx="0">
+            <a:schemeClr val="dk1"/>
+          </a:effectRef>
+          <a:fontRef idx="minor">
+            <a:schemeClr val="tx1"/>
+          </a:fontRef>
+        </p:style>
+      </p:cxnSp>
+      <p:cxnSp>
+        <p:nvCxnSpPr>
+          <p:cNvPr id="17" name="Elbow Connector 16">
+            <a:extLst>
+              <a:ext uri="{FF2B5EF4-FFF2-40B4-BE49-F238E27FC236}">
+                <a16:creationId xmlns:a16="http://schemas.microsoft.com/office/drawing/2014/main" id="{E4CC23A1-1B18-4C4A-9142-C5B0FE70BD2E}"/>
+              </a:ext>
+            </a:extLst>
+          </p:cNvPr>
+          <p:cNvCxnSpPr>
+            <a:cxnSpLocks/>
+            <a:stCxn id="20" idx="3"/>
+            <a:endCxn id="6" idx="0"/>
+          </p:cNvCxnSpPr>
+          <p:nvPr/>
+        </p:nvCxnSpPr>
+        <p:spPr>
+          <a:xfrm>
+            <a:off x="7789004" y="2377532"/>
+            <a:ext cx="307167" cy="441868"/>
+          </a:xfrm>
+          <a:prstGeom prst="bentConnector2">
+            <a:avLst/>
+          </a:prstGeom>
+          <a:ln>
+            <a:tailEnd type="triangle"/>
+          </a:ln>
+        </p:spPr>
+        <p:style>
+          <a:lnRef idx="1">
+            <a:schemeClr val="dk1"/>
+          </a:lnRef>
+          <a:fillRef idx="0">
+            <a:schemeClr val="dk1"/>
+          </a:fillRef>
+          <a:effectRef idx="0">
+            <a:schemeClr val="dk1"/>
+          </a:effectRef>
+          <a:fontRef idx="minor">
+            <a:schemeClr val="tx1"/>
+          </a:fontRef>
+        </p:style>
+      </p:cxnSp>
+      <p:sp>
+        <p:nvSpPr>
+          <p:cNvPr id="24" name="Rectangle: Rounded Corners 50">
+            <a:extLst>
+              <a:ext uri="{FF2B5EF4-FFF2-40B4-BE49-F238E27FC236}">
+                <a16:creationId xmlns:a16="http://schemas.microsoft.com/office/drawing/2014/main" id="{60114B41-9F79-8549-850C-875E427C7A40}"/>
+              </a:ext>
+            </a:extLst>
+          </p:cNvPr>
+          <p:cNvSpPr/>
+          <p:nvPr/>
+        </p:nvSpPr>
+        <p:spPr>
+          <a:xfrm>
+            <a:off x="2436117" y="3383821"/>
+            <a:ext cx="2953232" cy="654779"/>
+          </a:xfrm>
+          <a:prstGeom prst="roundRect">
+            <a:avLst/>
+          </a:prstGeom>
+        </p:spPr>
+        <p:style>
+          <a:lnRef idx="1">
+            <a:schemeClr val="accent6"/>
+          </a:lnRef>
+          <a:fillRef idx="2">
+            <a:schemeClr val="accent6"/>
+          </a:fillRef>
+          <a:effectRef idx="1">
+            <a:schemeClr val="accent6"/>
+          </a:effectRef>
+          <a:fontRef idx="minor">
+            <a:schemeClr val="dk1"/>
+          </a:fontRef>
+        </p:style>
+        <p:txBody>
+          <a:bodyPr rot="0" spcFirstLastPara="0" vertOverflow="overflow" horzOverflow="overflow" vert="horz" wrap="square" lIns="91440" tIns="45721" rIns="91440" bIns="45721" numCol="1" spcCol="0" rtlCol="0" fromWordArt="0" anchor="ctr" anchorCtr="0" forceAA="0" compatLnSpc="1">
+            <a:prstTxWarp prst="textNoShape">
+              <a:avLst/>
+            </a:prstTxWarp>
+            <a:noAutofit/>
+          </a:bodyPr>
+          <a:lstStyle/>
+          <a:p>
+            <a:pPr algn="ctr"/>
+            <a:r>
+              <a:rPr lang="en-SG" sz="1801" dirty="0"/>
+              <a:t>Does not save and returns error message </a:t>
+            </a:r>
+          </a:p>
+        </p:txBody>
+      </p:sp>
+      <p:cxnSp>
+        <p:nvCxnSpPr>
+          <p:cNvPr id="26" name="Elbow Connector 25">
+            <a:extLst>
+              <a:ext uri="{FF2B5EF4-FFF2-40B4-BE49-F238E27FC236}">
+                <a16:creationId xmlns:a16="http://schemas.microsoft.com/office/drawing/2014/main" id="{4CB3C017-2B01-3D46-89D7-54B09383CD85}"/>
+              </a:ext>
+            </a:extLst>
+          </p:cNvPr>
+          <p:cNvCxnSpPr>
+            <a:cxnSpLocks/>
+            <a:stCxn id="24" idx="3"/>
+            <a:endCxn id="6" idx="2"/>
+          </p:cNvCxnSpPr>
+          <p:nvPr/>
+        </p:nvCxnSpPr>
+        <p:spPr>
+          <a:xfrm flipV="1">
+            <a:off x="5389349" y="3300166"/>
+            <a:ext cx="2706822" cy="411045"/>
+          </a:xfrm>
+          <a:prstGeom prst="bentConnector2">
+            <a:avLst/>
+          </a:prstGeom>
+          <a:ln>
+            <a:tailEnd type="triangle"/>
+          </a:ln>
+        </p:spPr>
+        <p:style>
+          <a:lnRef idx="1">
+            <a:schemeClr val="dk1"/>
+          </a:lnRef>
+          <a:fillRef idx="0">
+            <a:schemeClr val="dk1"/>
+          </a:fillRef>
+          <a:effectRef idx="0">
+            <a:schemeClr val="dk1"/>
+          </a:effectRef>
+          <a:fontRef idx="minor">
+            <a:schemeClr val="tx1"/>
+          </a:fontRef>
+        </p:style>
+      </p:cxnSp>
+      <p:sp>
+        <p:nvSpPr>
+          <p:cNvPr id="20" name="Rectangle: Rounded Corners 50">
+            <a:extLst>
+              <a:ext uri="{FF2B5EF4-FFF2-40B4-BE49-F238E27FC236}">
+                <a16:creationId xmlns:a16="http://schemas.microsoft.com/office/drawing/2014/main" id="{C540648A-DE72-B34B-BB7F-3D01F15C79CC}"/>
+              </a:ext>
+            </a:extLst>
+          </p:cNvPr>
+          <p:cNvSpPr/>
+          <p:nvPr/>
+        </p:nvSpPr>
+        <p:spPr>
+          <a:xfrm>
+            <a:off x="4835772" y="2088063"/>
+            <a:ext cx="2953232" cy="578937"/>
+          </a:xfrm>
+          <a:prstGeom prst="roundRect">
+            <a:avLst/>
+          </a:prstGeom>
+        </p:spPr>
+        <p:style>
+          <a:lnRef idx="1">
+            <a:schemeClr val="accent6"/>
+          </a:lnRef>
+          <a:fillRef idx="2">
+            <a:schemeClr val="accent6"/>
+          </a:fillRef>
+          <a:effectRef idx="1">
+            <a:schemeClr val="accent6"/>
+          </a:effectRef>
+          <a:fontRef idx="minor">
+            <a:schemeClr val="dk1"/>
+          </a:fontRef>
+        </p:style>
+        <p:txBody>
+          <a:bodyPr rot="0" spcFirstLastPara="0" vertOverflow="overflow" horzOverflow="overflow" vert="horz" wrap="square" lIns="91440" tIns="45721" rIns="91440" bIns="45721" numCol="1" spcCol="0" rtlCol="0" fromWordArt="0" anchor="ctr" anchorCtr="0" forceAA="0" compatLnSpc="1">
+            <a:prstTxWarp prst="textNoShape">
+              <a:avLst/>
+            </a:prstTxWarp>
+            <a:noAutofit/>
+          </a:bodyPr>
+          <a:lstStyle/>
+          <a:p>
+            <a:pPr algn="ctr"/>
+            <a:r>
+              <a:rPr lang="en-SG" sz="1801" dirty="0"/>
+              <a:t>Saves current user to the specified file path  </a:t>
+            </a:r>
+          </a:p>
+        </p:txBody>
+      </p:sp>
+      <p:cxnSp>
+        <p:nvCxnSpPr>
+          <p:cNvPr id="29" name="Elbow Connector 28">
+            <a:extLst>
+              <a:ext uri="{FF2B5EF4-FFF2-40B4-BE49-F238E27FC236}">
+                <a16:creationId xmlns:a16="http://schemas.microsoft.com/office/drawing/2014/main" id="{E29A5928-FDF7-6346-810B-154E5FDC02EC}"/>
+              </a:ext>
+            </a:extLst>
+          </p:cNvPr>
+          <p:cNvCxnSpPr>
+            <a:cxnSpLocks/>
+            <a:stCxn id="9" idx="3"/>
+            <a:endCxn id="20" idx="1"/>
+          </p:cNvCxnSpPr>
+          <p:nvPr/>
+        </p:nvCxnSpPr>
+        <p:spPr>
+          <a:xfrm flipV="1">
+            <a:off x="4292052" y="2377532"/>
+            <a:ext cx="543720" cy="293087"/>
+          </a:xfrm>
+          <a:prstGeom prst="bentConnector3">
+            <a:avLst>
+              <a:gd name="adj1" fmla="val 50000"/>
+            </a:avLst>
+          </a:prstGeom>
+          <a:ln>
+            <a:tailEnd type="triangle"/>
+          </a:ln>
+        </p:spPr>
+        <p:style>
+          <a:lnRef idx="1">
+            <a:schemeClr val="dk1"/>
+          </a:lnRef>
+          <a:fillRef idx="0">
+            <a:schemeClr val="dk1"/>
+          </a:fillRef>
+          <a:effectRef idx="0">
+            <a:schemeClr val="dk1"/>
+          </a:effectRef>
+          <a:fontRef idx="minor">
+            <a:schemeClr val="tx1"/>
+          </a:fontRef>
+        </p:style>
+      </p:cxnSp>
+    </p:spTree>
+    <p:extLst>
+      <p:ext uri="{BB962C8B-B14F-4D97-AF65-F5344CB8AC3E}">
+        <p14:creationId xmlns:p14="http://schemas.microsoft.com/office/powerpoint/2010/main" val="2860096068"/>
       </p:ext>
     </p:extLst>
   </p:cSld>

</xml_diff>